<commit_message>
Added splash screen root ppt and png files
</commit_message>
<xml_diff>
--- a/SolutionItems/ForesightSplash.pptx
+++ b/SolutionItems/ForesightSplash.pptx
@@ -6,6 +6,7 @@
   </p:sldMasterIdLst>
   <p:sldIdLst>
     <p:sldId id="256" r:id="rId2"/>
+    <p:sldId id="257" r:id="rId3"/>
   </p:sldIdLst>
   <p:sldSz cx="9144000" cy="6858000" type="screen4x3"/>
   <p:notesSz cx="6858000" cy="9144000"/>
@@ -105,6 +106,4572 @@
     </a:lvl9pPr>
   </p:defaultTextStyle>
 </p:presentation>
+</file>
+
+<file path=ppt/diagrams/colors1.xml><?xml version="1.0" encoding="utf-8"?>
+<dgm:colorsDef xmlns:dgm="http://schemas.openxmlformats.org/drawingml/2006/diagram" xmlns:a="http://schemas.openxmlformats.org/drawingml/2006/main" uniqueId="urn:microsoft.com/office/officeart/2005/8/colors/colorful1">
+  <dgm:title val=""/>
+  <dgm:desc val=""/>
+  <dgm:catLst>
+    <dgm:cat type="colorful" pri="10100"/>
+  </dgm:catLst>
+  <dgm:styleLbl name="node0">
+    <dgm:fillClrLst meth="repeat">
+      <a:schemeClr val="accent1"/>
+    </dgm:fillClrLst>
+    <dgm:linClrLst meth="repeat">
+      <a:schemeClr val="lt1"/>
+    </dgm:linClrLst>
+    <dgm:effectClrLst/>
+    <dgm:txLinClrLst/>
+    <dgm:txFillClrLst/>
+    <dgm:txEffectClrLst/>
+  </dgm:styleLbl>
+  <dgm:styleLbl name="node1">
+    <dgm:fillClrLst meth="repeat">
+      <a:schemeClr val="accent2"/>
+      <a:schemeClr val="accent3"/>
+      <a:schemeClr val="accent4"/>
+      <a:schemeClr val="accent5"/>
+      <a:schemeClr val="accent6"/>
+    </dgm:fillClrLst>
+    <dgm:linClrLst meth="repeat">
+      <a:schemeClr val="lt1"/>
+    </dgm:linClrLst>
+    <dgm:effectClrLst/>
+    <dgm:txLinClrLst/>
+    <dgm:txFillClrLst/>
+    <dgm:txEffectClrLst/>
+  </dgm:styleLbl>
+  <dgm:styleLbl name="alignNode1">
+    <dgm:fillClrLst meth="repeat">
+      <a:schemeClr val="accent2"/>
+      <a:schemeClr val="accent3"/>
+      <a:schemeClr val="accent4"/>
+      <a:schemeClr val="accent5"/>
+      <a:schemeClr val="accent6"/>
+    </dgm:fillClrLst>
+    <dgm:linClrLst meth="repeat">
+      <a:schemeClr val="accent2"/>
+      <a:schemeClr val="accent3"/>
+      <a:schemeClr val="accent4"/>
+      <a:schemeClr val="accent5"/>
+      <a:schemeClr val="accent6"/>
+    </dgm:linClrLst>
+    <dgm:effectClrLst/>
+    <dgm:txLinClrLst/>
+    <dgm:txFillClrLst/>
+    <dgm:txEffectClrLst/>
+  </dgm:styleLbl>
+  <dgm:styleLbl name="lnNode1">
+    <dgm:fillClrLst meth="repeat">
+      <a:schemeClr val="accent2"/>
+      <a:schemeClr val="accent3"/>
+      <a:schemeClr val="accent4"/>
+      <a:schemeClr val="accent5"/>
+      <a:schemeClr val="accent6"/>
+    </dgm:fillClrLst>
+    <dgm:linClrLst meth="repeat">
+      <a:schemeClr val="lt1"/>
+    </dgm:linClrLst>
+    <dgm:effectClrLst/>
+    <dgm:txLinClrLst/>
+    <dgm:txFillClrLst/>
+    <dgm:txEffectClrLst/>
+  </dgm:styleLbl>
+  <dgm:styleLbl name="vennNode1">
+    <dgm:fillClrLst meth="repeat">
+      <a:schemeClr val="accent2">
+        <a:alpha val="50000"/>
+      </a:schemeClr>
+      <a:schemeClr val="accent3">
+        <a:alpha val="50000"/>
+      </a:schemeClr>
+      <a:schemeClr val="accent4">
+        <a:alpha val="50000"/>
+      </a:schemeClr>
+      <a:schemeClr val="accent5">
+        <a:alpha val="50000"/>
+      </a:schemeClr>
+      <a:schemeClr val="accent6">
+        <a:alpha val="50000"/>
+      </a:schemeClr>
+    </dgm:fillClrLst>
+    <dgm:linClrLst meth="repeat">
+      <a:schemeClr val="lt1"/>
+    </dgm:linClrLst>
+    <dgm:effectClrLst/>
+    <dgm:txLinClrLst/>
+    <dgm:txFillClrLst/>
+    <dgm:txEffectClrLst/>
+  </dgm:styleLbl>
+  <dgm:styleLbl name="node2">
+    <dgm:fillClrLst>
+      <a:schemeClr val="accent2"/>
+    </dgm:fillClrLst>
+    <dgm:linClrLst meth="repeat">
+      <a:schemeClr val="lt1"/>
+    </dgm:linClrLst>
+    <dgm:effectClrLst/>
+    <dgm:txLinClrLst/>
+    <dgm:txFillClrLst/>
+    <dgm:txEffectClrLst/>
+  </dgm:styleLbl>
+  <dgm:styleLbl name="node3">
+    <dgm:fillClrLst>
+      <a:schemeClr val="accent3"/>
+    </dgm:fillClrLst>
+    <dgm:linClrLst meth="repeat">
+      <a:schemeClr val="lt1"/>
+    </dgm:linClrLst>
+    <dgm:effectClrLst/>
+    <dgm:txLinClrLst/>
+    <dgm:txFillClrLst/>
+    <dgm:txEffectClrLst/>
+  </dgm:styleLbl>
+  <dgm:styleLbl name="node4">
+    <dgm:fillClrLst>
+      <a:schemeClr val="accent4"/>
+    </dgm:fillClrLst>
+    <dgm:linClrLst meth="repeat">
+      <a:schemeClr val="lt1"/>
+    </dgm:linClrLst>
+    <dgm:effectClrLst/>
+    <dgm:txLinClrLst/>
+    <dgm:txFillClrLst/>
+    <dgm:txEffectClrLst/>
+  </dgm:styleLbl>
+  <dgm:styleLbl name="fgImgPlace1">
+    <dgm:fillClrLst meth="repeat">
+      <a:schemeClr val="accent2">
+        <a:tint val="50000"/>
+      </a:schemeClr>
+      <a:schemeClr val="accent3">
+        <a:tint val="50000"/>
+      </a:schemeClr>
+      <a:schemeClr val="accent4">
+        <a:tint val="50000"/>
+      </a:schemeClr>
+      <a:schemeClr val="accent5">
+        <a:tint val="50000"/>
+      </a:schemeClr>
+      <a:schemeClr val="accent6">
+        <a:tint val="50000"/>
+      </a:schemeClr>
+    </dgm:fillClrLst>
+    <dgm:linClrLst meth="repeat">
+      <a:schemeClr val="lt1"/>
+    </dgm:linClrLst>
+    <dgm:effectClrLst/>
+    <dgm:txLinClrLst/>
+    <dgm:txFillClrLst meth="repeat">
+      <a:schemeClr val="lt1"/>
+    </dgm:txFillClrLst>
+    <dgm:txEffectClrLst/>
+  </dgm:styleLbl>
+  <dgm:styleLbl name="alignImgPlace1">
+    <dgm:fillClrLst>
+      <a:schemeClr val="accent1">
+        <a:tint val="50000"/>
+      </a:schemeClr>
+      <a:schemeClr val="accent2">
+        <a:tint val="20000"/>
+      </a:schemeClr>
+    </dgm:fillClrLst>
+    <dgm:linClrLst meth="repeat">
+      <a:schemeClr val="lt1"/>
+    </dgm:linClrLst>
+    <dgm:effectClrLst/>
+    <dgm:txLinClrLst/>
+    <dgm:txFillClrLst meth="repeat">
+      <a:schemeClr val="lt1"/>
+    </dgm:txFillClrLst>
+    <dgm:txEffectClrLst/>
+  </dgm:styleLbl>
+  <dgm:styleLbl name="bgImgPlace1">
+    <dgm:fillClrLst>
+      <a:schemeClr val="accent1">
+        <a:tint val="50000"/>
+      </a:schemeClr>
+      <a:schemeClr val="accent2">
+        <a:tint val="20000"/>
+      </a:schemeClr>
+    </dgm:fillClrLst>
+    <dgm:linClrLst meth="repeat">
+      <a:schemeClr val="lt1"/>
+    </dgm:linClrLst>
+    <dgm:effectClrLst/>
+    <dgm:txLinClrLst/>
+    <dgm:txFillClrLst meth="repeat">
+      <a:schemeClr val="lt1"/>
+    </dgm:txFillClrLst>
+    <dgm:txEffectClrLst/>
+  </dgm:styleLbl>
+  <dgm:styleLbl name="sibTrans2D1">
+    <dgm:fillClrLst meth="repeat">
+      <a:schemeClr val="accent2"/>
+      <a:schemeClr val="accent3"/>
+      <a:schemeClr val="accent4"/>
+      <a:schemeClr val="accent5"/>
+      <a:schemeClr val="accent6"/>
+    </dgm:fillClrLst>
+    <dgm:linClrLst meth="cycle">
+      <a:schemeClr val="lt1"/>
+    </dgm:linClrLst>
+    <dgm:effectClrLst/>
+    <dgm:txLinClrLst/>
+    <dgm:txFillClrLst/>
+    <dgm:txEffectClrLst/>
+  </dgm:styleLbl>
+  <dgm:styleLbl name="fgSibTrans2D1">
+    <dgm:fillClrLst meth="repeat">
+      <a:schemeClr val="accent2"/>
+      <a:schemeClr val="accent3"/>
+      <a:schemeClr val="accent4"/>
+      <a:schemeClr val="accent5"/>
+      <a:schemeClr val="accent6"/>
+    </dgm:fillClrLst>
+    <dgm:linClrLst meth="cycle">
+      <a:schemeClr val="lt1"/>
+    </dgm:linClrLst>
+    <dgm:effectClrLst/>
+    <dgm:txLinClrLst/>
+    <dgm:txFillClrLst meth="repeat">
+      <a:schemeClr val="lt1"/>
+    </dgm:txFillClrLst>
+    <dgm:txEffectClrLst/>
+  </dgm:styleLbl>
+  <dgm:styleLbl name="bgSibTrans2D1">
+    <dgm:fillClrLst meth="repeat">
+      <a:schemeClr val="accent2"/>
+      <a:schemeClr val="accent3"/>
+      <a:schemeClr val="accent4"/>
+      <a:schemeClr val="accent5"/>
+      <a:schemeClr val="accent6"/>
+    </dgm:fillClrLst>
+    <dgm:linClrLst meth="cycle">
+      <a:schemeClr val="lt1"/>
+    </dgm:linClrLst>
+    <dgm:effectClrLst/>
+    <dgm:txLinClrLst/>
+    <dgm:txFillClrLst meth="repeat">
+      <a:schemeClr val="lt1"/>
+    </dgm:txFillClrLst>
+    <dgm:txEffectClrLst/>
+  </dgm:styleLbl>
+  <dgm:styleLbl name="sibTrans1D1">
+    <dgm:fillClrLst meth="repeat">
+      <a:schemeClr val="accent2"/>
+      <a:schemeClr val="accent3"/>
+      <a:schemeClr val="accent4"/>
+      <a:schemeClr val="accent5"/>
+      <a:schemeClr val="accent6"/>
+    </dgm:fillClrLst>
+    <dgm:linClrLst meth="repeat">
+      <a:schemeClr val="accent2"/>
+      <a:schemeClr val="accent3"/>
+      <a:schemeClr val="accent4"/>
+      <a:schemeClr val="accent5"/>
+      <a:schemeClr val="accent6"/>
+    </dgm:linClrLst>
+    <dgm:effectClrLst/>
+    <dgm:txLinClrLst/>
+    <dgm:txFillClrLst meth="repeat">
+      <a:schemeClr val="tx1"/>
+    </dgm:txFillClrLst>
+    <dgm:txEffectClrLst/>
+  </dgm:styleLbl>
+  <dgm:styleLbl name="callout">
+    <dgm:fillClrLst meth="repeat">
+      <a:schemeClr val="accent2"/>
+    </dgm:fillClrLst>
+    <dgm:linClrLst meth="repeat">
+      <a:schemeClr val="accent2">
+        <a:tint val="50000"/>
+      </a:schemeClr>
+    </dgm:linClrLst>
+    <dgm:effectClrLst/>
+    <dgm:txLinClrLst/>
+    <dgm:txFillClrLst meth="repeat">
+      <a:schemeClr val="tx1"/>
+    </dgm:txFillClrLst>
+    <dgm:txEffectClrLst/>
+  </dgm:styleLbl>
+  <dgm:styleLbl name="asst0">
+    <dgm:fillClrLst meth="repeat">
+      <a:schemeClr val="accent1"/>
+    </dgm:fillClrLst>
+    <dgm:linClrLst meth="repeat">
+      <a:schemeClr val="lt1"/>
+    </dgm:linClrLst>
+    <dgm:effectClrLst/>
+    <dgm:txLinClrLst/>
+    <dgm:txFillClrLst/>
+    <dgm:txEffectClrLst/>
+  </dgm:styleLbl>
+  <dgm:styleLbl name="asst1">
+    <dgm:fillClrLst meth="repeat">
+      <a:schemeClr val="accent2"/>
+    </dgm:fillClrLst>
+    <dgm:linClrLst meth="repeat">
+      <a:schemeClr val="lt1"/>
+    </dgm:linClrLst>
+    <dgm:effectClrLst/>
+    <dgm:txLinClrLst/>
+    <dgm:txFillClrLst/>
+    <dgm:txEffectClrLst/>
+  </dgm:styleLbl>
+  <dgm:styleLbl name="asst2">
+    <dgm:fillClrLst>
+      <a:schemeClr val="accent3"/>
+    </dgm:fillClrLst>
+    <dgm:linClrLst meth="repeat">
+      <a:schemeClr val="lt1"/>
+    </dgm:linClrLst>
+    <dgm:effectClrLst/>
+    <dgm:txLinClrLst/>
+    <dgm:txFillClrLst/>
+    <dgm:txEffectClrLst/>
+  </dgm:styleLbl>
+  <dgm:styleLbl name="asst3">
+    <dgm:fillClrLst>
+      <a:schemeClr val="accent4"/>
+    </dgm:fillClrLst>
+    <dgm:linClrLst meth="repeat">
+      <a:schemeClr val="lt1"/>
+    </dgm:linClrLst>
+    <dgm:effectClrLst/>
+    <dgm:txLinClrLst/>
+    <dgm:txFillClrLst/>
+    <dgm:txEffectClrLst/>
+  </dgm:styleLbl>
+  <dgm:styleLbl name="asst4">
+    <dgm:fillClrLst>
+      <a:schemeClr val="accent5"/>
+    </dgm:fillClrLst>
+    <dgm:linClrLst meth="repeat">
+      <a:schemeClr val="lt1"/>
+    </dgm:linClrLst>
+    <dgm:effectClrLst/>
+    <dgm:txLinClrLst/>
+    <dgm:txFillClrLst/>
+    <dgm:txEffectClrLst/>
+  </dgm:styleLbl>
+  <dgm:styleLbl name="parChTrans2D1">
+    <dgm:fillClrLst meth="repeat">
+      <a:schemeClr val="accent2"/>
+    </dgm:fillClrLst>
+    <dgm:linClrLst meth="repeat">
+      <a:schemeClr val="lt1"/>
+    </dgm:linClrLst>
+    <dgm:effectClrLst/>
+    <dgm:txLinClrLst/>
+    <dgm:txFillClrLst meth="repeat">
+      <a:schemeClr val="lt1"/>
+    </dgm:txFillClrLst>
+    <dgm:txEffectClrLst/>
+  </dgm:styleLbl>
+  <dgm:styleLbl name="parChTrans2D2">
+    <dgm:fillClrLst meth="repeat">
+      <a:schemeClr val="accent3"/>
+    </dgm:fillClrLst>
+    <dgm:linClrLst meth="repeat">
+      <a:schemeClr val="lt1"/>
+    </dgm:linClrLst>
+    <dgm:effectClrLst/>
+    <dgm:txLinClrLst/>
+    <dgm:txFillClrLst/>
+    <dgm:txEffectClrLst/>
+  </dgm:styleLbl>
+  <dgm:styleLbl name="parChTrans2D3">
+    <dgm:fillClrLst meth="repeat">
+      <a:schemeClr val="accent4"/>
+    </dgm:fillClrLst>
+    <dgm:linClrLst meth="repeat">
+      <a:schemeClr val="lt1"/>
+    </dgm:linClrLst>
+    <dgm:effectClrLst/>
+    <dgm:txLinClrLst/>
+    <dgm:txFillClrLst/>
+    <dgm:txEffectClrLst/>
+  </dgm:styleLbl>
+  <dgm:styleLbl name="parChTrans2D4">
+    <dgm:fillClrLst meth="repeat">
+      <a:schemeClr val="accent5"/>
+    </dgm:fillClrLst>
+    <dgm:linClrLst meth="repeat">
+      <a:schemeClr val="lt1"/>
+    </dgm:linClrLst>
+    <dgm:effectClrLst/>
+    <dgm:txLinClrLst/>
+    <dgm:txFillClrLst meth="repeat">
+      <a:schemeClr val="lt1"/>
+    </dgm:txFillClrLst>
+    <dgm:txEffectClrLst/>
+  </dgm:styleLbl>
+  <dgm:styleLbl name="parChTrans1D1">
+    <dgm:fillClrLst meth="repeat">
+      <a:schemeClr val="accent2"/>
+    </dgm:fillClrLst>
+    <dgm:linClrLst meth="repeat">
+      <a:schemeClr val="accent1"/>
+    </dgm:linClrLst>
+    <dgm:effectClrLst/>
+    <dgm:txLinClrLst/>
+    <dgm:txFillClrLst meth="repeat">
+      <a:schemeClr val="tx1"/>
+    </dgm:txFillClrLst>
+    <dgm:txEffectClrLst/>
+  </dgm:styleLbl>
+  <dgm:styleLbl name="parChTrans1D2">
+    <dgm:fillClrLst meth="repeat">
+      <a:schemeClr val="accent3">
+        <a:tint val="90000"/>
+      </a:schemeClr>
+    </dgm:fillClrLst>
+    <dgm:linClrLst meth="repeat">
+      <a:schemeClr val="accent2"/>
+    </dgm:linClrLst>
+    <dgm:effectClrLst/>
+    <dgm:txLinClrLst/>
+    <dgm:txFillClrLst meth="repeat">
+      <a:schemeClr val="tx1"/>
+    </dgm:txFillClrLst>
+    <dgm:txEffectClrLst/>
+  </dgm:styleLbl>
+  <dgm:styleLbl name="parChTrans1D3">
+    <dgm:fillClrLst meth="repeat">
+      <a:schemeClr val="accent4">
+        <a:tint val="70000"/>
+      </a:schemeClr>
+    </dgm:fillClrLst>
+    <dgm:linClrLst meth="repeat">
+      <a:schemeClr val="accent3"/>
+    </dgm:linClrLst>
+    <dgm:effectClrLst/>
+    <dgm:txLinClrLst/>
+    <dgm:txFillClrLst meth="repeat">
+      <a:schemeClr val="tx1"/>
+    </dgm:txFillClrLst>
+    <dgm:txEffectClrLst/>
+  </dgm:styleLbl>
+  <dgm:styleLbl name="parChTrans1D4">
+    <dgm:fillClrLst meth="repeat">
+      <a:schemeClr val="accent5">
+        <a:tint val="50000"/>
+      </a:schemeClr>
+    </dgm:fillClrLst>
+    <dgm:linClrLst meth="repeat">
+      <a:schemeClr val="accent4"/>
+    </dgm:linClrLst>
+    <dgm:effectClrLst/>
+    <dgm:txLinClrLst/>
+    <dgm:txFillClrLst meth="repeat">
+      <a:schemeClr val="tx1"/>
+    </dgm:txFillClrLst>
+    <dgm:txEffectClrLst/>
+  </dgm:styleLbl>
+  <dgm:styleLbl name="fgAcc1">
+    <dgm:fillClrLst meth="repeat">
+      <a:schemeClr val="lt1">
+        <a:alpha val="90000"/>
+      </a:schemeClr>
+    </dgm:fillClrLst>
+    <dgm:linClrLst meth="repeat">
+      <a:schemeClr val="accent2"/>
+      <a:schemeClr val="accent3"/>
+      <a:schemeClr val="accent4"/>
+      <a:schemeClr val="accent5"/>
+      <a:schemeClr val="accent6"/>
+    </dgm:linClrLst>
+    <dgm:effectClrLst/>
+    <dgm:txLinClrLst/>
+    <dgm:txFillClrLst meth="repeat">
+      <a:schemeClr val="dk1"/>
+    </dgm:txFillClrLst>
+    <dgm:txEffectClrLst/>
+  </dgm:styleLbl>
+  <dgm:styleLbl name="conFgAcc1">
+    <dgm:fillClrLst meth="repeat">
+      <a:schemeClr val="lt1">
+        <a:alpha val="90000"/>
+      </a:schemeClr>
+    </dgm:fillClrLst>
+    <dgm:linClrLst meth="repeat">
+      <a:schemeClr val="accent2"/>
+      <a:schemeClr val="accent3"/>
+      <a:schemeClr val="accent4"/>
+      <a:schemeClr val="accent5"/>
+      <a:schemeClr val="accent6"/>
+    </dgm:linClrLst>
+    <dgm:effectClrLst/>
+    <dgm:txLinClrLst/>
+    <dgm:txFillClrLst meth="repeat">
+      <a:schemeClr val="dk1"/>
+    </dgm:txFillClrLst>
+    <dgm:txEffectClrLst/>
+  </dgm:styleLbl>
+  <dgm:styleLbl name="alignAcc1">
+    <dgm:fillClrLst meth="repeat">
+      <a:schemeClr val="lt1">
+        <a:alpha val="90000"/>
+      </a:schemeClr>
+    </dgm:fillClrLst>
+    <dgm:linClrLst meth="repeat">
+      <a:schemeClr val="accent2"/>
+      <a:schemeClr val="accent3"/>
+      <a:schemeClr val="accent4"/>
+      <a:schemeClr val="accent5"/>
+      <a:schemeClr val="accent6"/>
+    </dgm:linClrLst>
+    <dgm:effectClrLst/>
+    <dgm:txLinClrLst/>
+    <dgm:txFillClrLst meth="repeat">
+      <a:schemeClr val="dk1"/>
+    </dgm:txFillClrLst>
+    <dgm:txEffectClrLst/>
+  </dgm:styleLbl>
+  <dgm:styleLbl name="trAlignAcc1">
+    <dgm:fillClrLst meth="repeat">
+      <a:schemeClr val="lt1">
+        <a:alpha val="40000"/>
+      </a:schemeClr>
+    </dgm:fillClrLst>
+    <dgm:linClrLst meth="repeat">
+      <a:schemeClr val="accent1"/>
+    </dgm:linClrLst>
+    <dgm:effectClrLst/>
+    <dgm:txLinClrLst/>
+    <dgm:txFillClrLst meth="repeat">
+      <a:schemeClr val="dk1"/>
+    </dgm:txFillClrLst>
+    <dgm:txEffectClrLst/>
+  </dgm:styleLbl>
+  <dgm:styleLbl name="bgAcc1">
+    <dgm:fillClrLst meth="repeat">
+      <a:schemeClr val="lt1">
+        <a:alpha val="90000"/>
+      </a:schemeClr>
+    </dgm:fillClrLst>
+    <dgm:linClrLst meth="repeat">
+      <a:schemeClr val="accent2"/>
+      <a:schemeClr val="accent3"/>
+      <a:schemeClr val="accent4"/>
+      <a:schemeClr val="accent5"/>
+      <a:schemeClr val="accent6"/>
+    </dgm:linClrLst>
+    <dgm:effectClrLst/>
+    <dgm:txLinClrLst/>
+    <dgm:txFillClrLst meth="repeat">
+      <a:schemeClr val="dk1"/>
+    </dgm:txFillClrLst>
+    <dgm:txEffectClrLst/>
+  </dgm:styleLbl>
+  <dgm:styleLbl name="solidFgAcc1">
+    <dgm:fillClrLst meth="repeat">
+      <a:schemeClr val="lt1"/>
+    </dgm:fillClrLst>
+    <dgm:linClrLst meth="repeat">
+      <a:schemeClr val="accent2"/>
+      <a:schemeClr val="accent3"/>
+      <a:schemeClr val="accent4"/>
+      <a:schemeClr val="accent5"/>
+      <a:schemeClr val="accent6"/>
+    </dgm:linClrLst>
+    <dgm:effectClrLst/>
+    <dgm:txLinClrLst/>
+    <dgm:txFillClrLst meth="repeat">
+      <a:schemeClr val="dk1"/>
+    </dgm:txFillClrLst>
+    <dgm:txEffectClrLst/>
+  </dgm:styleLbl>
+  <dgm:styleLbl name="solidAlignAcc1">
+    <dgm:fillClrLst meth="repeat">
+      <a:schemeClr val="lt1"/>
+    </dgm:fillClrLst>
+    <dgm:linClrLst meth="repeat">
+      <a:schemeClr val="accent2"/>
+      <a:schemeClr val="accent3"/>
+      <a:schemeClr val="accent4"/>
+      <a:schemeClr val="accent5"/>
+      <a:schemeClr val="accent6"/>
+    </dgm:linClrLst>
+    <dgm:effectClrLst/>
+    <dgm:txLinClrLst/>
+    <dgm:txFillClrLst meth="repeat">
+      <a:schemeClr val="dk1"/>
+    </dgm:txFillClrLst>
+    <dgm:txEffectClrLst/>
+  </dgm:styleLbl>
+  <dgm:styleLbl name="solidBgAcc1">
+    <dgm:fillClrLst meth="repeat">
+      <a:schemeClr val="lt1"/>
+    </dgm:fillClrLst>
+    <dgm:linClrLst meth="repeat">
+      <a:schemeClr val="accent2"/>
+      <a:schemeClr val="accent3"/>
+      <a:schemeClr val="accent4"/>
+      <a:schemeClr val="accent5"/>
+      <a:schemeClr val="accent6"/>
+    </dgm:linClrLst>
+    <dgm:effectClrLst/>
+    <dgm:txLinClrLst/>
+    <dgm:txFillClrLst meth="repeat">
+      <a:schemeClr val="dk1"/>
+    </dgm:txFillClrLst>
+    <dgm:txEffectClrLst/>
+  </dgm:styleLbl>
+  <dgm:styleLbl name="fgAccFollowNode1">
+    <dgm:fillClrLst meth="repeat">
+      <a:schemeClr val="accent2">
+        <a:tint val="40000"/>
+        <a:alpha val="90000"/>
+      </a:schemeClr>
+      <a:schemeClr val="accent3">
+        <a:tint val="40000"/>
+        <a:alpha val="90000"/>
+      </a:schemeClr>
+      <a:schemeClr val="accent4">
+        <a:tint val="40000"/>
+        <a:alpha val="90000"/>
+      </a:schemeClr>
+      <a:schemeClr val="accent5">
+        <a:tint val="40000"/>
+        <a:alpha val="90000"/>
+      </a:schemeClr>
+      <a:schemeClr val="accent6">
+        <a:tint val="40000"/>
+        <a:alpha val="90000"/>
+      </a:schemeClr>
+    </dgm:fillClrLst>
+    <dgm:linClrLst meth="repeat">
+      <a:schemeClr val="accent2">
+        <a:tint val="40000"/>
+        <a:alpha val="90000"/>
+      </a:schemeClr>
+      <a:schemeClr val="accent3">
+        <a:tint val="40000"/>
+        <a:alpha val="90000"/>
+      </a:schemeClr>
+      <a:schemeClr val="accent4">
+        <a:tint val="40000"/>
+        <a:alpha val="90000"/>
+      </a:schemeClr>
+      <a:schemeClr val="accent5">
+        <a:tint val="40000"/>
+        <a:alpha val="90000"/>
+      </a:schemeClr>
+      <a:schemeClr val="accent6">
+        <a:tint val="40000"/>
+        <a:alpha val="90000"/>
+      </a:schemeClr>
+    </dgm:linClrLst>
+    <dgm:effectClrLst/>
+    <dgm:txLinClrLst/>
+    <dgm:txFillClrLst meth="repeat">
+      <a:schemeClr val="dk1"/>
+    </dgm:txFillClrLst>
+    <dgm:txEffectClrLst/>
+  </dgm:styleLbl>
+  <dgm:styleLbl name="alignAccFollowNode1">
+    <dgm:fillClrLst meth="repeat">
+      <a:schemeClr val="accent2">
+        <a:tint val="40000"/>
+        <a:alpha val="90000"/>
+      </a:schemeClr>
+      <a:schemeClr val="accent3">
+        <a:tint val="40000"/>
+        <a:alpha val="90000"/>
+      </a:schemeClr>
+      <a:schemeClr val="accent4">
+        <a:tint val="40000"/>
+        <a:alpha val="90000"/>
+      </a:schemeClr>
+      <a:schemeClr val="accent5">
+        <a:tint val="40000"/>
+        <a:alpha val="90000"/>
+      </a:schemeClr>
+      <a:schemeClr val="accent6">
+        <a:tint val="40000"/>
+        <a:alpha val="90000"/>
+      </a:schemeClr>
+    </dgm:fillClrLst>
+    <dgm:linClrLst meth="repeat">
+      <a:schemeClr val="accent2">
+        <a:tint val="40000"/>
+        <a:alpha val="90000"/>
+      </a:schemeClr>
+      <a:schemeClr val="accent3">
+        <a:tint val="40000"/>
+        <a:alpha val="90000"/>
+      </a:schemeClr>
+      <a:schemeClr val="accent4">
+        <a:tint val="40000"/>
+        <a:alpha val="90000"/>
+      </a:schemeClr>
+      <a:schemeClr val="accent5">
+        <a:tint val="40000"/>
+        <a:alpha val="90000"/>
+      </a:schemeClr>
+      <a:schemeClr val="accent6">
+        <a:tint val="40000"/>
+        <a:alpha val="90000"/>
+      </a:schemeClr>
+    </dgm:linClrLst>
+    <dgm:effectClrLst/>
+    <dgm:txLinClrLst/>
+    <dgm:txFillClrLst meth="repeat">
+      <a:schemeClr val="dk1"/>
+    </dgm:txFillClrLst>
+    <dgm:txEffectClrLst/>
+  </dgm:styleLbl>
+  <dgm:styleLbl name="bgAccFollowNode1">
+    <dgm:fillClrLst meth="repeat">
+      <a:schemeClr val="accent2">
+        <a:tint val="40000"/>
+        <a:alpha val="90000"/>
+      </a:schemeClr>
+      <a:schemeClr val="accent3">
+        <a:tint val="40000"/>
+        <a:alpha val="90000"/>
+      </a:schemeClr>
+      <a:schemeClr val="accent4">
+        <a:tint val="40000"/>
+        <a:alpha val="90000"/>
+      </a:schemeClr>
+      <a:schemeClr val="accent5">
+        <a:tint val="40000"/>
+        <a:alpha val="90000"/>
+      </a:schemeClr>
+      <a:schemeClr val="accent6">
+        <a:tint val="40000"/>
+        <a:alpha val="90000"/>
+      </a:schemeClr>
+    </dgm:fillClrLst>
+    <dgm:linClrLst meth="repeat">
+      <a:schemeClr val="accent2">
+        <a:tint val="40000"/>
+        <a:alpha val="90000"/>
+      </a:schemeClr>
+      <a:schemeClr val="accent3">
+        <a:tint val="40000"/>
+        <a:alpha val="90000"/>
+      </a:schemeClr>
+      <a:schemeClr val="accent4">
+        <a:tint val="40000"/>
+        <a:alpha val="90000"/>
+      </a:schemeClr>
+      <a:schemeClr val="accent5">
+        <a:tint val="40000"/>
+        <a:alpha val="90000"/>
+      </a:schemeClr>
+      <a:schemeClr val="accent6">
+        <a:tint val="40000"/>
+        <a:alpha val="90000"/>
+      </a:schemeClr>
+    </dgm:linClrLst>
+    <dgm:effectClrLst/>
+    <dgm:txLinClrLst/>
+    <dgm:txFillClrLst meth="repeat">
+      <a:schemeClr val="dk1"/>
+    </dgm:txFillClrLst>
+    <dgm:txEffectClrLst/>
+  </dgm:styleLbl>
+  <dgm:styleLbl name="fgAcc0">
+    <dgm:fillClrLst meth="repeat">
+      <a:schemeClr val="lt1">
+        <a:alpha val="90000"/>
+      </a:schemeClr>
+    </dgm:fillClrLst>
+    <dgm:linClrLst>
+      <a:schemeClr val="accent1"/>
+    </dgm:linClrLst>
+    <dgm:effectClrLst/>
+    <dgm:txLinClrLst/>
+    <dgm:txFillClrLst meth="repeat">
+      <a:schemeClr val="dk1"/>
+    </dgm:txFillClrLst>
+    <dgm:txEffectClrLst/>
+  </dgm:styleLbl>
+  <dgm:styleLbl name="fgAcc2">
+    <dgm:fillClrLst meth="repeat">
+      <a:schemeClr val="lt1">
+        <a:alpha val="90000"/>
+      </a:schemeClr>
+    </dgm:fillClrLst>
+    <dgm:linClrLst>
+      <a:schemeClr val="accent2"/>
+    </dgm:linClrLst>
+    <dgm:effectClrLst/>
+    <dgm:txLinClrLst/>
+    <dgm:txFillClrLst meth="repeat">
+      <a:schemeClr val="dk1"/>
+    </dgm:txFillClrLst>
+    <dgm:txEffectClrLst/>
+  </dgm:styleLbl>
+  <dgm:styleLbl name="fgAcc3">
+    <dgm:fillClrLst meth="repeat">
+      <a:schemeClr val="lt1">
+        <a:alpha val="90000"/>
+      </a:schemeClr>
+    </dgm:fillClrLst>
+    <dgm:linClrLst>
+      <a:schemeClr val="accent3"/>
+    </dgm:linClrLst>
+    <dgm:effectClrLst/>
+    <dgm:txLinClrLst/>
+    <dgm:txFillClrLst meth="repeat">
+      <a:schemeClr val="dk1"/>
+    </dgm:txFillClrLst>
+    <dgm:txEffectClrLst/>
+  </dgm:styleLbl>
+  <dgm:styleLbl name="fgAcc4">
+    <dgm:fillClrLst meth="repeat">
+      <a:schemeClr val="lt1">
+        <a:alpha val="90000"/>
+      </a:schemeClr>
+    </dgm:fillClrLst>
+    <dgm:linClrLst>
+      <a:schemeClr val="accent4"/>
+    </dgm:linClrLst>
+    <dgm:effectClrLst/>
+    <dgm:txLinClrLst/>
+    <dgm:txFillClrLst meth="repeat">
+      <a:schemeClr val="dk1"/>
+    </dgm:txFillClrLst>
+    <dgm:txEffectClrLst/>
+  </dgm:styleLbl>
+  <dgm:styleLbl name="bgShp">
+    <dgm:fillClrLst meth="repeat">
+      <a:schemeClr val="accent2">
+        <a:tint val="40000"/>
+      </a:schemeClr>
+    </dgm:fillClrLst>
+    <dgm:linClrLst meth="repeat">
+      <a:schemeClr val="dk1"/>
+    </dgm:linClrLst>
+    <dgm:effectClrLst/>
+    <dgm:txLinClrLst/>
+    <dgm:txFillClrLst meth="repeat">
+      <a:schemeClr val="dk1"/>
+    </dgm:txFillClrLst>
+    <dgm:txEffectClrLst/>
+  </dgm:styleLbl>
+  <dgm:styleLbl name="dkBgShp">
+    <dgm:fillClrLst meth="repeat">
+      <a:schemeClr val="accent2">
+        <a:shade val="90000"/>
+      </a:schemeClr>
+    </dgm:fillClrLst>
+    <dgm:linClrLst meth="repeat">
+      <a:schemeClr val="dk1"/>
+    </dgm:linClrLst>
+    <dgm:effectClrLst/>
+    <dgm:txLinClrLst/>
+    <dgm:txFillClrLst meth="repeat">
+      <a:schemeClr val="lt1"/>
+    </dgm:txFillClrLst>
+    <dgm:txEffectClrLst/>
+  </dgm:styleLbl>
+  <dgm:styleLbl name="trBgShp">
+    <dgm:fillClrLst meth="repeat">
+      <a:schemeClr val="accent1">
+        <a:tint val="50000"/>
+        <a:alpha val="40000"/>
+      </a:schemeClr>
+    </dgm:fillClrLst>
+    <dgm:linClrLst meth="repeat">
+      <a:schemeClr val="accent2"/>
+    </dgm:linClrLst>
+    <dgm:effectClrLst/>
+    <dgm:txLinClrLst/>
+    <dgm:txFillClrLst meth="repeat">
+      <a:schemeClr val="lt1"/>
+    </dgm:txFillClrLst>
+    <dgm:txEffectClrLst/>
+  </dgm:styleLbl>
+  <dgm:styleLbl name="fgShp">
+    <dgm:fillClrLst meth="repeat">
+      <a:schemeClr val="accent2">
+        <a:tint val="40000"/>
+      </a:schemeClr>
+    </dgm:fillClrLst>
+    <dgm:linClrLst meth="repeat">
+      <a:schemeClr val="lt1"/>
+    </dgm:linClrLst>
+    <dgm:effectClrLst/>
+    <dgm:txLinClrLst/>
+    <dgm:txFillClrLst meth="repeat">
+      <a:schemeClr val="dk1"/>
+    </dgm:txFillClrLst>
+    <dgm:txEffectClrLst/>
+  </dgm:styleLbl>
+  <dgm:styleLbl name="revTx">
+    <dgm:fillClrLst meth="repeat">
+      <a:schemeClr val="lt1">
+        <a:alpha val="0"/>
+      </a:schemeClr>
+    </dgm:fillClrLst>
+    <dgm:linClrLst meth="repeat">
+      <a:schemeClr val="dk1">
+        <a:alpha val="0"/>
+      </a:schemeClr>
+    </dgm:linClrLst>
+    <dgm:effectClrLst/>
+    <dgm:txLinClrLst/>
+    <dgm:txFillClrLst meth="repeat">
+      <a:schemeClr val="tx1"/>
+    </dgm:txFillClrLst>
+    <dgm:txEffectClrLst/>
+  </dgm:styleLbl>
+</dgm:colorsDef>
+</file>
+
+<file path=ppt/diagrams/data1.xml><?xml version="1.0" encoding="utf-8"?>
+<dgm:dataModel xmlns:dgm="http://schemas.openxmlformats.org/drawingml/2006/diagram" xmlns:a="http://schemas.openxmlformats.org/drawingml/2006/main">
+  <dgm:ptLst>
+    <dgm:pt modelId="{5FC012F1-C8FF-8D4B-B58F-F70DF0946223}" type="doc">
+      <dgm:prSet loTypeId="urn:microsoft.com/office/officeart/2005/8/layout/cycle8" loCatId="" qsTypeId="urn:microsoft.com/office/officeart/2005/8/quickstyle/simple4" qsCatId="simple" csTypeId="urn:microsoft.com/office/officeart/2005/8/colors/colorful1" csCatId="colorful" phldr="1"/>
+      <dgm:spPr/>
+    </dgm:pt>
+    <dgm:pt modelId="{08344A95-8B0A-4E47-A477-D0A8AB83360D}">
+      <dgm:prSet phldrT="[Text]"/>
+      <dgm:spPr/>
+      <dgm:t>
+        <a:bodyPr/>
+        <a:lstStyle/>
+        <a:p>
+          <a:r>
+            <a:rPr lang="en-US" dirty="0" smtClean="0"/>
+            <a:t>Business</a:t>
+          </a:r>
+          <a:endParaRPr lang="en-US" dirty="0"/>
+        </a:p>
+      </dgm:t>
+    </dgm:pt>
+    <dgm:pt modelId="{BAA95031-B45D-BF47-9AA0-4EF39AAFEFFC}" type="parTrans" cxnId="{818D0FD3-BCF3-6C4C-A912-B3E690168193}">
+      <dgm:prSet/>
+      <dgm:spPr/>
+      <dgm:t>
+        <a:bodyPr/>
+        <a:lstStyle/>
+        <a:p>
+          <a:endParaRPr lang="en-US"/>
+        </a:p>
+      </dgm:t>
+    </dgm:pt>
+    <dgm:pt modelId="{674353D5-F814-844A-AD70-9B9745DA9FAF}" type="sibTrans" cxnId="{818D0FD3-BCF3-6C4C-A912-B3E690168193}">
+      <dgm:prSet/>
+      <dgm:spPr/>
+      <dgm:t>
+        <a:bodyPr/>
+        <a:lstStyle/>
+        <a:p>
+          <a:endParaRPr lang="en-US"/>
+        </a:p>
+      </dgm:t>
+    </dgm:pt>
+    <dgm:pt modelId="{BBDCF229-FDAC-9F4D-B7A1-25E660E9129F}">
+      <dgm:prSet phldrT="[Text]"/>
+      <dgm:spPr/>
+      <dgm:t>
+        <a:bodyPr/>
+        <a:lstStyle/>
+        <a:p>
+          <a:r>
+            <a:rPr lang="en-US" dirty="0" smtClean="0"/>
+            <a:t>Associates</a:t>
+          </a:r>
+          <a:endParaRPr lang="en-US" dirty="0"/>
+        </a:p>
+      </dgm:t>
+    </dgm:pt>
+    <dgm:pt modelId="{38A3F8DA-D1F6-3148-A920-F70764CDB21F}" type="parTrans" cxnId="{ADB3F457-E8A9-8F4A-AAE2-C1C19CAA9DA9}">
+      <dgm:prSet/>
+      <dgm:spPr/>
+      <dgm:t>
+        <a:bodyPr/>
+        <a:lstStyle/>
+        <a:p>
+          <a:endParaRPr lang="en-US"/>
+        </a:p>
+      </dgm:t>
+    </dgm:pt>
+    <dgm:pt modelId="{217BCEC8-6A5E-5D43-BB75-B3CD8991CA1E}" type="sibTrans" cxnId="{ADB3F457-E8A9-8F4A-AAE2-C1C19CAA9DA9}">
+      <dgm:prSet/>
+      <dgm:spPr/>
+      <dgm:t>
+        <a:bodyPr/>
+        <a:lstStyle/>
+        <a:p>
+          <a:endParaRPr lang="en-US"/>
+        </a:p>
+      </dgm:t>
+    </dgm:pt>
+    <dgm:pt modelId="{DC719274-2641-0247-8B0A-A11B5AB5552F}">
+      <dgm:prSet phldrT="[Text]"/>
+      <dgm:spPr/>
+      <dgm:t>
+        <a:bodyPr/>
+        <a:lstStyle/>
+        <a:p>
+          <a:r>
+            <a:rPr lang="en-US" dirty="0" smtClean="0"/>
+            <a:t>You</a:t>
+          </a:r>
+          <a:endParaRPr lang="en-US" dirty="0"/>
+        </a:p>
+      </dgm:t>
+    </dgm:pt>
+    <dgm:pt modelId="{8DF11653-696E-D04F-941B-0845C96F7F63}" type="sibTrans" cxnId="{44A84392-9376-AC47-A18E-5094C363EBAF}">
+      <dgm:prSet/>
+      <dgm:spPr/>
+      <dgm:t>
+        <a:bodyPr/>
+        <a:lstStyle/>
+        <a:p>
+          <a:endParaRPr lang="en-US"/>
+        </a:p>
+      </dgm:t>
+    </dgm:pt>
+    <dgm:pt modelId="{70D79B1A-9B89-5B42-8462-E52DAB48ABEE}" type="parTrans" cxnId="{44A84392-9376-AC47-A18E-5094C363EBAF}">
+      <dgm:prSet/>
+      <dgm:spPr/>
+      <dgm:t>
+        <a:bodyPr/>
+        <a:lstStyle/>
+        <a:p>
+          <a:endParaRPr lang="en-US"/>
+        </a:p>
+      </dgm:t>
+    </dgm:pt>
+    <dgm:pt modelId="{C81D0832-08F4-E846-A99C-6A435F888FBC}" type="pres">
+      <dgm:prSet presAssocID="{5FC012F1-C8FF-8D4B-B58F-F70DF0946223}" presName="compositeShape" presStyleCnt="0">
+        <dgm:presLayoutVars>
+          <dgm:chMax val="7"/>
+          <dgm:dir/>
+          <dgm:resizeHandles val="exact"/>
+        </dgm:presLayoutVars>
+      </dgm:prSet>
+      <dgm:spPr/>
+    </dgm:pt>
+    <dgm:pt modelId="{D65FEB02-912E-6242-820D-C62D83F4A838}" type="pres">
+      <dgm:prSet presAssocID="{5FC012F1-C8FF-8D4B-B58F-F70DF0946223}" presName="wedge1" presStyleLbl="node1" presStyleIdx="0" presStyleCnt="3"/>
+      <dgm:spPr/>
+      <dgm:t>
+        <a:bodyPr/>
+        <a:lstStyle/>
+        <a:p>
+          <a:endParaRPr lang="en-US"/>
+        </a:p>
+      </dgm:t>
+    </dgm:pt>
+    <dgm:pt modelId="{670C809E-5E07-DE45-9EEC-CB9512428791}" type="pres">
+      <dgm:prSet presAssocID="{5FC012F1-C8FF-8D4B-B58F-F70DF0946223}" presName="dummy1a" presStyleCnt="0"/>
+      <dgm:spPr/>
+    </dgm:pt>
+    <dgm:pt modelId="{DD6390B6-2FD7-5145-8C24-7DE150444E78}" type="pres">
+      <dgm:prSet presAssocID="{5FC012F1-C8FF-8D4B-B58F-F70DF0946223}" presName="dummy1b" presStyleCnt="0"/>
+      <dgm:spPr/>
+    </dgm:pt>
+    <dgm:pt modelId="{7EF99496-4D36-C949-BDC9-D5A4424B402C}" type="pres">
+      <dgm:prSet presAssocID="{5FC012F1-C8FF-8D4B-B58F-F70DF0946223}" presName="wedge1Tx" presStyleLbl="node1" presStyleIdx="0" presStyleCnt="3">
+        <dgm:presLayoutVars>
+          <dgm:chMax val="0"/>
+          <dgm:chPref val="0"/>
+          <dgm:bulletEnabled val="1"/>
+        </dgm:presLayoutVars>
+      </dgm:prSet>
+      <dgm:spPr/>
+      <dgm:t>
+        <a:bodyPr/>
+        <a:lstStyle/>
+        <a:p>
+          <a:endParaRPr lang="en-US"/>
+        </a:p>
+      </dgm:t>
+    </dgm:pt>
+    <dgm:pt modelId="{4A8BCD4A-95C9-A54C-AEB3-5A518C82F73A}" type="pres">
+      <dgm:prSet presAssocID="{5FC012F1-C8FF-8D4B-B58F-F70DF0946223}" presName="wedge2" presStyleLbl="node1" presStyleIdx="1" presStyleCnt="3" custLinFactNeighborX="1020" custLinFactNeighborY="-1591"/>
+      <dgm:spPr/>
+      <dgm:t>
+        <a:bodyPr/>
+        <a:lstStyle/>
+        <a:p>
+          <a:endParaRPr lang="en-US"/>
+        </a:p>
+      </dgm:t>
+    </dgm:pt>
+    <dgm:pt modelId="{6210F0FA-E02A-D445-A2D0-A638C7F0EB69}" type="pres">
+      <dgm:prSet presAssocID="{5FC012F1-C8FF-8D4B-B58F-F70DF0946223}" presName="dummy2a" presStyleCnt="0"/>
+      <dgm:spPr/>
+    </dgm:pt>
+    <dgm:pt modelId="{64B3504E-37DB-B140-9484-C012246EFE6E}" type="pres">
+      <dgm:prSet presAssocID="{5FC012F1-C8FF-8D4B-B58F-F70DF0946223}" presName="dummy2b" presStyleCnt="0"/>
+      <dgm:spPr/>
+    </dgm:pt>
+    <dgm:pt modelId="{117F250A-50C3-D84F-8A0A-52546FB0ECCF}" type="pres">
+      <dgm:prSet presAssocID="{5FC012F1-C8FF-8D4B-B58F-F70DF0946223}" presName="wedge2Tx" presStyleLbl="node1" presStyleIdx="1" presStyleCnt="3">
+        <dgm:presLayoutVars>
+          <dgm:chMax val="0"/>
+          <dgm:chPref val="0"/>
+          <dgm:bulletEnabled val="1"/>
+        </dgm:presLayoutVars>
+      </dgm:prSet>
+      <dgm:spPr/>
+      <dgm:t>
+        <a:bodyPr/>
+        <a:lstStyle/>
+        <a:p>
+          <a:endParaRPr lang="en-US"/>
+        </a:p>
+      </dgm:t>
+    </dgm:pt>
+    <dgm:pt modelId="{6A04312B-2281-0941-B1AB-8EEA9F6C9B8A}" type="pres">
+      <dgm:prSet presAssocID="{5FC012F1-C8FF-8D4B-B58F-F70DF0946223}" presName="wedge3" presStyleLbl="node1" presStyleIdx="2" presStyleCnt="3" custLinFactNeighborX="761"/>
+      <dgm:spPr/>
+      <dgm:t>
+        <a:bodyPr/>
+        <a:lstStyle/>
+        <a:p>
+          <a:endParaRPr lang="en-US"/>
+        </a:p>
+      </dgm:t>
+    </dgm:pt>
+    <dgm:pt modelId="{28119704-DA58-7646-94A1-90449878A2CC}" type="pres">
+      <dgm:prSet presAssocID="{5FC012F1-C8FF-8D4B-B58F-F70DF0946223}" presName="dummy3a" presStyleCnt="0"/>
+      <dgm:spPr/>
+    </dgm:pt>
+    <dgm:pt modelId="{35269331-8C9E-A74C-AEEE-ED0ED637AB82}" type="pres">
+      <dgm:prSet presAssocID="{5FC012F1-C8FF-8D4B-B58F-F70DF0946223}" presName="dummy3b" presStyleCnt="0"/>
+      <dgm:spPr/>
+    </dgm:pt>
+    <dgm:pt modelId="{3087B7AD-4D94-8E4E-8B07-FFCFBA15D6D0}" type="pres">
+      <dgm:prSet presAssocID="{5FC012F1-C8FF-8D4B-B58F-F70DF0946223}" presName="wedge3Tx" presStyleLbl="node1" presStyleIdx="2" presStyleCnt="3">
+        <dgm:presLayoutVars>
+          <dgm:chMax val="0"/>
+          <dgm:chPref val="0"/>
+          <dgm:bulletEnabled val="1"/>
+        </dgm:presLayoutVars>
+      </dgm:prSet>
+      <dgm:spPr/>
+      <dgm:t>
+        <a:bodyPr/>
+        <a:lstStyle/>
+        <a:p>
+          <a:endParaRPr lang="en-US"/>
+        </a:p>
+      </dgm:t>
+    </dgm:pt>
+    <dgm:pt modelId="{CA8167C4-CE23-EE4C-B7E1-84237A5D1530}" type="pres">
+      <dgm:prSet presAssocID="{217BCEC8-6A5E-5D43-BB75-B3CD8991CA1E}" presName="arrowWedge1" presStyleLbl="fgSibTrans2D1" presStyleIdx="0" presStyleCnt="3"/>
+      <dgm:spPr/>
+    </dgm:pt>
+    <dgm:pt modelId="{14431848-3409-114C-85BF-1839D9BB2FAA}" type="pres">
+      <dgm:prSet presAssocID="{8DF11653-696E-D04F-941B-0845C96F7F63}" presName="arrowWedge2" presStyleLbl="fgSibTrans2D1" presStyleIdx="1" presStyleCnt="3"/>
+      <dgm:spPr/>
+    </dgm:pt>
+    <dgm:pt modelId="{E9901D9B-0216-0642-9BDE-9707DDF1033E}" type="pres">
+      <dgm:prSet presAssocID="{674353D5-F814-844A-AD70-9B9745DA9FAF}" presName="arrowWedge3" presStyleLbl="fgSibTrans2D1" presStyleIdx="2" presStyleCnt="3"/>
+      <dgm:spPr/>
+    </dgm:pt>
+  </dgm:ptLst>
+  <dgm:cxnLst>
+    <dgm:cxn modelId="{653C7DC8-6AC3-A04C-80B0-95A6AD3A5608}" type="presOf" srcId="{BBDCF229-FDAC-9F4D-B7A1-25E660E9129F}" destId="{7EF99496-4D36-C949-BDC9-D5A4424B402C}" srcOrd="1" destOrd="0" presId="urn:microsoft.com/office/officeart/2005/8/layout/cycle8"/>
+    <dgm:cxn modelId="{850D26A2-D3C8-9B40-93D7-5D3C2943DF57}" type="presOf" srcId="{08344A95-8B0A-4E47-A477-D0A8AB83360D}" destId="{3087B7AD-4D94-8E4E-8B07-FFCFBA15D6D0}" srcOrd="1" destOrd="0" presId="urn:microsoft.com/office/officeart/2005/8/layout/cycle8"/>
+    <dgm:cxn modelId="{22D05CBC-2155-1747-B987-E2811C883785}" type="presOf" srcId="{08344A95-8B0A-4E47-A477-D0A8AB83360D}" destId="{6A04312B-2281-0941-B1AB-8EEA9F6C9B8A}" srcOrd="0" destOrd="0" presId="urn:microsoft.com/office/officeart/2005/8/layout/cycle8"/>
+    <dgm:cxn modelId="{970F21C9-6DA8-C64B-BF65-921FADB6DB40}" type="presOf" srcId="{5FC012F1-C8FF-8D4B-B58F-F70DF0946223}" destId="{C81D0832-08F4-E846-A99C-6A435F888FBC}" srcOrd="0" destOrd="0" presId="urn:microsoft.com/office/officeart/2005/8/layout/cycle8"/>
+    <dgm:cxn modelId="{E3EA2508-4AF2-7840-A674-7E66356B6F69}" type="presOf" srcId="{BBDCF229-FDAC-9F4D-B7A1-25E660E9129F}" destId="{D65FEB02-912E-6242-820D-C62D83F4A838}" srcOrd="0" destOrd="0" presId="urn:microsoft.com/office/officeart/2005/8/layout/cycle8"/>
+    <dgm:cxn modelId="{26520688-5CFB-034A-8FED-56AAA8D37D04}" type="presOf" srcId="{DC719274-2641-0247-8B0A-A11B5AB5552F}" destId="{4A8BCD4A-95C9-A54C-AEB3-5A518C82F73A}" srcOrd="0" destOrd="0" presId="urn:microsoft.com/office/officeart/2005/8/layout/cycle8"/>
+    <dgm:cxn modelId="{ADB3F457-E8A9-8F4A-AAE2-C1C19CAA9DA9}" srcId="{5FC012F1-C8FF-8D4B-B58F-F70DF0946223}" destId="{BBDCF229-FDAC-9F4D-B7A1-25E660E9129F}" srcOrd="0" destOrd="0" parTransId="{38A3F8DA-D1F6-3148-A920-F70764CDB21F}" sibTransId="{217BCEC8-6A5E-5D43-BB75-B3CD8991CA1E}"/>
+    <dgm:cxn modelId="{818D0FD3-BCF3-6C4C-A912-B3E690168193}" srcId="{5FC012F1-C8FF-8D4B-B58F-F70DF0946223}" destId="{08344A95-8B0A-4E47-A477-D0A8AB83360D}" srcOrd="2" destOrd="0" parTransId="{BAA95031-B45D-BF47-9AA0-4EF39AAFEFFC}" sibTransId="{674353D5-F814-844A-AD70-9B9745DA9FAF}"/>
+    <dgm:cxn modelId="{E5911804-E1E4-8249-A72B-074EB268E7EE}" type="presOf" srcId="{DC719274-2641-0247-8B0A-A11B5AB5552F}" destId="{117F250A-50C3-D84F-8A0A-52546FB0ECCF}" srcOrd="1" destOrd="0" presId="urn:microsoft.com/office/officeart/2005/8/layout/cycle8"/>
+    <dgm:cxn modelId="{44A84392-9376-AC47-A18E-5094C363EBAF}" srcId="{5FC012F1-C8FF-8D4B-B58F-F70DF0946223}" destId="{DC719274-2641-0247-8B0A-A11B5AB5552F}" srcOrd="1" destOrd="0" parTransId="{70D79B1A-9B89-5B42-8462-E52DAB48ABEE}" sibTransId="{8DF11653-696E-D04F-941B-0845C96F7F63}"/>
+    <dgm:cxn modelId="{8C23F290-DBB1-3B40-A675-BC08FD983E9E}" type="presParOf" srcId="{C81D0832-08F4-E846-A99C-6A435F888FBC}" destId="{D65FEB02-912E-6242-820D-C62D83F4A838}" srcOrd="0" destOrd="0" presId="urn:microsoft.com/office/officeart/2005/8/layout/cycle8"/>
+    <dgm:cxn modelId="{A4C143AD-0471-364F-B1F2-F54CFB8F62F2}" type="presParOf" srcId="{C81D0832-08F4-E846-A99C-6A435F888FBC}" destId="{670C809E-5E07-DE45-9EEC-CB9512428791}" srcOrd="1" destOrd="0" presId="urn:microsoft.com/office/officeart/2005/8/layout/cycle8"/>
+    <dgm:cxn modelId="{F1563077-142D-AC4A-8D9A-88F4F087BB92}" type="presParOf" srcId="{C81D0832-08F4-E846-A99C-6A435F888FBC}" destId="{DD6390B6-2FD7-5145-8C24-7DE150444E78}" srcOrd="2" destOrd="0" presId="urn:microsoft.com/office/officeart/2005/8/layout/cycle8"/>
+    <dgm:cxn modelId="{C1D47ECC-B461-B042-BBFD-892185CCE595}" type="presParOf" srcId="{C81D0832-08F4-E846-A99C-6A435F888FBC}" destId="{7EF99496-4D36-C949-BDC9-D5A4424B402C}" srcOrd="3" destOrd="0" presId="urn:microsoft.com/office/officeart/2005/8/layout/cycle8"/>
+    <dgm:cxn modelId="{EF4F20E2-953E-B94F-B6DF-F8929052D14D}" type="presParOf" srcId="{C81D0832-08F4-E846-A99C-6A435F888FBC}" destId="{4A8BCD4A-95C9-A54C-AEB3-5A518C82F73A}" srcOrd="4" destOrd="0" presId="urn:microsoft.com/office/officeart/2005/8/layout/cycle8"/>
+    <dgm:cxn modelId="{7B84BA32-C1CF-E241-BEB2-0A6EAA7456F7}" type="presParOf" srcId="{C81D0832-08F4-E846-A99C-6A435F888FBC}" destId="{6210F0FA-E02A-D445-A2D0-A638C7F0EB69}" srcOrd="5" destOrd="0" presId="urn:microsoft.com/office/officeart/2005/8/layout/cycle8"/>
+    <dgm:cxn modelId="{56C2DF26-0DA2-6346-B7F0-F5FCD407E5C2}" type="presParOf" srcId="{C81D0832-08F4-E846-A99C-6A435F888FBC}" destId="{64B3504E-37DB-B140-9484-C012246EFE6E}" srcOrd="6" destOrd="0" presId="urn:microsoft.com/office/officeart/2005/8/layout/cycle8"/>
+    <dgm:cxn modelId="{862AB507-5D33-684C-9B69-4C2D296064BA}" type="presParOf" srcId="{C81D0832-08F4-E846-A99C-6A435F888FBC}" destId="{117F250A-50C3-D84F-8A0A-52546FB0ECCF}" srcOrd="7" destOrd="0" presId="urn:microsoft.com/office/officeart/2005/8/layout/cycle8"/>
+    <dgm:cxn modelId="{6FF33780-D909-BE40-AF87-79AF03F1D6BD}" type="presParOf" srcId="{C81D0832-08F4-E846-A99C-6A435F888FBC}" destId="{6A04312B-2281-0941-B1AB-8EEA9F6C9B8A}" srcOrd="8" destOrd="0" presId="urn:microsoft.com/office/officeart/2005/8/layout/cycle8"/>
+    <dgm:cxn modelId="{9573CC95-98C6-CF47-BC20-6614BC538C8A}" type="presParOf" srcId="{C81D0832-08F4-E846-A99C-6A435F888FBC}" destId="{28119704-DA58-7646-94A1-90449878A2CC}" srcOrd="9" destOrd="0" presId="urn:microsoft.com/office/officeart/2005/8/layout/cycle8"/>
+    <dgm:cxn modelId="{26F383D6-245D-4840-983A-19DA5B50BF07}" type="presParOf" srcId="{C81D0832-08F4-E846-A99C-6A435F888FBC}" destId="{35269331-8C9E-A74C-AEEE-ED0ED637AB82}" srcOrd="10" destOrd="0" presId="urn:microsoft.com/office/officeart/2005/8/layout/cycle8"/>
+    <dgm:cxn modelId="{D03F29F2-58FE-E94C-8888-27CFF000A8E6}" type="presParOf" srcId="{C81D0832-08F4-E846-A99C-6A435F888FBC}" destId="{3087B7AD-4D94-8E4E-8B07-FFCFBA15D6D0}" srcOrd="11" destOrd="0" presId="urn:microsoft.com/office/officeart/2005/8/layout/cycle8"/>
+    <dgm:cxn modelId="{77A91973-3381-5B4B-984C-1BD67B58598A}" type="presParOf" srcId="{C81D0832-08F4-E846-A99C-6A435F888FBC}" destId="{CA8167C4-CE23-EE4C-B7E1-84237A5D1530}" srcOrd="12" destOrd="0" presId="urn:microsoft.com/office/officeart/2005/8/layout/cycle8"/>
+    <dgm:cxn modelId="{CE705632-3713-9245-9DB9-CA3EAD14A624}" type="presParOf" srcId="{C81D0832-08F4-E846-A99C-6A435F888FBC}" destId="{14431848-3409-114C-85BF-1839D9BB2FAA}" srcOrd="13" destOrd="0" presId="urn:microsoft.com/office/officeart/2005/8/layout/cycle8"/>
+    <dgm:cxn modelId="{50A2B8B3-A188-2C4A-BEAB-5015C7EE0E5A}" type="presParOf" srcId="{C81D0832-08F4-E846-A99C-6A435F888FBC}" destId="{E9901D9B-0216-0642-9BDE-9707DDF1033E}" srcOrd="14" destOrd="0" presId="urn:microsoft.com/office/officeart/2005/8/layout/cycle8"/>
+  </dgm:cxnLst>
+  <dgm:bg/>
+  <dgm:whole/>
+  <dgm:extLst>
+    <a:ext uri="http://schemas.microsoft.com/office/drawing/2008/diagram">
+      <dsp:dataModelExt xmlns:dsp="http://schemas.microsoft.com/office/drawing/2008/diagram" relId="rId6" minVer="http://schemas.openxmlformats.org/drawingml/2006/diagram"/>
+    </a:ext>
+  </dgm:extLst>
+</dgm:dataModel>
+</file>
+
+<file path=ppt/diagrams/drawing1.xml><?xml version="1.0" encoding="utf-8"?>
+<dsp:drawing xmlns:dgm="http://schemas.openxmlformats.org/drawingml/2006/diagram" xmlns:dsp="http://schemas.microsoft.com/office/drawing/2008/diagram" xmlns:a="http://schemas.openxmlformats.org/drawingml/2006/main">
+  <dsp:spTree>
+    <dsp:nvGrpSpPr>
+      <dsp:cNvPr id="0" name=""/>
+      <dsp:cNvGrpSpPr/>
+    </dsp:nvGrpSpPr>
+    <dsp:grpSpPr/>
+    <dsp:sp modelId="{D65FEB02-912E-6242-820D-C62D83F4A838}">
+      <dsp:nvSpPr>
+        <dsp:cNvPr id="0" name=""/>
+        <dsp:cNvSpPr/>
+      </dsp:nvSpPr>
+      <dsp:spPr>
+        <a:xfrm>
+          <a:off x="686226" y="356615"/>
+          <a:ext cx="4608576" cy="4608576"/>
+        </a:xfrm>
+        <a:prstGeom prst="pie">
+          <a:avLst>
+            <a:gd name="adj1" fmla="val 16200000"/>
+            <a:gd name="adj2" fmla="val 1800000"/>
+          </a:avLst>
+        </a:prstGeom>
+        <a:gradFill rotWithShape="0">
+          <a:gsLst>
+            <a:gs pos="0">
+              <a:schemeClr val="accent2">
+                <a:hueOff val="0"/>
+                <a:satOff val="0"/>
+                <a:lumOff val="0"/>
+                <a:alphaOff val="0"/>
+                <a:shade val="51000"/>
+                <a:satMod val="130000"/>
+              </a:schemeClr>
+            </a:gs>
+            <a:gs pos="80000">
+              <a:schemeClr val="accent2">
+                <a:hueOff val="0"/>
+                <a:satOff val="0"/>
+                <a:lumOff val="0"/>
+                <a:alphaOff val="0"/>
+                <a:shade val="93000"/>
+                <a:satMod val="130000"/>
+              </a:schemeClr>
+            </a:gs>
+            <a:gs pos="100000">
+              <a:schemeClr val="accent2">
+                <a:hueOff val="0"/>
+                <a:satOff val="0"/>
+                <a:lumOff val="0"/>
+                <a:alphaOff val="0"/>
+                <a:shade val="94000"/>
+                <a:satMod val="135000"/>
+              </a:schemeClr>
+            </a:gs>
+          </a:gsLst>
+          <a:lin ang="16200000" scaled="0"/>
+        </a:gradFill>
+        <a:ln>
+          <a:noFill/>
+        </a:ln>
+        <a:effectLst>
+          <a:outerShdw blurRad="40000" dist="23000" dir="5400000" rotWithShape="0">
+            <a:srgbClr val="000000">
+              <a:alpha val="35000"/>
+            </a:srgbClr>
+          </a:outerShdw>
+        </a:effectLst>
+      </dsp:spPr>
+      <dsp:style>
+        <a:lnRef idx="0">
+          <a:scrgbClr r="0" g="0" b="0"/>
+        </a:lnRef>
+        <a:fillRef idx="3">
+          <a:scrgbClr r="0" g="0" b="0"/>
+        </a:fillRef>
+        <a:effectRef idx="2">
+          <a:scrgbClr r="0" g="0" b="0"/>
+        </a:effectRef>
+        <a:fontRef idx="minor">
+          <a:schemeClr val="lt1"/>
+        </a:fontRef>
+      </dsp:style>
+      <dsp:txBody>
+        <a:bodyPr spcFirstLastPara="0" vert="horz" wrap="square" lIns="36830" tIns="36830" rIns="36830" bIns="36830" numCol="1" spcCol="1270" anchor="ctr" anchorCtr="0">
+          <a:noAutofit/>
+        </a:bodyPr>
+        <a:lstStyle/>
+        <a:p>
+          <a:pPr lvl="0" algn="ctr" defTabSz="1289050">
+            <a:lnSpc>
+              <a:spcPct val="90000"/>
+            </a:lnSpc>
+            <a:spcBef>
+              <a:spcPct val="0"/>
+            </a:spcBef>
+            <a:spcAft>
+              <a:spcPct val="35000"/>
+            </a:spcAft>
+          </a:pPr>
+          <a:r>
+            <a:rPr lang="en-US" sz="2900" kern="1200" dirty="0" smtClean="0"/>
+            <a:t>Associates</a:t>
+          </a:r>
+          <a:endParaRPr lang="en-US" sz="2900" kern="1200" dirty="0"/>
+        </a:p>
+      </dsp:txBody>
+      <dsp:txXfrm>
+        <a:off x="3115056" y="1333195"/>
+        <a:ext cx="1645920" cy="1371600"/>
+      </dsp:txXfrm>
+    </dsp:sp>
+    <dsp:sp modelId="{4A8BCD4A-95C9-A54C-AEB3-5A518C82F73A}">
+      <dsp:nvSpPr>
+        <dsp:cNvPr id="0" name=""/>
+        <dsp:cNvSpPr/>
+      </dsp:nvSpPr>
+      <dsp:spPr>
+        <a:xfrm>
+          <a:off x="638319" y="447885"/>
+          <a:ext cx="4608576" cy="4608576"/>
+        </a:xfrm>
+        <a:prstGeom prst="pie">
+          <a:avLst>
+            <a:gd name="adj1" fmla="val 1800000"/>
+            <a:gd name="adj2" fmla="val 9000000"/>
+          </a:avLst>
+        </a:prstGeom>
+        <a:gradFill rotWithShape="0">
+          <a:gsLst>
+            <a:gs pos="0">
+              <a:schemeClr val="accent3">
+                <a:hueOff val="0"/>
+                <a:satOff val="0"/>
+                <a:lumOff val="0"/>
+                <a:alphaOff val="0"/>
+                <a:shade val="51000"/>
+                <a:satMod val="130000"/>
+              </a:schemeClr>
+            </a:gs>
+            <a:gs pos="80000">
+              <a:schemeClr val="accent3">
+                <a:hueOff val="0"/>
+                <a:satOff val="0"/>
+                <a:lumOff val="0"/>
+                <a:alphaOff val="0"/>
+                <a:shade val="93000"/>
+                <a:satMod val="130000"/>
+              </a:schemeClr>
+            </a:gs>
+            <a:gs pos="100000">
+              <a:schemeClr val="accent3">
+                <a:hueOff val="0"/>
+                <a:satOff val="0"/>
+                <a:lumOff val="0"/>
+                <a:alphaOff val="0"/>
+                <a:shade val="94000"/>
+                <a:satMod val="135000"/>
+              </a:schemeClr>
+            </a:gs>
+          </a:gsLst>
+          <a:lin ang="16200000" scaled="0"/>
+        </a:gradFill>
+        <a:ln>
+          <a:noFill/>
+        </a:ln>
+        <a:effectLst>
+          <a:outerShdw blurRad="40000" dist="23000" dir="5400000" rotWithShape="0">
+            <a:srgbClr val="000000">
+              <a:alpha val="35000"/>
+            </a:srgbClr>
+          </a:outerShdw>
+        </a:effectLst>
+      </dsp:spPr>
+      <dsp:style>
+        <a:lnRef idx="0">
+          <a:scrgbClr r="0" g="0" b="0"/>
+        </a:lnRef>
+        <a:fillRef idx="3">
+          <a:scrgbClr r="0" g="0" b="0"/>
+        </a:fillRef>
+        <a:effectRef idx="2">
+          <a:scrgbClr r="0" g="0" b="0"/>
+        </a:effectRef>
+        <a:fontRef idx="minor">
+          <a:schemeClr val="lt1"/>
+        </a:fontRef>
+      </dsp:style>
+      <dsp:txBody>
+        <a:bodyPr spcFirstLastPara="0" vert="horz" wrap="square" lIns="36830" tIns="36830" rIns="36830" bIns="36830" numCol="1" spcCol="1270" anchor="ctr" anchorCtr="0">
+          <a:noAutofit/>
+        </a:bodyPr>
+        <a:lstStyle/>
+        <a:p>
+          <a:pPr lvl="0" algn="ctr" defTabSz="1289050">
+            <a:lnSpc>
+              <a:spcPct val="90000"/>
+            </a:lnSpc>
+            <a:spcBef>
+              <a:spcPct val="0"/>
+            </a:spcBef>
+            <a:spcAft>
+              <a:spcPct val="35000"/>
+            </a:spcAft>
+          </a:pPr>
+          <a:r>
+            <a:rPr lang="en-US" sz="2900" kern="1200" dirty="0" smtClean="0"/>
+            <a:t>You</a:t>
+          </a:r>
+          <a:endParaRPr lang="en-US" sz="2900" kern="1200" dirty="0"/>
+        </a:p>
+      </dsp:txBody>
+      <dsp:txXfrm>
+        <a:off x="1735599" y="3437973"/>
+        <a:ext cx="2468880" cy="1207008"/>
+      </dsp:txXfrm>
+    </dsp:sp>
+    <dsp:sp modelId="{6A04312B-2281-0941-B1AB-8EEA9F6C9B8A}">
+      <dsp:nvSpPr>
+        <dsp:cNvPr id="0" name=""/>
+        <dsp:cNvSpPr/>
+      </dsp:nvSpPr>
+      <dsp:spPr>
+        <a:xfrm>
+          <a:off x="531468" y="356615"/>
+          <a:ext cx="4608576" cy="4608576"/>
+        </a:xfrm>
+        <a:prstGeom prst="pie">
+          <a:avLst>
+            <a:gd name="adj1" fmla="val 9000000"/>
+            <a:gd name="adj2" fmla="val 16200000"/>
+          </a:avLst>
+        </a:prstGeom>
+        <a:gradFill rotWithShape="0">
+          <a:gsLst>
+            <a:gs pos="0">
+              <a:schemeClr val="accent4">
+                <a:hueOff val="0"/>
+                <a:satOff val="0"/>
+                <a:lumOff val="0"/>
+                <a:alphaOff val="0"/>
+                <a:shade val="51000"/>
+                <a:satMod val="130000"/>
+              </a:schemeClr>
+            </a:gs>
+            <a:gs pos="80000">
+              <a:schemeClr val="accent4">
+                <a:hueOff val="0"/>
+                <a:satOff val="0"/>
+                <a:lumOff val="0"/>
+                <a:alphaOff val="0"/>
+                <a:shade val="93000"/>
+                <a:satMod val="130000"/>
+              </a:schemeClr>
+            </a:gs>
+            <a:gs pos="100000">
+              <a:schemeClr val="accent4">
+                <a:hueOff val="0"/>
+                <a:satOff val="0"/>
+                <a:lumOff val="0"/>
+                <a:alphaOff val="0"/>
+                <a:shade val="94000"/>
+                <a:satMod val="135000"/>
+              </a:schemeClr>
+            </a:gs>
+          </a:gsLst>
+          <a:lin ang="16200000" scaled="0"/>
+        </a:gradFill>
+        <a:ln>
+          <a:noFill/>
+        </a:ln>
+        <a:effectLst>
+          <a:outerShdw blurRad="40000" dist="23000" dir="5400000" rotWithShape="0">
+            <a:srgbClr val="000000">
+              <a:alpha val="35000"/>
+            </a:srgbClr>
+          </a:outerShdw>
+        </a:effectLst>
+      </dsp:spPr>
+      <dsp:style>
+        <a:lnRef idx="0">
+          <a:scrgbClr r="0" g="0" b="0"/>
+        </a:lnRef>
+        <a:fillRef idx="3">
+          <a:scrgbClr r="0" g="0" b="0"/>
+        </a:fillRef>
+        <a:effectRef idx="2">
+          <a:scrgbClr r="0" g="0" b="0"/>
+        </a:effectRef>
+        <a:fontRef idx="minor">
+          <a:schemeClr val="lt1"/>
+        </a:fontRef>
+      </dsp:style>
+      <dsp:txBody>
+        <a:bodyPr spcFirstLastPara="0" vert="horz" wrap="square" lIns="36830" tIns="36830" rIns="36830" bIns="36830" numCol="1" spcCol="1270" anchor="ctr" anchorCtr="0">
+          <a:noAutofit/>
+        </a:bodyPr>
+        <a:lstStyle/>
+        <a:p>
+          <a:pPr lvl="0" algn="ctr" defTabSz="1289050">
+            <a:lnSpc>
+              <a:spcPct val="90000"/>
+            </a:lnSpc>
+            <a:spcBef>
+              <a:spcPct val="0"/>
+            </a:spcBef>
+            <a:spcAft>
+              <a:spcPct val="35000"/>
+            </a:spcAft>
+          </a:pPr>
+          <a:r>
+            <a:rPr lang="en-US" sz="2900" kern="1200" dirty="0" smtClean="0"/>
+            <a:t>Business</a:t>
+          </a:r>
+          <a:endParaRPr lang="en-US" sz="2900" kern="1200" dirty="0"/>
+        </a:p>
+      </dsp:txBody>
+      <dsp:txXfrm>
+        <a:off x="1065295" y="1333195"/>
+        <a:ext cx="1645920" cy="1371600"/>
+      </dsp:txXfrm>
+    </dsp:sp>
+    <dsp:sp modelId="{CA8167C4-CE23-EE4C-B7E1-84237A5D1530}">
+      <dsp:nvSpPr>
+        <dsp:cNvPr id="0" name=""/>
+        <dsp:cNvSpPr/>
+      </dsp:nvSpPr>
+      <dsp:spPr>
+        <a:xfrm>
+          <a:off x="401314" y="71323"/>
+          <a:ext cx="5179161" cy="5179161"/>
+        </a:xfrm>
+        <a:prstGeom prst="circularArrow">
+          <a:avLst>
+            <a:gd name="adj1" fmla="val 5085"/>
+            <a:gd name="adj2" fmla="val 327528"/>
+            <a:gd name="adj3" fmla="val 1472472"/>
+            <a:gd name="adj4" fmla="val 16199432"/>
+            <a:gd name="adj5" fmla="val 5932"/>
+          </a:avLst>
+        </a:prstGeom>
+        <a:gradFill rotWithShape="0">
+          <a:gsLst>
+            <a:gs pos="0">
+              <a:schemeClr val="accent2">
+                <a:hueOff val="0"/>
+                <a:satOff val="0"/>
+                <a:lumOff val="0"/>
+                <a:alphaOff val="0"/>
+                <a:shade val="51000"/>
+                <a:satMod val="130000"/>
+              </a:schemeClr>
+            </a:gs>
+            <a:gs pos="80000">
+              <a:schemeClr val="accent2">
+                <a:hueOff val="0"/>
+                <a:satOff val="0"/>
+                <a:lumOff val="0"/>
+                <a:alphaOff val="0"/>
+                <a:shade val="93000"/>
+                <a:satMod val="130000"/>
+              </a:schemeClr>
+            </a:gs>
+            <a:gs pos="100000">
+              <a:schemeClr val="accent2">
+                <a:hueOff val="0"/>
+                <a:satOff val="0"/>
+                <a:lumOff val="0"/>
+                <a:alphaOff val="0"/>
+                <a:shade val="94000"/>
+                <a:satMod val="135000"/>
+              </a:schemeClr>
+            </a:gs>
+          </a:gsLst>
+          <a:lin ang="16200000" scaled="0"/>
+        </a:gradFill>
+        <a:ln>
+          <a:noFill/>
+        </a:ln>
+        <a:effectLst>
+          <a:outerShdw blurRad="40000" dist="23000" dir="5400000" rotWithShape="0">
+            <a:srgbClr val="000000">
+              <a:alpha val="35000"/>
+            </a:srgbClr>
+          </a:outerShdw>
+        </a:effectLst>
+      </dsp:spPr>
+      <dsp:style>
+        <a:lnRef idx="0">
+          <a:scrgbClr r="0" g="0" b="0"/>
+        </a:lnRef>
+        <a:fillRef idx="3">
+          <a:scrgbClr r="0" g="0" b="0"/>
+        </a:fillRef>
+        <a:effectRef idx="2">
+          <a:scrgbClr r="0" g="0" b="0"/>
+        </a:effectRef>
+        <a:fontRef idx="minor">
+          <a:schemeClr val="lt1"/>
+        </a:fontRef>
+      </dsp:style>
+    </dsp:sp>
+    <dsp:sp modelId="{14431848-3409-114C-85BF-1839D9BB2FAA}">
+      <dsp:nvSpPr>
+        <dsp:cNvPr id="0" name=""/>
+        <dsp:cNvSpPr/>
+      </dsp:nvSpPr>
+      <dsp:spPr>
+        <a:xfrm>
+          <a:off x="353026" y="162301"/>
+          <a:ext cx="5179161" cy="5179161"/>
+        </a:xfrm>
+        <a:prstGeom prst="circularArrow">
+          <a:avLst>
+            <a:gd name="adj1" fmla="val 5085"/>
+            <a:gd name="adj2" fmla="val 327528"/>
+            <a:gd name="adj3" fmla="val 8671970"/>
+            <a:gd name="adj4" fmla="val 1800502"/>
+            <a:gd name="adj5" fmla="val 5932"/>
+          </a:avLst>
+        </a:prstGeom>
+        <a:gradFill rotWithShape="0">
+          <a:gsLst>
+            <a:gs pos="0">
+              <a:schemeClr val="accent3">
+                <a:hueOff val="0"/>
+                <a:satOff val="0"/>
+                <a:lumOff val="0"/>
+                <a:alphaOff val="0"/>
+                <a:shade val="51000"/>
+                <a:satMod val="130000"/>
+              </a:schemeClr>
+            </a:gs>
+            <a:gs pos="80000">
+              <a:schemeClr val="accent3">
+                <a:hueOff val="0"/>
+                <a:satOff val="0"/>
+                <a:lumOff val="0"/>
+                <a:alphaOff val="0"/>
+                <a:shade val="93000"/>
+                <a:satMod val="130000"/>
+              </a:schemeClr>
+            </a:gs>
+            <a:gs pos="100000">
+              <a:schemeClr val="accent3">
+                <a:hueOff val="0"/>
+                <a:satOff val="0"/>
+                <a:lumOff val="0"/>
+                <a:alphaOff val="0"/>
+                <a:shade val="94000"/>
+                <a:satMod val="135000"/>
+              </a:schemeClr>
+            </a:gs>
+          </a:gsLst>
+          <a:lin ang="16200000" scaled="0"/>
+        </a:gradFill>
+        <a:ln>
+          <a:noFill/>
+        </a:ln>
+        <a:effectLst>
+          <a:outerShdw blurRad="40000" dist="23000" dir="5400000" rotWithShape="0">
+            <a:srgbClr val="000000">
+              <a:alpha val="35000"/>
+            </a:srgbClr>
+          </a:outerShdw>
+        </a:effectLst>
+      </dsp:spPr>
+      <dsp:style>
+        <a:lnRef idx="0">
+          <a:scrgbClr r="0" g="0" b="0"/>
+        </a:lnRef>
+        <a:fillRef idx="3">
+          <a:scrgbClr r="0" g="0" b="0"/>
+        </a:fillRef>
+        <a:effectRef idx="2">
+          <a:scrgbClr r="0" g="0" b="0"/>
+        </a:effectRef>
+        <a:fontRef idx="minor">
+          <a:schemeClr val="lt1"/>
+        </a:fontRef>
+      </dsp:style>
+    </dsp:sp>
+    <dsp:sp modelId="{E9901D9B-0216-0642-9BDE-9707DDF1033E}">
+      <dsp:nvSpPr>
+        <dsp:cNvPr id="0" name=""/>
+        <dsp:cNvSpPr/>
+      </dsp:nvSpPr>
+      <dsp:spPr>
+        <a:xfrm>
+          <a:off x="245795" y="71323"/>
+          <a:ext cx="5179161" cy="5179161"/>
+        </a:xfrm>
+        <a:prstGeom prst="circularArrow">
+          <a:avLst>
+            <a:gd name="adj1" fmla="val 5085"/>
+            <a:gd name="adj2" fmla="val 327528"/>
+            <a:gd name="adj3" fmla="val 15873039"/>
+            <a:gd name="adj4" fmla="val 9000000"/>
+            <a:gd name="adj5" fmla="val 5932"/>
+          </a:avLst>
+        </a:prstGeom>
+        <a:gradFill rotWithShape="0">
+          <a:gsLst>
+            <a:gs pos="0">
+              <a:schemeClr val="accent4">
+                <a:hueOff val="0"/>
+                <a:satOff val="0"/>
+                <a:lumOff val="0"/>
+                <a:alphaOff val="0"/>
+                <a:shade val="51000"/>
+                <a:satMod val="130000"/>
+              </a:schemeClr>
+            </a:gs>
+            <a:gs pos="80000">
+              <a:schemeClr val="accent4">
+                <a:hueOff val="0"/>
+                <a:satOff val="0"/>
+                <a:lumOff val="0"/>
+                <a:alphaOff val="0"/>
+                <a:shade val="93000"/>
+                <a:satMod val="130000"/>
+              </a:schemeClr>
+            </a:gs>
+            <a:gs pos="100000">
+              <a:schemeClr val="accent4">
+                <a:hueOff val="0"/>
+                <a:satOff val="0"/>
+                <a:lumOff val="0"/>
+                <a:alphaOff val="0"/>
+                <a:shade val="94000"/>
+                <a:satMod val="135000"/>
+              </a:schemeClr>
+            </a:gs>
+          </a:gsLst>
+          <a:lin ang="16200000" scaled="0"/>
+        </a:gradFill>
+        <a:ln>
+          <a:noFill/>
+        </a:ln>
+        <a:effectLst>
+          <a:outerShdw blurRad="40000" dist="23000" dir="5400000" rotWithShape="0">
+            <a:srgbClr val="000000">
+              <a:alpha val="35000"/>
+            </a:srgbClr>
+          </a:outerShdw>
+        </a:effectLst>
+      </dsp:spPr>
+      <dsp:style>
+        <a:lnRef idx="0">
+          <a:scrgbClr r="0" g="0" b="0"/>
+        </a:lnRef>
+        <a:fillRef idx="3">
+          <a:scrgbClr r="0" g="0" b="0"/>
+        </a:fillRef>
+        <a:effectRef idx="2">
+          <a:scrgbClr r="0" g="0" b="0"/>
+        </a:effectRef>
+        <a:fontRef idx="minor">
+          <a:schemeClr val="lt1"/>
+        </a:fontRef>
+      </dsp:style>
+    </dsp:sp>
+  </dsp:spTree>
+</dsp:drawing>
+</file>
+
+<file path=ppt/diagrams/layout1.xml><?xml version="1.0" encoding="utf-8"?>
+<dgm:layoutDef xmlns:dgm="http://schemas.openxmlformats.org/drawingml/2006/diagram" xmlns:a="http://schemas.openxmlformats.org/drawingml/2006/main" uniqueId="urn:microsoft.com/office/officeart/2005/8/layout/cycle8">
+  <dgm:title val=""/>
+  <dgm:desc val=""/>
+  <dgm:catLst>
+    <dgm:cat type="cycle" pri="7000"/>
+  </dgm:catLst>
+  <dgm:sampData useDef="1">
+    <dgm:dataModel>
+      <dgm:ptLst/>
+      <dgm:bg/>
+      <dgm:whole/>
+    </dgm:dataModel>
+  </dgm:sampData>
+  <dgm:styleData useDef="1">
+    <dgm:dataModel>
+      <dgm:ptLst/>
+      <dgm:bg/>
+      <dgm:whole/>
+    </dgm:dataModel>
+  </dgm:styleData>
+  <dgm:clrData>
+    <dgm:dataModel>
+      <dgm:ptLst>
+        <dgm:pt modelId="0" type="doc"/>
+        <dgm:pt modelId="1"/>
+        <dgm:pt modelId="2"/>
+        <dgm:pt modelId="3"/>
+        <dgm:pt modelId="4"/>
+        <dgm:pt modelId="5"/>
+      </dgm:ptLst>
+      <dgm:cxnLst>
+        <dgm:cxn modelId="7" srcId="0" destId="1" srcOrd="0" destOrd="0"/>
+        <dgm:cxn modelId="8" srcId="0" destId="2" srcOrd="1" destOrd="0"/>
+        <dgm:cxn modelId="9" srcId="0" destId="3" srcOrd="2" destOrd="0"/>
+        <dgm:cxn modelId="10" srcId="0" destId="4" srcOrd="3" destOrd="0"/>
+        <dgm:cxn modelId="11" srcId="0" destId="5" srcOrd="4" destOrd="0"/>
+      </dgm:cxnLst>
+      <dgm:bg/>
+      <dgm:whole/>
+    </dgm:dataModel>
+  </dgm:clrData>
+  <dgm:layoutNode name="compositeShape">
+    <dgm:varLst>
+      <dgm:chMax val="7"/>
+      <dgm:dir/>
+      <dgm:resizeHandles val="exact"/>
+    </dgm:varLst>
+    <dgm:alg type="composite">
+      <dgm:param type="horzAlign" val="ctr"/>
+      <dgm:param type="vertAlign" val="mid"/>
+      <dgm:param type="ar" val="1"/>
+    </dgm:alg>
+    <dgm:shape xmlns:r="http://schemas.openxmlformats.org/officeDocument/2006/relationships" r:blip="">
+      <dgm:adjLst/>
+    </dgm:shape>
+    <dgm:presOf/>
+    <dgm:choose name="Name0">
+      <dgm:if name="Name1" axis="ch" ptType="node" func="cnt" op="equ" val="1">
+        <dgm:constrLst>
+          <dgm:constr type="l" for="ch" forName="wedge1" refType="w" fact="0.08"/>
+          <dgm:constr type="t" for="ch" forName="wedge1" refType="w" fact="0.08"/>
+          <dgm:constr type="w" for="ch" forName="wedge1" refType="w" fact="0.84"/>
+          <dgm:constr type="h" for="ch" forName="wedge1" refType="h" fact="0.84"/>
+          <dgm:constr type="l" for="ch" forName="dummy1a" refType="w" fact="0.5"/>
+          <dgm:constr type="t" for="ch" forName="dummy1a" refType="h" fact="0.08"/>
+          <dgm:constr type="l" for="ch" forName="dummy1b" refType="w" fact="0.5"/>
+          <dgm:constr type="t" for="ch" forName="dummy1b" refType="h" fact="0.08"/>
+          <dgm:constr type="l" for="ch" forName="wedge1Tx" refType="w" fact="0.22"/>
+          <dgm:constr type="t" for="ch" forName="wedge1Tx" refType="h" fact="0.22"/>
+          <dgm:constr type="w" for="ch" forName="wedge1Tx" refType="w" fact="0.56"/>
+          <dgm:constr type="h" for="ch" forName="wedge1Tx" refType="h" fact="0.56"/>
+          <dgm:constr type="h" for="ch" forName="arrowWedge1single" refType="w" fact="0.08"/>
+          <dgm:constr type="diam" for="ch" forName="arrowWedge1single" refType="w" fact="0.84"/>
+          <dgm:constr type="l" for="ch" forName="arrowWedge1single" refType="w" fact="0.5"/>
+          <dgm:constr type="t" for="ch" forName="arrowWedge1single" refType="w" fact="0.5"/>
+          <dgm:constr type="primFontSz" for="ch" ptType="node" op="equ"/>
+        </dgm:constrLst>
+      </dgm:if>
+      <dgm:if name="Name2" axis="ch" ptType="node" func="cnt" op="equ" val="2">
+        <dgm:constrLst>
+          <dgm:constr type="l" for="ch" forName="wedge1" refType="w" fact="0.1"/>
+          <dgm:constr type="t" for="ch" forName="wedge1" refType="w" fact="0.08"/>
+          <dgm:constr type="w" for="ch" forName="wedge1" refType="w" fact="0.84"/>
+          <dgm:constr type="h" for="ch" forName="wedge1" refType="h" fact="0.84"/>
+          <dgm:constr type="l" for="ch" forName="dummy1a" refType="w" fact="0.52"/>
+          <dgm:constr type="t" for="ch" forName="dummy1a" refType="h" fact="0.08"/>
+          <dgm:constr type="l" for="ch" forName="dummy1b" refType="w" fact="0.52"/>
+          <dgm:constr type="t" for="ch" forName="dummy1b" refType="h" fact="0.92"/>
+          <dgm:constr type="l" for="ch" forName="wedge1Tx" refType="w" fact="0.559"/>
+          <dgm:constr type="t" for="ch" forName="wedge1Tx" refType="h" fact="0.3"/>
+          <dgm:constr type="w" for="ch" forName="wedge1Tx" refType="w" fact="0.3"/>
+          <dgm:constr type="h" for="ch" forName="wedge1Tx" refType="h" fact="0.4"/>
+          <dgm:constr type="l" for="ch" forName="wedge2" refType="w" fact="0.06"/>
+          <dgm:constr type="t" for="ch" forName="wedge2" refType="w" fact="0.08"/>
+          <dgm:constr type="w" for="ch" forName="wedge2" refType="w" fact="0.84"/>
+          <dgm:constr type="h" for="ch" forName="wedge2" refType="h" fact="0.84"/>
+          <dgm:constr type="l" for="ch" forName="dummy2a" refType="w" fact="0.48"/>
+          <dgm:constr type="t" for="ch" forName="dummy2a" refType="h" fact="0.92"/>
+          <dgm:constr type="l" for="ch" forName="dummy2b" refType="w" fact="0.48"/>
+          <dgm:constr type="t" for="ch" forName="dummy2b" refType="h" fact="0.08"/>
+          <dgm:constr type="r" for="ch" forName="wedge2Tx" refType="w" fact="0.441"/>
+          <dgm:constr type="t" for="ch" forName="wedge2Tx" refType="h" fact="0.3"/>
+          <dgm:constr type="w" for="ch" forName="wedge2Tx" refType="w" fact="0.3"/>
+          <dgm:constr type="h" for="ch" forName="wedge2Tx" refType="h" fact="0.4"/>
+          <dgm:constr type="h" for="ch" forName="arrowWedge1" refType="w" fact="0.08"/>
+          <dgm:constr type="diam" for="ch" forName="arrowWedge1" refType="w" fact="0.84"/>
+          <dgm:constr type="l" for="ch" forName="arrowWedge1" refType="w" fact="0.5"/>
+          <dgm:constr type="t" for="ch" forName="arrowWedge1" refType="w" fact="0.5"/>
+          <dgm:constr type="h" for="ch" forName="arrowWedge2" refType="w" fact="0.08"/>
+          <dgm:constr type="diam" for="ch" forName="arrowWedge2" refType="w" fact="0.84"/>
+          <dgm:constr type="l" for="ch" forName="arrowWedge2" refType="w" fact="0.5"/>
+          <dgm:constr type="t" for="ch" forName="arrowWedge2" refType="w" fact="0.5"/>
+          <dgm:constr type="primFontSz" for="ch" ptType="node" op="equ"/>
+        </dgm:constrLst>
+      </dgm:if>
+      <dgm:if name="Name3" axis="ch" ptType="node" func="cnt" op="equ" val="3">
+        <dgm:constrLst>
+          <dgm:constr type="l" for="ch" forName="wedge1" refType="w" fact="0.0973"/>
+          <dgm:constr type="t" for="ch" forName="wedge1" refType="w" fact="0.07"/>
+          <dgm:constr type="w" for="ch" forName="wedge1" refType="w" fact="0.84"/>
+          <dgm:constr type="h" for="ch" forName="wedge1" refType="h" fact="0.84"/>
+          <dgm:constr type="l" for="ch" forName="dummy1a" refType="w" fact="0.5173"/>
+          <dgm:constr type="t" for="ch" forName="dummy1a" refType="h" fact="0.07"/>
+          <dgm:constr type="l" for="ch" forName="dummy1b" refType="w" fact="0.8811"/>
+          <dgm:constr type="t" for="ch" forName="dummy1b" refType="h" fact="0.7"/>
+          <dgm:constr type="l" for="ch" forName="wedge1Tx" refType="w" fact="0.54"/>
+          <dgm:constr type="t" for="ch" forName="wedge1Tx" refType="h" fact="0.248"/>
+          <dgm:constr type="w" for="ch" forName="wedge1Tx" refType="w" fact="0.3"/>
+          <dgm:constr type="h" for="ch" forName="wedge1Tx" refType="h" fact="0.25"/>
+          <dgm:constr type="l" for="ch" forName="wedge2" refType="w" fact="0.08"/>
+          <dgm:constr type="t" for="ch" forName="wedge2" refType="w" fact="0.1"/>
+          <dgm:constr type="w" for="ch" forName="wedge2" refType="w" fact="0.84"/>
+          <dgm:constr type="h" for="ch" forName="wedge2" refType="h" fact="0.84"/>
+          <dgm:constr type="l" for="ch" forName="dummy2a" refType="w" fact="0.8637"/>
+          <dgm:constr type="t" for="ch" forName="dummy2a" refType="h" fact="0.73"/>
+          <dgm:constr type="l" for="ch" forName="dummy2b" refType="w" fact="0.1363"/>
+          <dgm:constr type="t" for="ch" forName="dummy2b" refType="h" fact="0.73"/>
+          <dgm:constr type="l" for="ch" forName="wedge2Tx" refType="w" fact="0.28"/>
+          <dgm:constr type="t" for="ch" forName="wedge2Tx" refType="h" fact="0.645"/>
+          <dgm:constr type="w" for="ch" forName="wedge2Tx" refType="w" fact="0.45"/>
+          <dgm:constr type="h" for="ch" forName="wedge2Tx" refType="h" fact="0.22"/>
+          <dgm:constr type="l" for="ch" forName="wedge3" refType="w" fact="0.0627"/>
+          <dgm:constr type="t" for="ch" forName="wedge3" refType="w" fact="0.07"/>
+          <dgm:constr type="w" for="ch" forName="wedge3" refType="w" fact="0.84"/>
+          <dgm:constr type="h" for="ch" forName="wedge3" refType="h" fact="0.84"/>
+          <dgm:constr type="l" for="ch" forName="dummy3a" refType="w" fact="0.1189"/>
+          <dgm:constr type="t" for="ch" forName="dummy3a" refType="h" fact="0.7"/>
+          <dgm:constr type="l" for="ch" forName="dummy3b" refType="w" fact="0.4827"/>
+          <dgm:constr type="t" for="ch" forName="dummy3b" refType="h" fact="0.07"/>
+          <dgm:constr type="r" for="ch" forName="wedge3Tx" refType="w" fact="0.46"/>
+          <dgm:constr type="t" for="ch" forName="wedge3Tx" refType="h" fact="0.248"/>
+          <dgm:constr type="w" for="ch" forName="wedge3Tx" refType="w" fact="0.3"/>
+          <dgm:constr type="h" for="ch" forName="wedge3Tx" refType="h" fact="0.25"/>
+          <dgm:constr type="h" for="ch" forName="arrowWedge1" refType="w" fact="0.08"/>
+          <dgm:constr type="diam" for="ch" forName="arrowWedge1" refType="w" fact="0.84"/>
+          <dgm:constr type="l" for="ch" forName="arrowWedge1" refType="w" fact="0.5"/>
+          <dgm:constr type="t" for="ch" forName="arrowWedge1" refType="w" fact="0.5"/>
+          <dgm:constr type="h" for="ch" forName="arrowWedge2" refType="w" fact="0.08"/>
+          <dgm:constr type="diam" for="ch" forName="arrowWedge2" refType="w" fact="0.84"/>
+          <dgm:constr type="l" for="ch" forName="arrowWedge2" refType="w" fact="0.5"/>
+          <dgm:constr type="t" for="ch" forName="arrowWedge2" refType="w" fact="0.5"/>
+          <dgm:constr type="h" for="ch" forName="arrowWedge3" refType="w" fact="0.08"/>
+          <dgm:constr type="diam" for="ch" forName="arrowWedge3" refType="w" fact="0.84"/>
+          <dgm:constr type="l" for="ch" forName="arrowWedge3" refType="w" fact="0.5"/>
+          <dgm:constr type="t" for="ch" forName="arrowWedge3" refType="w" fact="0.5"/>
+          <dgm:constr type="primFontSz" for="ch" ptType="node" op="equ"/>
+        </dgm:constrLst>
+      </dgm:if>
+      <dgm:if name="Name4" axis="ch" ptType="node" func="cnt" op="equ" val="4">
+        <dgm:constrLst>
+          <dgm:constr type="l" for="ch" forName="wedge1" refType="w" fact="0.0941"/>
+          <dgm:constr type="t" for="ch" forName="wedge1" refType="w" fact="0.0659"/>
+          <dgm:constr type="w" for="ch" forName="wedge1" refType="w" fact="0.84"/>
+          <dgm:constr type="h" for="ch" forName="wedge1" refType="h" fact="0.84"/>
+          <dgm:constr type="l" for="ch" forName="dummy1a" refType="w" fact="0.5141"/>
+          <dgm:constr type="t" for="ch" forName="dummy1a" refType="h" fact="0.0659"/>
+          <dgm:constr type="l" for="ch" forName="dummy1b" refType="w" fact="0.9341"/>
+          <dgm:constr type="t" for="ch" forName="dummy1b" refType="h" fact="0.4859"/>
+          <dgm:constr type="l" for="ch" forName="wedge1Tx" refType="w" fact="0.54"/>
+          <dgm:constr type="t" for="ch" forName="wedge1Tx" refType="h" fact="0.24"/>
+          <dgm:constr type="w" for="ch" forName="wedge1Tx" refType="w" fact="0.31"/>
+          <dgm:constr type="h" for="ch" forName="wedge1Tx" refType="h" fact="0.23"/>
+          <dgm:constr type="l" for="ch" forName="wedge2" refType="w" fact="0.0941"/>
+          <dgm:constr type="t" for="ch" forName="wedge2" refType="w" fact="0.0941"/>
+          <dgm:constr type="w" for="ch" forName="wedge2" refType="w" fact="0.84"/>
+          <dgm:constr type="h" for="ch" forName="wedge2" refType="h" fact="0.84"/>
+          <dgm:constr type="l" for="ch" forName="dummy2a" refType="w" fact="0.9341"/>
+          <dgm:constr type="t" for="ch" forName="dummy2a" refType="h" fact="0.5141"/>
+          <dgm:constr type="l" for="ch" forName="dummy2b" refType="w" fact="0.5141"/>
+          <dgm:constr type="t" for="ch" forName="dummy2b" refType="h" fact="0.9341"/>
+          <dgm:constr type="l" for="ch" forName="wedge2Tx" refType="w" fact="0.54"/>
+          <dgm:constr type="t" for="ch" forName="wedge2Tx" refType="h" fact="0.53"/>
+          <dgm:constr type="w" for="ch" forName="wedge2Tx" refType="w" fact="0.31"/>
+          <dgm:constr type="h" for="ch" forName="wedge2Tx" refType="h" fact="0.23"/>
+          <dgm:constr type="l" for="ch" forName="wedge3" refType="w" fact="0.0659"/>
+          <dgm:constr type="t" for="ch" forName="wedge3" refType="w" fact="0.0941"/>
+          <dgm:constr type="w" for="ch" forName="wedge3" refType="w" fact="0.84"/>
+          <dgm:constr type="h" for="ch" forName="wedge3" refType="h" fact="0.84"/>
+          <dgm:constr type="l" for="ch" forName="dummy3a" refType="w" fact="0.4859"/>
+          <dgm:constr type="t" for="ch" forName="dummy3a" refType="h" fact="0.9341"/>
+          <dgm:constr type="l" for="ch" forName="dummy3b" refType="w" fact="0.0659"/>
+          <dgm:constr type="t" for="ch" forName="dummy3b" refType="h" fact="0.5141"/>
+          <dgm:constr type="r" for="ch" forName="wedge3Tx" refType="w" fact="0.46"/>
+          <dgm:constr type="t" for="ch" forName="wedge3Tx" refType="h" fact="0.53"/>
+          <dgm:constr type="w" for="ch" forName="wedge3Tx" refType="w" fact="0.31"/>
+          <dgm:constr type="h" for="ch" forName="wedge3Tx" refType="h" fact="0.23"/>
+          <dgm:constr type="l" for="ch" forName="wedge4" refType="w" fact="0.0659"/>
+          <dgm:constr type="t" for="ch" forName="wedge4" refType="h" fact="0.0659"/>
+          <dgm:constr type="w" for="ch" forName="wedge4" refType="w" fact="0.84"/>
+          <dgm:constr type="h" for="ch" forName="wedge4" refType="h" fact="0.84"/>
+          <dgm:constr type="l" for="ch" forName="dummy4a" refType="w" fact="0.0659"/>
+          <dgm:constr type="t" for="ch" forName="dummy4a" refType="h" fact="0.4859"/>
+          <dgm:constr type="l" for="ch" forName="dummy4b" refType="w" fact="0.4859"/>
+          <dgm:constr type="t" for="ch" forName="dummy4b" refType="h" fact="0.0659"/>
+          <dgm:constr type="r" for="ch" forName="wedge4Tx" refType="w" fact="0.46"/>
+          <dgm:constr type="t" for="ch" forName="wedge4Tx" refType="h" fact="0.24"/>
+          <dgm:constr type="w" for="ch" forName="wedge4Tx" refType="w" fact="0.31"/>
+          <dgm:constr type="h" for="ch" forName="wedge4Tx" refType="h" fact="0.23"/>
+          <dgm:constr type="h" for="ch" forName="arrowWedge1" refType="w" fact="0.08"/>
+          <dgm:constr type="diam" for="ch" forName="arrowWedge1" refType="w" fact="0.84"/>
+          <dgm:constr type="l" for="ch" forName="arrowWedge1" refType="w" fact="0.5"/>
+          <dgm:constr type="t" for="ch" forName="arrowWedge1" refType="w" fact="0.5"/>
+          <dgm:constr type="h" for="ch" forName="arrowWedge2" refType="w" fact="0.08"/>
+          <dgm:constr type="diam" for="ch" forName="arrowWedge2" refType="w" fact="0.84"/>
+          <dgm:constr type="l" for="ch" forName="arrowWedge2" refType="w" fact="0.5"/>
+          <dgm:constr type="t" for="ch" forName="arrowWedge2" refType="w" fact="0.5"/>
+          <dgm:constr type="h" for="ch" forName="arrowWedge3" refType="w" fact="0.08"/>
+          <dgm:constr type="diam" for="ch" forName="arrowWedge3" refType="w" fact="0.84"/>
+          <dgm:constr type="l" for="ch" forName="arrowWedge3" refType="w" fact="0.5"/>
+          <dgm:constr type="t" for="ch" forName="arrowWedge3" refType="w" fact="0.5"/>
+          <dgm:constr type="h" for="ch" forName="arrowWedge4" refType="w" fact="0.08"/>
+          <dgm:constr type="diam" for="ch" forName="arrowWedge4" refType="w" fact="0.84"/>
+          <dgm:constr type="l" for="ch" forName="arrowWedge4" refType="w" fact="0.5"/>
+          <dgm:constr type="t" for="ch" forName="arrowWedge4" refType="w" fact="0.5"/>
+          <dgm:constr type="primFontSz" for="ch" ptType="node" op="equ"/>
+        </dgm:constrLst>
+      </dgm:if>
+      <dgm:if name="Name5" axis="ch" ptType="node" func="cnt" op="equ" val="5">
+        <dgm:constrLst>
+          <dgm:constr type="l" for="ch" forName="wedge1" refType="w" fact="0.0918"/>
+          <dgm:constr type="t" for="ch" forName="wedge1" refType="w" fact="0.0638"/>
+          <dgm:constr type="w" for="ch" forName="wedge1" refType="w" fact="0.84"/>
+          <dgm:constr type="h" for="ch" forName="wedge1" refType="h" fact="0.84"/>
+          <dgm:constr type="l" for="ch" forName="dummy1a" refType="w" fact="0.5118"/>
+          <dgm:constr type="t" for="ch" forName="dummy1a" refType="h" fact="0.0638"/>
+          <dgm:constr type="l" for="ch" forName="dummy1b" refType="w" fact="0.9112"/>
+          <dgm:constr type="t" for="ch" forName="dummy1b" refType="h" fact="0.354"/>
+          <dgm:constr type="l" for="ch" forName="wedge1Tx" refType="w" fact="0.53"/>
+          <dgm:constr type="t" for="ch" forName="wedge1Tx" refType="h" fact="0.205"/>
+          <dgm:constr type="w" for="ch" forName="wedge1Tx" refType="w" fact="0.27"/>
+          <dgm:constr type="h" for="ch" forName="wedge1Tx" refType="h" fact="0.18"/>
+          <dgm:constr type="l" for="ch" forName="wedge2" refType="w" fact="0.099"/>
+          <dgm:constr type="t" for="ch" forName="wedge2" refType="w" fact="0.0862"/>
+          <dgm:constr type="w" for="ch" forName="wedge2" refType="w" fact="0.84"/>
+          <dgm:constr type="h" for="ch" forName="wedge2" refType="h" fact="0.84"/>
+          <dgm:constr type="l" for="ch" forName="dummy2a" refType="w" fact="0.9185"/>
+          <dgm:constr type="t" for="ch" forName="dummy2a" refType="h" fact="0.3764"/>
+          <dgm:constr type="l" for="ch" forName="dummy2b" refType="w" fact="0.7659"/>
+          <dgm:constr type="t" for="ch" forName="dummy2b" refType="h" fact="0.846"/>
+          <dgm:constr type="l" for="ch" forName="wedge2Tx" refType="w" fact="0.64"/>
+          <dgm:constr type="t" for="ch" forName="wedge2Tx" refType="h" fact="0.47"/>
+          <dgm:constr type="w" for="ch" forName="wedge2Tx" refType="w" fact="0.25"/>
+          <dgm:constr type="h" for="ch" forName="wedge2Tx" refType="h" fact="0.2"/>
+          <dgm:constr type="l" for="ch" forName="wedge3" refType="w" fact="0.08"/>
+          <dgm:constr type="t" for="ch" forName="wedge3" refType="w" fact="0.1"/>
+          <dgm:constr type="w" for="ch" forName="wedge3" refType="w" fact="0.84"/>
+          <dgm:constr type="h" for="ch" forName="wedge3" refType="h" fact="0.84"/>
+          <dgm:constr type="l" for="ch" forName="dummy3a" refType="w" fact="0.7469"/>
+          <dgm:constr type="t" for="ch" forName="dummy3a" refType="h" fact="0.8598"/>
+          <dgm:constr type="l" for="ch" forName="dummy3b" refType="w" fact="0.2531"/>
+          <dgm:constr type="t" for="ch" forName="dummy3b" refType="h" fact="0.8598"/>
+          <dgm:constr type="l" for="ch" forName="wedge3Tx" refType="w" fact="0.38"/>
+          <dgm:constr type="t" for="ch" forName="wedge3Tx" refType="h" fact="0.69"/>
+          <dgm:constr type="w" for="ch" forName="wedge3Tx" refType="w" fact="0.24"/>
+          <dgm:constr type="h" for="ch" forName="wedge3Tx" refType="h" fact="0.22"/>
+          <dgm:constr type="l" for="ch" forName="wedge4" refType="w" fact="0.061"/>
+          <dgm:constr type="t" for="ch" forName="wedge4" refType="h" fact="0.0862"/>
+          <dgm:constr type="w" for="ch" forName="wedge4" refType="w" fact="0.84"/>
+          <dgm:constr type="h" for="ch" forName="wedge4" refType="h" fact="0.84"/>
+          <dgm:constr type="l" for="ch" forName="dummy4a" refType="w" fact="0.2341"/>
+          <dgm:constr type="t" for="ch" forName="dummy4a" refType="h" fact="0.846"/>
+          <dgm:constr type="l" for="ch" forName="dummy4b" refType="w" fact="0.0815"/>
+          <dgm:constr type="t" for="ch" forName="dummy4b" refType="h" fact="0.3764"/>
+          <dgm:constr type="r" for="ch" forName="wedge4Tx" refType="w" fact="0.36"/>
+          <dgm:constr type="t" for="ch" forName="wedge4Tx" refType="h" fact="0.47"/>
+          <dgm:constr type="w" for="ch" forName="wedge4Tx" refType="w" fact="0.25"/>
+          <dgm:constr type="h" for="ch" forName="wedge4Tx" refType="h" fact="0.2"/>
+          <dgm:constr type="l" for="ch" forName="wedge5" refType="w" fact="0.0682"/>
+          <dgm:constr type="t" for="ch" forName="wedge5" refType="h" fact="0.0638"/>
+          <dgm:constr type="w" for="ch" forName="wedge5" refType="w" fact="0.84"/>
+          <dgm:constr type="h" for="ch" forName="wedge5" refType="h" fact="0.84"/>
+          <dgm:constr type="l" for="ch" forName="dummy5a" refType="w" fact="0.0888"/>
+          <dgm:constr type="t" for="ch" forName="dummy5a" refType="h" fact="0.354"/>
+          <dgm:constr type="l" for="ch" forName="dummy5b" refType="w" fact="0.4882"/>
+          <dgm:constr type="t" for="ch" forName="dummy5b" refType="h" fact="0.0638"/>
+          <dgm:constr type="r" for="ch" forName="wedge5Tx" refType="w" fact="0.47"/>
+          <dgm:constr type="t" for="ch" forName="wedge5Tx" refType="h" fact="0.205"/>
+          <dgm:constr type="w" for="ch" forName="wedge5Tx" refType="w" fact="0.27"/>
+          <dgm:constr type="h" for="ch" forName="wedge5Tx" refType="h" fact="0.18"/>
+          <dgm:constr type="h" for="ch" forName="arrowWedge1" refType="w" fact="0.08"/>
+          <dgm:constr type="diam" for="ch" forName="arrowWedge1" refType="w" fact="0.84"/>
+          <dgm:constr type="l" for="ch" forName="arrowWedge1" refType="w" fact="0.5"/>
+          <dgm:constr type="t" for="ch" forName="arrowWedge1" refType="w" fact="0.5"/>
+          <dgm:constr type="h" for="ch" forName="arrowWedge2" refType="w" fact="0.08"/>
+          <dgm:constr type="diam" for="ch" forName="arrowWedge2" refType="w" fact="0.84"/>
+          <dgm:constr type="l" for="ch" forName="arrowWedge2" refType="w" fact="0.5"/>
+          <dgm:constr type="t" for="ch" forName="arrowWedge2" refType="w" fact="0.5"/>
+          <dgm:constr type="h" for="ch" forName="arrowWedge3" refType="w" fact="0.08"/>
+          <dgm:constr type="diam" for="ch" forName="arrowWedge3" refType="w" fact="0.84"/>
+          <dgm:constr type="l" for="ch" forName="arrowWedge3" refType="w" fact="0.5"/>
+          <dgm:constr type="t" for="ch" forName="arrowWedge3" refType="w" fact="0.5"/>
+          <dgm:constr type="h" for="ch" forName="arrowWedge4" refType="w" fact="0.08"/>
+          <dgm:constr type="diam" for="ch" forName="arrowWedge4" refType="w" fact="0.84"/>
+          <dgm:constr type="l" for="ch" forName="arrowWedge4" refType="w" fact="0.5"/>
+          <dgm:constr type="t" for="ch" forName="arrowWedge4" refType="w" fact="0.5"/>
+          <dgm:constr type="h" for="ch" forName="arrowWedge5" refType="w" fact="0.08"/>
+          <dgm:constr type="diam" for="ch" forName="arrowWedge5" refType="w" fact="0.84"/>
+          <dgm:constr type="l" for="ch" forName="arrowWedge5" refType="w" fact="0.5"/>
+          <dgm:constr type="t" for="ch" forName="arrowWedge5" refType="w" fact="0.5"/>
+          <dgm:constr type="primFontSz" for="ch" ptType="node" op="equ"/>
+        </dgm:constrLst>
+      </dgm:if>
+      <dgm:if name="Name6" axis="ch" ptType="node" func="cnt" op="equ" val="6">
+        <dgm:constrLst>
+          <dgm:constr type="l" for="ch" forName="wedge1" refType="w" fact="0.09"/>
+          <dgm:constr type="t" for="ch" forName="wedge1" refType="w" fact="0.0627"/>
+          <dgm:constr type="w" for="ch" forName="wedge1" refType="w" fact="0.84"/>
+          <dgm:constr type="h" for="ch" forName="wedge1" refType="h" fact="0.84"/>
+          <dgm:constr type="l" for="ch" forName="dummy1a" refType="w" fact="0.51"/>
+          <dgm:constr type="t" for="ch" forName="dummy1a" refType="h" fact="0.0627"/>
+          <dgm:constr type="l" for="ch" forName="dummy1b" refType="w" fact="0.8737"/>
+          <dgm:constr type="t" for="ch" forName="dummy1b" refType="h" fact="0.2727"/>
+          <dgm:constr type="l" for="ch" forName="wedge1Tx" refType="w" fact="0.53"/>
+          <dgm:constr type="t" for="ch" forName="wedge1Tx" refType="h" fact="0.17"/>
+          <dgm:constr type="w" for="ch" forName="wedge1Tx" refType="w" fact="0.22"/>
+          <dgm:constr type="h" for="ch" forName="wedge1Tx" refType="h" fact="0.17"/>
+          <dgm:constr type="l" for="ch" forName="wedge2" refType="w" fact="0.1"/>
+          <dgm:constr type="t" for="ch" forName="wedge2" refType="w" fact="0.08"/>
+          <dgm:constr type="w" for="ch" forName="wedge2" refType="w" fact="0.84"/>
+          <dgm:constr type="h" for="ch" forName="wedge2" refType="h" fact="0.84"/>
+          <dgm:constr type="l" for="ch" forName="dummy2a" refType="w" fact="0.8837"/>
+          <dgm:constr type="t" for="ch" forName="dummy2a" refType="h" fact="0.29"/>
+          <dgm:constr type="l" for="ch" forName="dummy2b" refType="w" fact="0.8837"/>
+          <dgm:constr type="t" for="ch" forName="dummy2b" refType="h" fact="0.71"/>
+          <dgm:constr type="l" for="ch" forName="wedge2Tx" refType="w" fact="0.67"/>
+          <dgm:constr type="t" for="ch" forName="wedge2Tx" refType="h" fact="0.42"/>
+          <dgm:constr type="w" for="ch" forName="wedge2Tx" refType="w" fact="0.23"/>
+          <dgm:constr type="h" for="ch" forName="wedge2Tx" refType="h" fact="0.165"/>
+          <dgm:constr type="l" for="ch" forName="wedge3" refType="w" fact="0.09"/>
+          <dgm:constr type="t" for="ch" forName="wedge3" refType="w" fact="0.0973"/>
+          <dgm:constr type="w" for="ch" forName="wedge3" refType="w" fact="0.84"/>
+          <dgm:constr type="h" for="ch" forName="wedge3" refType="h" fact="0.84"/>
+          <dgm:constr type="l" for="ch" forName="dummy3a" refType="w" fact="0.8737"/>
+          <dgm:constr type="t" for="ch" forName="dummy3a" refType="h" fact="0.7273"/>
+          <dgm:constr type="l" for="ch" forName="dummy3b" refType="w" fact="0.51"/>
+          <dgm:constr type="t" for="ch" forName="dummy3b" refType="h" fact="0.9373"/>
+          <dgm:constr type="l" for="ch" forName="wedge3Tx" refType="w" fact="0.53"/>
+          <dgm:constr type="t" for="ch" forName="wedge3Tx" refType="h" fact="0.665"/>
+          <dgm:constr type="w" for="ch" forName="wedge3Tx" refType="w" fact="0.22"/>
+          <dgm:constr type="h" for="ch" forName="wedge3Tx" refType="h" fact="0.17"/>
+          <dgm:constr type="l" for="ch" forName="wedge4" refType="w" fact="0.07"/>
+          <dgm:constr type="t" for="ch" forName="wedge4" refType="h" fact="0.0973"/>
+          <dgm:constr type="w" for="ch" forName="wedge4" refType="w" fact="0.84"/>
+          <dgm:constr type="h" for="ch" forName="wedge4" refType="h" fact="0.84"/>
+          <dgm:constr type="l" for="ch" forName="dummy4a" refType="w" fact="0.49"/>
+          <dgm:constr type="t" for="ch" forName="dummy4a" refType="h" fact="0.9373"/>
+          <dgm:constr type="l" for="ch" forName="dummy4b" refType="w" fact="0.1263"/>
+          <dgm:constr type="t" for="ch" forName="dummy4b" refType="h" fact="0.7273"/>
+          <dgm:constr type="r" for="ch" forName="wedge4Tx" refType="w" fact="0.47"/>
+          <dgm:constr type="t" for="ch" forName="wedge4Tx" refType="h" fact="0.665"/>
+          <dgm:constr type="w" for="ch" forName="wedge4Tx" refType="w" fact="0.22"/>
+          <dgm:constr type="h" for="ch" forName="wedge4Tx" refType="h" fact="0.17"/>
+          <dgm:constr type="l" for="ch" forName="wedge5" refType="w" fact="0.06"/>
+          <dgm:constr type="t" for="ch" forName="wedge5" refType="h" fact="0.08"/>
+          <dgm:constr type="w" for="ch" forName="wedge5" refType="w" fact="0.84"/>
+          <dgm:constr type="h" for="ch" forName="wedge5" refType="h" fact="0.84"/>
+          <dgm:constr type="l" for="ch" forName="dummy5a" refType="w" fact="0.1163"/>
+          <dgm:constr type="t" for="ch" forName="dummy5a" refType="h" fact="0.71"/>
+          <dgm:constr type="l" for="ch" forName="dummy5b" refType="w" fact="0.1163"/>
+          <dgm:constr type="t" for="ch" forName="dummy5b" refType="h" fact="0.29"/>
+          <dgm:constr type="r" for="ch" forName="wedge5Tx" refType="w" fact="0.33"/>
+          <dgm:constr type="t" for="ch" forName="wedge5Tx" refType="h" fact="0.42"/>
+          <dgm:constr type="w" for="ch" forName="wedge5Tx" refType="w" fact="0.23"/>
+          <dgm:constr type="h" for="ch" forName="wedge5Tx" refType="h" fact="0.165"/>
+          <dgm:constr type="l" for="ch" forName="wedge6" refType="w" fact="0.07"/>
+          <dgm:constr type="t" for="ch" forName="wedge6" refType="h" fact="0.0627"/>
+          <dgm:constr type="w" for="ch" forName="wedge6" refType="w" fact="0.84"/>
+          <dgm:constr type="h" for="ch" forName="wedge6" refType="h" fact="0.84"/>
+          <dgm:constr type="l" for="ch" forName="dummy6a" refType="w" fact="0.1263"/>
+          <dgm:constr type="t" for="ch" forName="dummy6a" refType="h" fact="0.2727"/>
+          <dgm:constr type="l" for="ch" forName="dummy6b" refType="w" fact="0.49"/>
+          <dgm:constr type="t" for="ch" forName="dummy6b" refType="h" fact="0.0627"/>
+          <dgm:constr type="r" for="ch" forName="wedge6Tx" refType="w" fact="0.47"/>
+          <dgm:constr type="t" for="ch" forName="wedge6Tx" refType="h" fact="0.17"/>
+          <dgm:constr type="w" for="ch" forName="wedge6Tx" refType="w" fact="0.22"/>
+          <dgm:constr type="h" for="ch" forName="wedge6Tx" refType="h" fact="0.17"/>
+          <dgm:constr type="h" for="ch" forName="arrowWedge1" refType="w" fact="0.08"/>
+          <dgm:constr type="diam" for="ch" forName="arrowWedge1" refType="w" fact="0.84"/>
+          <dgm:constr type="l" for="ch" forName="arrowWedge1" refType="w" fact="0.5"/>
+          <dgm:constr type="t" for="ch" forName="arrowWedge1" refType="w" fact="0.5"/>
+          <dgm:constr type="h" for="ch" forName="arrowWedge2" refType="w" fact="0.08"/>
+          <dgm:constr type="diam" for="ch" forName="arrowWedge2" refType="w" fact="0.84"/>
+          <dgm:constr type="l" for="ch" forName="arrowWedge2" refType="w" fact="0.5"/>
+          <dgm:constr type="t" for="ch" forName="arrowWedge2" refType="w" fact="0.5"/>
+          <dgm:constr type="h" for="ch" forName="arrowWedge3" refType="w" fact="0.08"/>
+          <dgm:constr type="diam" for="ch" forName="arrowWedge3" refType="w" fact="0.84"/>
+          <dgm:constr type="l" for="ch" forName="arrowWedge3" refType="w" fact="0.5"/>
+          <dgm:constr type="t" for="ch" forName="arrowWedge3" refType="w" fact="0.5"/>
+          <dgm:constr type="h" for="ch" forName="arrowWedge4" refType="w" fact="0.08"/>
+          <dgm:constr type="diam" for="ch" forName="arrowWedge4" refType="w" fact="0.84"/>
+          <dgm:constr type="l" for="ch" forName="arrowWedge4" refType="w" fact="0.5"/>
+          <dgm:constr type="t" for="ch" forName="arrowWedge4" refType="w" fact="0.5"/>
+          <dgm:constr type="h" for="ch" forName="arrowWedge5" refType="w" fact="0.08"/>
+          <dgm:constr type="diam" for="ch" forName="arrowWedge5" refType="w" fact="0.84"/>
+          <dgm:constr type="l" for="ch" forName="arrowWedge5" refType="w" fact="0.5"/>
+          <dgm:constr type="t" for="ch" forName="arrowWedge5" refType="w" fact="0.5"/>
+          <dgm:constr type="h" for="ch" forName="arrowWedge6" refType="w" fact="0.08"/>
+          <dgm:constr type="diam" for="ch" forName="arrowWedge6" refType="w" fact="0.84"/>
+          <dgm:constr type="l" for="ch" forName="arrowWedge6" refType="w" fact="0.5"/>
+          <dgm:constr type="t" for="ch" forName="arrowWedge6" refType="w" fact="0.5"/>
+          <dgm:constr type="primFontSz" for="ch" ptType="node" op="equ"/>
+        </dgm:constrLst>
+      </dgm:if>
+      <dgm:else name="Name7">
+        <dgm:constrLst>
+          <dgm:constr type="l" for="ch" forName="wedge1" refType="w" fact="0.0887"/>
+          <dgm:constr type="t" for="ch" forName="wedge1" refType="w" fact="0.062"/>
+          <dgm:constr type="w" for="ch" forName="wedge1" refType="w" fact="0.84"/>
+          <dgm:constr type="h" for="ch" forName="wedge1" refType="h" fact="0.84"/>
+          <dgm:constr type="l" for="ch" forName="dummy1a" refType="w" fact="0.5087"/>
+          <dgm:constr type="t" for="ch" forName="dummy1a" refType="h" fact="0.062"/>
+          <dgm:constr type="l" for="ch" forName="dummy1b" refType="w" fact="0.837"/>
+          <dgm:constr type="t" for="ch" forName="dummy1b" refType="h" fact="0.2201"/>
+          <dgm:constr type="l" for="ch" forName="wedge1Tx" refType="w" fact="0.53"/>
+          <dgm:constr type="t" for="ch" forName="wedge1Tx" refType="h" fact="0.14"/>
+          <dgm:constr type="w" for="ch" forName="wedge1Tx" refType="w" fact="0.2"/>
+          <dgm:constr type="h" for="ch" forName="wedge1Tx" refType="h" fact="0.16"/>
+          <dgm:constr type="l" for="ch" forName="wedge2" refType="w" fact="0.0995"/>
+          <dgm:constr type="t" for="ch" forName="wedge2" refType="w" fact="0.0755"/>
+          <dgm:constr type="w" for="ch" forName="wedge2" refType="w" fact="0.84"/>
+          <dgm:constr type="h" for="ch" forName="wedge2" refType="h" fact="0.84"/>
+          <dgm:constr type="l" for="ch" forName="dummy2a" refType="w" fact="0.8479"/>
+          <dgm:constr type="t" for="ch" forName="dummy2a" refType="h" fact="0.2337"/>
+          <dgm:constr type="l" for="ch" forName="dummy2b" refType="w" fact="0.929"/>
+          <dgm:constr type="t" for="ch" forName="dummy2b" refType="h" fact="0.589"/>
+          <dgm:constr type="l" for="ch" forName="wedge2Tx" refType="w" fact="0.67"/>
+          <dgm:constr type="t" for="ch" forName="wedge2Tx" refType="h" fact="0.38"/>
+          <dgm:constr type="w" for="ch" forName="wedge2Tx" refType="w" fact="0.23"/>
+          <dgm:constr type="h" for="ch" forName="wedge2Tx" refType="h" fact="0.14"/>
+          <dgm:constr type="l" for="ch" forName="wedge3" refType="w" fact="0.0956"/>
+          <dgm:constr type="t" for="ch" forName="wedge3" refType="w" fact="0.0925"/>
+          <dgm:constr type="w" for="ch" forName="wedge3" refType="w" fact="0.84"/>
+          <dgm:constr type="h" for="ch" forName="wedge3" refType="h" fact="0.84"/>
+          <dgm:constr type="l" for="ch" forName="dummy3a" refType="w" fact="0.9251"/>
+          <dgm:constr type="t" for="ch" forName="dummy3a" refType="h" fact="0.6059"/>
+          <dgm:constr type="l" for="ch" forName="dummy3b" refType="w" fact="0.6979"/>
+          <dgm:constr type="t" for="ch" forName="dummy3b" refType="h" fact="0.8909"/>
+          <dgm:constr type="l" for="ch" forName="wedge3Tx" refType="w" fact="0.635"/>
+          <dgm:constr type="t" for="ch" forName="wedge3Tx" refType="h" fact="0.59"/>
+          <dgm:constr type="w" for="ch" forName="wedge3Tx" refType="w" fact="0.2"/>
+          <dgm:constr type="h" for="ch" forName="wedge3Tx" refType="h" fact="0.155"/>
+          <dgm:constr type="l" for="ch" forName="wedge4" refType="w" fact="0.08"/>
+          <dgm:constr type="t" for="ch" forName="wedge4" refType="h" fact="0.1"/>
+          <dgm:constr type="w" for="ch" forName="wedge4" refType="w" fact="0.84"/>
+          <dgm:constr type="h" for="ch" forName="wedge4" refType="h" fact="0.84"/>
+          <dgm:constr type="l" for="ch" forName="dummy4a" refType="w" fact="0.6822"/>
+          <dgm:constr type="t" for="ch" forName="dummy4a" refType="h" fact="0.8984"/>
+          <dgm:constr type="l" for="ch" forName="dummy4b" refType="w" fact="0.3178"/>
+          <dgm:constr type="t" for="ch" forName="dummy4b" refType="h" fact="0.8984"/>
+          <dgm:constr type="l" for="ch" forName="wedge4Tx" refType="w" fact="0.4025"/>
+          <dgm:constr type="t" for="ch" forName="wedge4Tx" refType="h" fact="0.76"/>
+          <dgm:constr type="w" for="ch" forName="wedge4Tx" refType="w" fact="0.195"/>
+          <dgm:constr type="h" for="ch" forName="wedge4Tx" refType="h" fact="0.14"/>
+          <dgm:constr type="l" for="ch" forName="wedge5" refType="w" fact="0.0644"/>
+          <dgm:constr type="t" for="ch" forName="wedge5" refType="h" fact="0.0925"/>
+          <dgm:constr type="w" for="ch" forName="wedge5" refType="w" fact="0.84"/>
+          <dgm:constr type="h" for="ch" forName="wedge5" refType="h" fact="0.84"/>
+          <dgm:constr type="l" for="ch" forName="dummy5a" refType="w" fact="0.3021"/>
+          <dgm:constr type="t" for="ch" forName="dummy5a" refType="h" fact="0.8909"/>
+          <dgm:constr type="l" for="ch" forName="dummy5b" refType="w" fact="0.0749"/>
+          <dgm:constr type="t" for="ch" forName="dummy5b" refType="h" fact="0.6059"/>
+          <dgm:constr type="r" for="ch" forName="wedge5Tx" refType="w" fact="0.365"/>
+          <dgm:constr type="t" for="ch" forName="wedge5Tx" refType="h" fact="0.59"/>
+          <dgm:constr type="w" for="ch" forName="wedge5Tx" refType="w" fact="0.2"/>
+          <dgm:constr type="h" for="ch" forName="wedge5Tx" refType="h" fact="0.155"/>
+          <dgm:constr type="l" for="ch" forName="wedge6" refType="w" fact="0.0605"/>
+          <dgm:constr type="t" for="ch" forName="wedge6" refType="h" fact="0.0755"/>
+          <dgm:constr type="w" for="ch" forName="wedge6" refType="w" fact="0.84"/>
+          <dgm:constr type="h" for="ch" forName="wedge6" refType="h" fact="0.84"/>
+          <dgm:constr type="l" for="ch" forName="dummy6a" refType="w" fact="0.071"/>
+          <dgm:constr type="t" for="ch" forName="dummy6a" refType="h" fact="0.589"/>
+          <dgm:constr type="l" for="ch" forName="dummy6b" refType="w" fact="0.1521"/>
+          <dgm:constr type="t" for="ch" forName="dummy6b" refType="h" fact="0.2337"/>
+          <dgm:constr type="r" for="ch" forName="wedge6Tx" refType="w" fact="0.33"/>
+          <dgm:constr type="t" for="ch" forName="wedge6Tx" refType="h" fact="0.38"/>
+          <dgm:constr type="w" for="ch" forName="wedge6Tx" refType="w" fact="0.23"/>
+          <dgm:constr type="h" for="ch" forName="wedge6Tx" refType="h" fact="0.14"/>
+          <dgm:constr type="l" for="ch" forName="wedge7" refType="w" fact="0.0713"/>
+          <dgm:constr type="t" for="ch" forName="wedge7" refType="h" fact="0.062"/>
+          <dgm:constr type="w" for="ch" forName="wedge7" refType="w" fact="0.84"/>
+          <dgm:constr type="h" for="ch" forName="wedge7" refType="h" fact="0.84"/>
+          <dgm:constr type="l" for="ch" forName="dummy7a" refType="w" fact="0.163"/>
+          <dgm:constr type="t" for="ch" forName="dummy7a" refType="h" fact="0.2201"/>
+          <dgm:constr type="l" for="ch" forName="dummy7b" refType="w" fact="0.4913"/>
+          <dgm:constr type="t" for="ch" forName="dummy7b" refType="h" fact="0.062"/>
+          <dgm:constr type="r" for="ch" forName="wedge7Tx" refType="w" fact="0.47"/>
+          <dgm:constr type="t" for="ch" forName="wedge7Tx" refType="h" fact="0.14"/>
+          <dgm:constr type="w" for="ch" forName="wedge7Tx" refType="w" fact="0.2"/>
+          <dgm:constr type="h" for="ch" forName="wedge7Tx" refType="h" fact="0.16"/>
+          <dgm:constr type="h" for="ch" forName="arrowWedge1" refType="w" fact="0.08"/>
+          <dgm:constr type="diam" for="ch" forName="arrowWedge1" refType="w" fact="0.84"/>
+          <dgm:constr type="l" for="ch" forName="arrowWedge1" refType="w" fact="0.5"/>
+          <dgm:constr type="t" for="ch" forName="arrowWedge1" refType="w" fact="0.5"/>
+          <dgm:constr type="h" for="ch" forName="arrowWedge2" refType="w" fact="0.08"/>
+          <dgm:constr type="diam" for="ch" forName="arrowWedge2" refType="w" fact="0.84"/>
+          <dgm:constr type="l" for="ch" forName="arrowWedge2" refType="w" fact="0.5"/>
+          <dgm:constr type="t" for="ch" forName="arrowWedge2" refType="w" fact="0.5"/>
+          <dgm:constr type="h" for="ch" forName="arrowWedge3" refType="w" fact="0.08"/>
+          <dgm:constr type="diam" for="ch" forName="arrowWedge3" refType="w" fact="0.84"/>
+          <dgm:constr type="l" for="ch" forName="arrowWedge3" refType="w" fact="0.5"/>
+          <dgm:constr type="t" for="ch" forName="arrowWedge3" refType="w" fact="0.5"/>
+          <dgm:constr type="h" for="ch" forName="arrowWedge4" refType="w" fact="0.08"/>
+          <dgm:constr type="diam" for="ch" forName="arrowWedge4" refType="w" fact="0.84"/>
+          <dgm:constr type="l" for="ch" forName="arrowWedge4" refType="w" fact="0.5"/>
+          <dgm:constr type="t" for="ch" forName="arrowWedge4" refType="w" fact="0.5"/>
+          <dgm:constr type="h" for="ch" forName="arrowWedge5" refType="w" fact="0.08"/>
+          <dgm:constr type="diam" for="ch" forName="arrowWedge5" refType="w" fact="0.84"/>
+          <dgm:constr type="l" for="ch" forName="arrowWedge5" refType="w" fact="0.5"/>
+          <dgm:constr type="t" for="ch" forName="arrowWedge5" refType="w" fact="0.5"/>
+          <dgm:constr type="h" for="ch" forName="arrowWedge6" refType="w" fact="0.08"/>
+          <dgm:constr type="diam" for="ch" forName="arrowWedge6" refType="w" fact="0.84"/>
+          <dgm:constr type="l" for="ch" forName="arrowWedge6" refType="w" fact="0.5"/>
+          <dgm:constr type="t" for="ch" forName="arrowWedge6" refType="w" fact="0.5"/>
+          <dgm:constr type="h" for="ch" forName="arrowWedge7" refType="w" fact="0.08"/>
+          <dgm:constr type="diam" for="ch" forName="arrowWedge7" refType="w" fact="0.84"/>
+          <dgm:constr type="l" for="ch" forName="arrowWedge7" refType="w" fact="0.5"/>
+          <dgm:constr type="t" for="ch" forName="arrowWedge7" refType="w" fact="0.5"/>
+          <dgm:constr type="primFontSz" for="ch" ptType="node" op="equ"/>
+        </dgm:constrLst>
+      </dgm:else>
+    </dgm:choose>
+    <dgm:ruleLst/>
+    <dgm:choose name="Name8">
+      <dgm:if name="Name9" axis="ch" ptType="node" func="cnt" op="gte" val="1">
+        <dgm:layoutNode name="wedge1">
+          <dgm:alg type="sp"/>
+          <dgm:choose name="Name10">
+            <dgm:if name="Name11" axis="ch" ptType="node" func="cnt" op="equ" val="1">
+              <dgm:shape xmlns:r="http://schemas.openxmlformats.org/officeDocument/2006/relationships" type="ellipse" r:blip="">
+                <dgm:adjLst/>
+              </dgm:shape>
+            </dgm:if>
+            <dgm:if name="Name12" axis="ch" ptType="node" func="cnt" op="equ" val="2">
+              <dgm:shape xmlns:r="http://schemas.openxmlformats.org/officeDocument/2006/relationships" type="pie" r:blip="">
+                <dgm:adjLst>
+                  <dgm:adj idx="1" val="270"/>
+                  <dgm:adj idx="2" val="90"/>
+                </dgm:adjLst>
+              </dgm:shape>
+            </dgm:if>
+            <dgm:if name="Name13" axis="ch" ptType="node" func="cnt" op="equ" val="3">
+              <dgm:shape xmlns:r="http://schemas.openxmlformats.org/officeDocument/2006/relationships" type="pie" r:blip="">
+                <dgm:adjLst>
+                  <dgm:adj idx="1" val="270"/>
+                  <dgm:adj idx="2" val="30"/>
+                </dgm:adjLst>
+              </dgm:shape>
+            </dgm:if>
+            <dgm:if name="Name14" axis="ch" ptType="node" func="cnt" op="equ" val="4">
+              <dgm:shape xmlns:r="http://schemas.openxmlformats.org/officeDocument/2006/relationships" type="pie" r:blip="">
+                <dgm:adjLst>
+                  <dgm:adj idx="1" val="270"/>
+                  <dgm:adj idx="2" val="0"/>
+                </dgm:adjLst>
+              </dgm:shape>
+            </dgm:if>
+            <dgm:if name="Name15" axis="ch" ptType="node" func="cnt" op="equ" val="5">
+              <dgm:shape xmlns:r="http://schemas.openxmlformats.org/officeDocument/2006/relationships" type="pie" r:blip="">
+                <dgm:adjLst>
+                  <dgm:adj idx="1" val="270"/>
+                  <dgm:adj idx="2" val="342"/>
+                </dgm:adjLst>
+              </dgm:shape>
+            </dgm:if>
+            <dgm:if name="Name16" axis="ch" ptType="node" func="cnt" op="equ" val="6">
+              <dgm:shape xmlns:r="http://schemas.openxmlformats.org/officeDocument/2006/relationships" type="pie" r:blip="">
+                <dgm:adjLst>
+                  <dgm:adj idx="1" val="270"/>
+                  <dgm:adj idx="2" val="330"/>
+                </dgm:adjLst>
+              </dgm:shape>
+            </dgm:if>
+            <dgm:else name="Name17">
+              <dgm:shape xmlns:r="http://schemas.openxmlformats.org/officeDocument/2006/relationships" type="pie" r:blip="">
+                <dgm:adjLst>
+                  <dgm:adj idx="1" val="270"/>
+                  <dgm:adj idx="2" val="321.4286"/>
+                </dgm:adjLst>
+              </dgm:shape>
+            </dgm:else>
+          </dgm:choose>
+          <dgm:choose name="Name18">
+            <dgm:if name="Name19" func="var" arg="dir" op="equ" val="norm">
+              <dgm:presOf axis="ch desOrSelf" ptType="node node" st="1 1" cnt="1 0"/>
+            </dgm:if>
+            <dgm:else name="Name20">
+              <dgm:choose name="Name21">
+                <dgm:if name="Name22" axis="ch" ptType="node" func="cnt" op="equ" val="1">
+                  <dgm:presOf axis="ch desOrSelf" ptType="node node" st="1 1" cnt="1 0"/>
+                </dgm:if>
+                <dgm:if name="Name23" axis="ch" ptType="node" func="cnt" op="equ" val="2">
+                  <dgm:presOf axis="ch desOrSelf" ptType="node node" st="2 1" cnt="1 0"/>
+                </dgm:if>
+                <dgm:if name="Name24" axis="ch" ptType="node" func="cnt" op="equ" val="3">
+                  <dgm:presOf axis="ch desOrSelf" ptType="node node" st="3 1" cnt="1 0"/>
+                </dgm:if>
+                <dgm:if name="Name25" axis="ch" ptType="node" func="cnt" op="equ" val="4">
+                  <dgm:presOf axis="ch desOrSelf" ptType="node node" st="4 1" cnt="1 0"/>
+                </dgm:if>
+                <dgm:if name="Name26" axis="ch" ptType="node" func="cnt" op="equ" val="5">
+                  <dgm:presOf axis="ch desOrSelf" ptType="node node" st="5 1" cnt="1 0"/>
+                </dgm:if>
+                <dgm:if name="Name27" axis="ch" ptType="node" func="cnt" op="equ" val="6">
+                  <dgm:presOf axis="ch desOrSelf" ptType="node node" st="6 1" cnt="1 0"/>
+                </dgm:if>
+                <dgm:else name="Name28">
+                  <dgm:presOf axis="ch desOrSelf" ptType="node node" st="7 1" cnt="1 0"/>
+                </dgm:else>
+              </dgm:choose>
+            </dgm:else>
+          </dgm:choose>
+          <dgm:constrLst/>
+          <dgm:ruleLst/>
+        </dgm:layoutNode>
+        <dgm:layoutNode name="dummy1a" moveWith="wedge1">
+          <dgm:alg type="sp"/>
+          <dgm:shape xmlns:r="http://schemas.openxmlformats.org/officeDocument/2006/relationships" r:blip="">
+            <dgm:adjLst/>
+          </dgm:shape>
+          <dgm:presOf/>
+          <dgm:constrLst>
+            <dgm:constr type="w" val="1"/>
+            <dgm:constr type="h" val="1"/>
+          </dgm:constrLst>
+          <dgm:ruleLst/>
+        </dgm:layoutNode>
+        <dgm:layoutNode name="dummy1b" moveWith="wedge1">
+          <dgm:alg type="sp"/>
+          <dgm:shape xmlns:r="http://schemas.openxmlformats.org/officeDocument/2006/relationships" r:blip="">
+            <dgm:adjLst/>
+          </dgm:shape>
+          <dgm:presOf/>
+          <dgm:constrLst>
+            <dgm:constr type="w" val="1"/>
+            <dgm:constr type="h" val="1"/>
+          </dgm:constrLst>
+          <dgm:ruleLst/>
+        </dgm:layoutNode>
+        <dgm:layoutNode name="wedge1Tx" moveWith="wedge1">
+          <dgm:varLst>
+            <dgm:chMax val="0"/>
+            <dgm:chPref val="0"/>
+            <dgm:bulletEnabled val="1"/>
+          </dgm:varLst>
+          <dgm:alg type="tx"/>
+          <dgm:shape xmlns:r="http://schemas.openxmlformats.org/officeDocument/2006/relationships" type="rect" r:blip="" hideGeom="1">
+            <dgm:adjLst/>
+          </dgm:shape>
+          <dgm:choose name="Name29">
+            <dgm:if name="Name30" func="var" arg="dir" op="equ" val="norm">
+              <dgm:presOf axis="ch desOrSelf" ptType="node node" st="1 1" cnt="1 0"/>
+            </dgm:if>
+            <dgm:else name="Name31">
+              <dgm:choose name="Name32">
+                <dgm:if name="Name33" axis="ch" ptType="node" func="cnt" op="equ" val="1">
+                  <dgm:presOf axis="ch desOrSelf" ptType="node node" st="1 1" cnt="1 0"/>
+                </dgm:if>
+                <dgm:if name="Name34" axis="ch" ptType="node" func="cnt" op="equ" val="2">
+                  <dgm:presOf axis="ch desOrSelf" ptType="node node" st="2 1" cnt="1 0"/>
+                </dgm:if>
+                <dgm:if name="Name35" axis="ch" ptType="node" func="cnt" op="equ" val="3">
+                  <dgm:presOf axis="ch desOrSelf" ptType="node node" st="3 1" cnt="1 0"/>
+                </dgm:if>
+                <dgm:if name="Name36" axis="ch" ptType="node" func="cnt" op="equ" val="4">
+                  <dgm:presOf axis="ch desOrSelf" ptType="node node" st="4 1" cnt="1 0"/>
+                </dgm:if>
+                <dgm:if name="Name37" axis="ch" ptType="node" func="cnt" op="equ" val="5">
+                  <dgm:presOf axis="ch desOrSelf" ptType="node node" st="5 1" cnt="1 0"/>
+                </dgm:if>
+                <dgm:if name="Name38" axis="ch" ptType="node" func="cnt" op="equ" val="6">
+                  <dgm:presOf axis="ch desOrSelf" ptType="node node" st="6 1" cnt="1 0"/>
+                </dgm:if>
+                <dgm:else name="Name39">
+                  <dgm:presOf axis="ch desOrSelf" ptType="node node" st="7 1" cnt="1 0"/>
+                </dgm:else>
+              </dgm:choose>
+            </dgm:else>
+          </dgm:choose>
+          <dgm:constrLst>
+            <dgm:constr type="tMarg" refType="primFontSz" fact="0.1"/>
+            <dgm:constr type="bMarg" refType="primFontSz" fact="0.1"/>
+            <dgm:constr type="lMarg" refType="primFontSz" fact="0.1"/>
+            <dgm:constr type="rMarg" refType="primFontSz" fact="0.1"/>
+            <dgm:constr type="primFontSz" val="65"/>
+          </dgm:constrLst>
+          <dgm:ruleLst>
+            <dgm:rule type="primFontSz" val="5" fact="NaN" max="NaN"/>
+          </dgm:ruleLst>
+        </dgm:layoutNode>
+      </dgm:if>
+      <dgm:else name="Name40"/>
+    </dgm:choose>
+    <dgm:choose name="Name41">
+      <dgm:if name="Name42" axis="ch" ptType="node" func="cnt" op="gte" val="2">
+        <dgm:layoutNode name="wedge2">
+          <dgm:alg type="sp"/>
+          <dgm:choose name="Name43">
+            <dgm:if name="Name44" axis="ch" ptType="node" func="cnt" op="equ" val="2">
+              <dgm:shape xmlns:r="http://schemas.openxmlformats.org/officeDocument/2006/relationships" type="pie" r:blip="">
+                <dgm:adjLst>
+                  <dgm:adj idx="1" val="90"/>
+                  <dgm:adj idx="2" val="270"/>
+                </dgm:adjLst>
+              </dgm:shape>
+            </dgm:if>
+            <dgm:if name="Name45" axis="ch" ptType="node" func="cnt" op="equ" val="3">
+              <dgm:shape xmlns:r="http://schemas.openxmlformats.org/officeDocument/2006/relationships" type="pie" r:blip="">
+                <dgm:adjLst>
+                  <dgm:adj idx="1" val="30"/>
+                  <dgm:adj idx="2" val="150"/>
+                </dgm:adjLst>
+              </dgm:shape>
+            </dgm:if>
+            <dgm:if name="Name46" axis="ch" ptType="node" func="cnt" op="equ" val="4">
+              <dgm:shape xmlns:r="http://schemas.openxmlformats.org/officeDocument/2006/relationships" type="pie" r:blip="">
+                <dgm:adjLst>
+                  <dgm:adj idx="1" val="0"/>
+                  <dgm:adj idx="2" val="90"/>
+                </dgm:adjLst>
+              </dgm:shape>
+            </dgm:if>
+            <dgm:if name="Name47" axis="ch" ptType="node" func="cnt" op="equ" val="5">
+              <dgm:shape xmlns:r="http://schemas.openxmlformats.org/officeDocument/2006/relationships" type="pie" r:blip="">
+                <dgm:adjLst>
+                  <dgm:adj idx="1" val="342"/>
+                  <dgm:adj idx="2" val="54"/>
+                </dgm:adjLst>
+              </dgm:shape>
+            </dgm:if>
+            <dgm:if name="Name48" axis="ch" ptType="node" func="cnt" op="equ" val="6">
+              <dgm:shape xmlns:r="http://schemas.openxmlformats.org/officeDocument/2006/relationships" type="pie" r:blip="">
+                <dgm:adjLst>
+                  <dgm:adj idx="1" val="330"/>
+                  <dgm:adj idx="2" val="30"/>
+                </dgm:adjLst>
+              </dgm:shape>
+            </dgm:if>
+            <dgm:else name="Name49">
+              <dgm:shape xmlns:r="http://schemas.openxmlformats.org/officeDocument/2006/relationships" type="pie" r:blip="">
+                <dgm:adjLst>
+                  <dgm:adj idx="1" val="321.4286"/>
+                  <dgm:adj idx="2" val="12.85714"/>
+                </dgm:adjLst>
+              </dgm:shape>
+            </dgm:else>
+          </dgm:choose>
+          <dgm:choose name="Name50">
+            <dgm:if name="Name51" func="var" arg="dir" op="equ" val="norm">
+              <dgm:presOf axis="ch desOrSelf" ptType="node node" st="2 1" cnt="1 0"/>
+            </dgm:if>
+            <dgm:else name="Name52">
+              <dgm:choose name="Name53">
+                <dgm:if name="Name54" axis="ch" ptType="node" func="cnt" op="equ" val="2">
+                  <dgm:presOf axis="ch desOrSelf" ptType="node node" st="1 1" cnt="1 0"/>
+                </dgm:if>
+                <dgm:if name="Name55" axis="ch" ptType="node" func="cnt" op="equ" val="3">
+                  <dgm:presOf axis="ch desOrSelf" ptType="node node" st="2 1" cnt="1 0"/>
+                </dgm:if>
+                <dgm:if name="Name56" axis="ch" ptType="node" func="cnt" op="equ" val="4">
+                  <dgm:presOf axis="ch desOrSelf" ptType="node node" st="3 1" cnt="1 0"/>
+                </dgm:if>
+                <dgm:if name="Name57" axis="ch" ptType="node" func="cnt" op="equ" val="5">
+                  <dgm:presOf axis="ch desOrSelf" ptType="node node" st="4 1" cnt="1 0"/>
+                </dgm:if>
+                <dgm:if name="Name58" axis="ch" ptType="node" func="cnt" op="equ" val="6">
+                  <dgm:presOf axis="ch desOrSelf" ptType="node node" st="5 1" cnt="1 0"/>
+                </dgm:if>
+                <dgm:else name="Name59">
+                  <dgm:presOf axis="ch desOrSelf" ptType="node node" st="6 1" cnt="1 0"/>
+                </dgm:else>
+              </dgm:choose>
+            </dgm:else>
+          </dgm:choose>
+          <dgm:constrLst/>
+          <dgm:ruleLst/>
+        </dgm:layoutNode>
+        <dgm:layoutNode name="dummy2a" moveWith="wedge2">
+          <dgm:alg type="sp"/>
+          <dgm:shape xmlns:r="http://schemas.openxmlformats.org/officeDocument/2006/relationships" r:blip="">
+            <dgm:adjLst/>
+          </dgm:shape>
+          <dgm:presOf/>
+          <dgm:constrLst>
+            <dgm:constr type="w" val="1"/>
+            <dgm:constr type="h" val="1"/>
+          </dgm:constrLst>
+          <dgm:ruleLst/>
+        </dgm:layoutNode>
+        <dgm:layoutNode name="dummy2b" moveWith="wedge2">
+          <dgm:alg type="sp"/>
+          <dgm:shape xmlns:r="http://schemas.openxmlformats.org/officeDocument/2006/relationships" r:blip="">
+            <dgm:adjLst/>
+          </dgm:shape>
+          <dgm:presOf/>
+          <dgm:constrLst>
+            <dgm:constr type="w" val="1"/>
+            <dgm:constr type="h" val="1"/>
+          </dgm:constrLst>
+          <dgm:ruleLst/>
+        </dgm:layoutNode>
+        <dgm:layoutNode name="wedge2Tx" moveWith="wedge2">
+          <dgm:varLst>
+            <dgm:chMax val="0"/>
+            <dgm:chPref val="0"/>
+            <dgm:bulletEnabled val="1"/>
+          </dgm:varLst>
+          <dgm:alg type="tx"/>
+          <dgm:shape xmlns:r="http://schemas.openxmlformats.org/officeDocument/2006/relationships" type="rect" r:blip="" hideGeom="1">
+            <dgm:adjLst/>
+          </dgm:shape>
+          <dgm:choose name="Name60">
+            <dgm:if name="Name61" func="var" arg="dir" op="equ" val="norm">
+              <dgm:presOf axis="ch desOrSelf" ptType="node node" st="2 1" cnt="1 0"/>
+            </dgm:if>
+            <dgm:else name="Name62">
+              <dgm:choose name="Name63">
+                <dgm:if name="Name64" axis="ch" ptType="node" func="cnt" op="equ" val="2">
+                  <dgm:presOf axis="ch desOrSelf" ptType="node node" st="1 1" cnt="1 0"/>
+                </dgm:if>
+                <dgm:if name="Name65" axis="ch" ptType="node" func="cnt" op="equ" val="3">
+                  <dgm:presOf axis="ch desOrSelf" ptType="node node" st="2 1" cnt="1 0"/>
+                </dgm:if>
+                <dgm:if name="Name66" axis="ch" ptType="node" func="cnt" op="equ" val="4">
+                  <dgm:presOf axis="ch desOrSelf" ptType="node node" st="3 1" cnt="1 0"/>
+                </dgm:if>
+                <dgm:if name="Name67" axis="ch" ptType="node" func="cnt" op="equ" val="5">
+                  <dgm:presOf axis="ch desOrSelf" ptType="node node" st="4 1" cnt="1 0"/>
+                </dgm:if>
+                <dgm:if name="Name68" axis="ch" ptType="node" func="cnt" op="equ" val="6">
+                  <dgm:presOf axis="ch desOrSelf" ptType="node node" st="5 1" cnt="1 0"/>
+                </dgm:if>
+                <dgm:else name="Name69">
+                  <dgm:presOf axis="ch desOrSelf" ptType="node node" st="6 1" cnt="1 0"/>
+                </dgm:else>
+              </dgm:choose>
+            </dgm:else>
+          </dgm:choose>
+          <dgm:constrLst>
+            <dgm:constr type="tMarg" refType="primFontSz" fact="0.1"/>
+            <dgm:constr type="bMarg" refType="primFontSz" fact="0.1"/>
+            <dgm:constr type="lMarg" refType="primFontSz" fact="0.1"/>
+            <dgm:constr type="rMarg" refType="primFontSz" fact="0.1"/>
+            <dgm:constr type="primFontSz" val="65"/>
+          </dgm:constrLst>
+          <dgm:ruleLst>
+            <dgm:rule type="primFontSz" val="5" fact="NaN" max="NaN"/>
+          </dgm:ruleLst>
+        </dgm:layoutNode>
+      </dgm:if>
+      <dgm:else name="Name70"/>
+    </dgm:choose>
+    <dgm:choose name="Name71">
+      <dgm:if name="Name72" axis="ch" ptType="node" func="cnt" op="gte" val="3">
+        <dgm:layoutNode name="wedge3">
+          <dgm:alg type="sp"/>
+          <dgm:choose name="Name73">
+            <dgm:if name="Name74" axis="ch" ptType="node" func="cnt" op="equ" val="3">
+              <dgm:shape xmlns:r="http://schemas.openxmlformats.org/officeDocument/2006/relationships" type="pie" r:blip="">
+                <dgm:adjLst>
+                  <dgm:adj idx="1" val="150"/>
+                  <dgm:adj idx="2" val="270"/>
+                </dgm:adjLst>
+              </dgm:shape>
+            </dgm:if>
+            <dgm:if name="Name75" axis="ch" ptType="node" func="cnt" op="equ" val="4">
+              <dgm:shape xmlns:r="http://schemas.openxmlformats.org/officeDocument/2006/relationships" type="pie" r:blip="">
+                <dgm:adjLst>
+                  <dgm:adj idx="1" val="90"/>
+                  <dgm:adj idx="2" val="180"/>
+                </dgm:adjLst>
+              </dgm:shape>
+            </dgm:if>
+            <dgm:if name="Name76" axis="ch" ptType="node" func="cnt" op="equ" val="5">
+              <dgm:shape xmlns:r="http://schemas.openxmlformats.org/officeDocument/2006/relationships" type="pie" r:blip="">
+                <dgm:adjLst>
+                  <dgm:adj idx="1" val="54"/>
+                  <dgm:adj idx="2" val="126"/>
+                </dgm:adjLst>
+              </dgm:shape>
+            </dgm:if>
+            <dgm:if name="Name77" axis="ch" ptType="node" func="cnt" op="equ" val="6">
+              <dgm:shape xmlns:r="http://schemas.openxmlformats.org/officeDocument/2006/relationships" type="pie" r:blip="">
+                <dgm:adjLst>
+                  <dgm:adj idx="1" val="30"/>
+                  <dgm:adj idx="2" val="90"/>
+                </dgm:adjLst>
+              </dgm:shape>
+            </dgm:if>
+            <dgm:else name="Name78">
+              <dgm:shape xmlns:r="http://schemas.openxmlformats.org/officeDocument/2006/relationships" type="pie" r:blip="">
+                <dgm:adjLst>
+                  <dgm:adj idx="1" val="12.85714"/>
+                  <dgm:adj idx="2" val="64.28571"/>
+                </dgm:adjLst>
+              </dgm:shape>
+            </dgm:else>
+          </dgm:choose>
+          <dgm:choose name="Name79">
+            <dgm:if name="Name80" func="var" arg="dir" op="equ" val="norm">
+              <dgm:presOf axis="ch desOrSelf" ptType="node node" st="3 1" cnt="1 0"/>
+            </dgm:if>
+            <dgm:else name="Name81">
+              <dgm:choose name="Name82">
+                <dgm:if name="Name83" axis="ch" ptType="node" func="cnt" op="equ" val="3">
+                  <dgm:presOf axis="ch desOrSelf" ptType="node node" st="1 1" cnt="1 0"/>
+                </dgm:if>
+                <dgm:if name="Name84" axis="ch" ptType="node" func="cnt" op="equ" val="4">
+                  <dgm:presOf axis="ch desOrSelf" ptType="node node" st="2 1" cnt="1 0"/>
+                </dgm:if>
+                <dgm:if name="Name85" axis="ch" ptType="node" func="cnt" op="equ" val="5">
+                  <dgm:presOf axis="ch desOrSelf" ptType="node node" st="3 1" cnt="1 0"/>
+                </dgm:if>
+                <dgm:if name="Name86" axis="ch" ptType="node" func="cnt" op="equ" val="6">
+                  <dgm:presOf axis="ch desOrSelf" ptType="node node" st="4 1" cnt="1 0"/>
+                </dgm:if>
+                <dgm:else name="Name87">
+                  <dgm:presOf axis="ch desOrSelf" ptType="node node" st="5 1" cnt="1 0"/>
+                </dgm:else>
+              </dgm:choose>
+            </dgm:else>
+          </dgm:choose>
+          <dgm:constrLst/>
+          <dgm:ruleLst/>
+        </dgm:layoutNode>
+        <dgm:layoutNode name="dummy3a" moveWith="wedge3">
+          <dgm:alg type="sp"/>
+          <dgm:shape xmlns:r="http://schemas.openxmlformats.org/officeDocument/2006/relationships" r:blip="">
+            <dgm:adjLst/>
+          </dgm:shape>
+          <dgm:presOf/>
+          <dgm:constrLst>
+            <dgm:constr type="w" val="1"/>
+            <dgm:constr type="h" val="1"/>
+          </dgm:constrLst>
+          <dgm:ruleLst/>
+        </dgm:layoutNode>
+        <dgm:layoutNode name="dummy3b" moveWith="wedge3">
+          <dgm:alg type="sp"/>
+          <dgm:shape xmlns:r="http://schemas.openxmlformats.org/officeDocument/2006/relationships" r:blip="">
+            <dgm:adjLst/>
+          </dgm:shape>
+          <dgm:presOf/>
+          <dgm:constrLst>
+            <dgm:constr type="w" val="1"/>
+            <dgm:constr type="h" val="1"/>
+          </dgm:constrLst>
+          <dgm:ruleLst/>
+        </dgm:layoutNode>
+        <dgm:layoutNode name="wedge3Tx" moveWith="wedge3">
+          <dgm:varLst>
+            <dgm:chMax val="0"/>
+            <dgm:chPref val="0"/>
+            <dgm:bulletEnabled val="1"/>
+          </dgm:varLst>
+          <dgm:alg type="tx"/>
+          <dgm:shape xmlns:r="http://schemas.openxmlformats.org/officeDocument/2006/relationships" type="rect" r:blip="" hideGeom="1">
+            <dgm:adjLst/>
+          </dgm:shape>
+          <dgm:choose name="Name88">
+            <dgm:if name="Name89" func="var" arg="dir" op="equ" val="norm">
+              <dgm:presOf axis="ch desOrSelf" ptType="node node" st="3 1" cnt="1 0"/>
+            </dgm:if>
+            <dgm:else name="Name90">
+              <dgm:choose name="Name91">
+                <dgm:if name="Name92" axis="ch" ptType="node" func="cnt" op="equ" val="3">
+                  <dgm:presOf axis="ch desOrSelf" ptType="node node" st="1 1" cnt="1 0"/>
+                </dgm:if>
+                <dgm:if name="Name93" axis="ch" ptType="node" func="cnt" op="equ" val="4">
+                  <dgm:presOf axis="ch desOrSelf" ptType="node node" st="2 1" cnt="1 0"/>
+                </dgm:if>
+                <dgm:if name="Name94" axis="ch" ptType="node" func="cnt" op="equ" val="5">
+                  <dgm:presOf axis="ch desOrSelf" ptType="node node" st="3 1" cnt="1 0"/>
+                </dgm:if>
+                <dgm:if name="Name95" axis="ch" ptType="node" func="cnt" op="equ" val="6">
+                  <dgm:presOf axis="ch desOrSelf" ptType="node node" st="4 1" cnt="1 0"/>
+                </dgm:if>
+                <dgm:else name="Name96">
+                  <dgm:presOf axis="ch desOrSelf" ptType="node node" st="5 1" cnt="1 0"/>
+                </dgm:else>
+              </dgm:choose>
+            </dgm:else>
+          </dgm:choose>
+          <dgm:constrLst>
+            <dgm:constr type="tMarg" refType="primFontSz" fact="0.1"/>
+            <dgm:constr type="bMarg" refType="primFontSz" fact="0.1"/>
+            <dgm:constr type="lMarg" refType="primFontSz" fact="0.1"/>
+            <dgm:constr type="rMarg" refType="primFontSz" fact="0.1"/>
+            <dgm:constr type="primFontSz" val="65"/>
+          </dgm:constrLst>
+          <dgm:ruleLst>
+            <dgm:rule type="primFontSz" val="5" fact="NaN" max="NaN"/>
+          </dgm:ruleLst>
+        </dgm:layoutNode>
+      </dgm:if>
+      <dgm:else name="Name97"/>
+    </dgm:choose>
+    <dgm:choose name="Name98">
+      <dgm:if name="Name99" axis="ch" ptType="node" func="cnt" op="gte" val="4">
+        <dgm:layoutNode name="wedge4">
+          <dgm:alg type="sp"/>
+          <dgm:choose name="Name100">
+            <dgm:if name="Name101" axis="ch" ptType="node" func="cnt" op="equ" val="4">
+              <dgm:shape xmlns:r="http://schemas.openxmlformats.org/officeDocument/2006/relationships" type="pie" r:blip="">
+                <dgm:adjLst>
+                  <dgm:adj idx="1" val="180"/>
+                  <dgm:adj idx="2" val="270"/>
+                </dgm:adjLst>
+              </dgm:shape>
+            </dgm:if>
+            <dgm:if name="Name102" axis="ch" ptType="node" func="cnt" op="equ" val="5">
+              <dgm:shape xmlns:r="http://schemas.openxmlformats.org/officeDocument/2006/relationships" type="pie" r:blip="">
+                <dgm:adjLst>
+                  <dgm:adj idx="1" val="126"/>
+                  <dgm:adj idx="2" val="198"/>
+                </dgm:adjLst>
+              </dgm:shape>
+            </dgm:if>
+            <dgm:if name="Name103" axis="ch" ptType="node" func="cnt" op="equ" val="6">
+              <dgm:shape xmlns:r="http://schemas.openxmlformats.org/officeDocument/2006/relationships" type="pie" r:blip="">
+                <dgm:adjLst>
+                  <dgm:adj idx="1" val="90"/>
+                  <dgm:adj idx="2" val="150"/>
+                </dgm:adjLst>
+              </dgm:shape>
+            </dgm:if>
+            <dgm:else name="Name104">
+              <dgm:shape xmlns:r="http://schemas.openxmlformats.org/officeDocument/2006/relationships" type="pie" r:blip="">
+                <dgm:adjLst>
+                  <dgm:adj idx="1" val="64.2871"/>
+                  <dgm:adj idx="2" val="115.7143"/>
+                </dgm:adjLst>
+              </dgm:shape>
+            </dgm:else>
+          </dgm:choose>
+          <dgm:choose name="Name105">
+            <dgm:if name="Name106" func="var" arg="dir" op="equ" val="norm">
+              <dgm:presOf axis="ch desOrSelf" ptType="node node" st="4 1" cnt="1 0"/>
+            </dgm:if>
+            <dgm:else name="Name107">
+              <dgm:choose name="Name108">
+                <dgm:if name="Name109" axis="ch" ptType="node" func="cnt" op="equ" val="4">
+                  <dgm:presOf axis="ch desOrSelf" ptType="node node" st="1 1" cnt="1 0"/>
+                </dgm:if>
+                <dgm:if name="Name110" axis="ch" ptType="node" func="cnt" op="equ" val="5">
+                  <dgm:presOf axis="ch desOrSelf" ptType="node node" st="2 1" cnt="1 0"/>
+                </dgm:if>
+                <dgm:if name="Name111" axis="ch" ptType="node" func="cnt" op="equ" val="6">
+                  <dgm:presOf axis="ch desOrSelf" ptType="node node" st="3 1" cnt="1 0"/>
+                </dgm:if>
+                <dgm:else name="Name112">
+                  <dgm:presOf axis="ch desOrSelf" ptType="node node" st="4 1" cnt="1 0"/>
+                </dgm:else>
+              </dgm:choose>
+            </dgm:else>
+          </dgm:choose>
+          <dgm:constrLst/>
+          <dgm:ruleLst/>
+        </dgm:layoutNode>
+        <dgm:layoutNode name="dummy4a" moveWith="wedge4">
+          <dgm:alg type="sp"/>
+          <dgm:shape xmlns:r="http://schemas.openxmlformats.org/officeDocument/2006/relationships" r:blip="">
+            <dgm:adjLst/>
+          </dgm:shape>
+          <dgm:presOf/>
+          <dgm:constrLst>
+            <dgm:constr type="w" val="1"/>
+            <dgm:constr type="h" val="1"/>
+          </dgm:constrLst>
+          <dgm:ruleLst/>
+        </dgm:layoutNode>
+        <dgm:layoutNode name="dummy4b" moveWith="wedge4">
+          <dgm:alg type="sp"/>
+          <dgm:shape xmlns:r="http://schemas.openxmlformats.org/officeDocument/2006/relationships" r:blip="">
+            <dgm:adjLst/>
+          </dgm:shape>
+          <dgm:presOf/>
+          <dgm:constrLst>
+            <dgm:constr type="w" val="1"/>
+            <dgm:constr type="h" val="1"/>
+          </dgm:constrLst>
+          <dgm:ruleLst/>
+        </dgm:layoutNode>
+        <dgm:layoutNode name="wedge4Tx" moveWith="wedge4">
+          <dgm:varLst>
+            <dgm:chMax val="0"/>
+            <dgm:chPref val="0"/>
+            <dgm:bulletEnabled val="1"/>
+          </dgm:varLst>
+          <dgm:alg type="tx"/>
+          <dgm:shape xmlns:r="http://schemas.openxmlformats.org/officeDocument/2006/relationships" type="rect" r:blip="" hideGeom="1">
+            <dgm:adjLst/>
+          </dgm:shape>
+          <dgm:choose name="Name113">
+            <dgm:if name="Name114" func="var" arg="dir" op="equ" val="norm">
+              <dgm:presOf axis="ch desOrSelf" ptType="node node" st="4 1" cnt="1 0"/>
+            </dgm:if>
+            <dgm:else name="Name115">
+              <dgm:choose name="Name116">
+                <dgm:if name="Name117" axis="ch" ptType="node" func="cnt" op="equ" val="4">
+                  <dgm:presOf axis="ch desOrSelf" ptType="node node" st="1 1" cnt="1 0"/>
+                </dgm:if>
+                <dgm:if name="Name118" axis="ch" ptType="node" func="cnt" op="equ" val="5">
+                  <dgm:presOf axis="ch desOrSelf" ptType="node node" st="2 1" cnt="1 0"/>
+                </dgm:if>
+                <dgm:if name="Name119" axis="ch" ptType="node" func="cnt" op="equ" val="6">
+                  <dgm:presOf axis="ch desOrSelf" ptType="node node" st="3 1" cnt="1 0"/>
+                </dgm:if>
+                <dgm:else name="Name120">
+                  <dgm:presOf axis="ch desOrSelf" ptType="node node" st="4 1" cnt="1 0"/>
+                </dgm:else>
+              </dgm:choose>
+            </dgm:else>
+          </dgm:choose>
+          <dgm:constrLst>
+            <dgm:constr type="tMarg" refType="primFontSz" fact="0.1"/>
+            <dgm:constr type="bMarg" refType="primFontSz" fact="0.1"/>
+            <dgm:constr type="lMarg" refType="primFontSz" fact="0.1"/>
+            <dgm:constr type="rMarg" refType="primFontSz" fact="0.1"/>
+            <dgm:constr type="primFontSz" val="65"/>
+          </dgm:constrLst>
+          <dgm:ruleLst>
+            <dgm:rule type="primFontSz" val="5" fact="NaN" max="NaN"/>
+          </dgm:ruleLst>
+        </dgm:layoutNode>
+      </dgm:if>
+      <dgm:else name="Name121"/>
+    </dgm:choose>
+    <dgm:choose name="Name122">
+      <dgm:if name="Name123" axis="ch" ptType="node" func="cnt" op="gte" val="5">
+        <dgm:layoutNode name="wedge5">
+          <dgm:alg type="sp"/>
+          <dgm:choose name="Name124">
+            <dgm:if name="Name125" axis="ch" ptType="node" func="cnt" op="equ" val="5">
+              <dgm:shape xmlns:r="http://schemas.openxmlformats.org/officeDocument/2006/relationships" type="pie" r:blip="">
+                <dgm:adjLst>
+                  <dgm:adj idx="1" val="198"/>
+                  <dgm:adj idx="2" val="270"/>
+                </dgm:adjLst>
+              </dgm:shape>
+            </dgm:if>
+            <dgm:if name="Name126" axis="ch" ptType="node" func="cnt" op="equ" val="6">
+              <dgm:shape xmlns:r="http://schemas.openxmlformats.org/officeDocument/2006/relationships" type="pie" r:blip="">
+                <dgm:adjLst>
+                  <dgm:adj idx="1" val="150"/>
+                  <dgm:adj idx="2" val="210"/>
+                </dgm:adjLst>
+              </dgm:shape>
+            </dgm:if>
+            <dgm:else name="Name127">
+              <dgm:shape xmlns:r="http://schemas.openxmlformats.org/officeDocument/2006/relationships" type="pie" r:blip="">
+                <dgm:adjLst>
+                  <dgm:adj idx="1" val="115.7143"/>
+                  <dgm:adj idx="2" val="167.1429"/>
+                </dgm:adjLst>
+              </dgm:shape>
+            </dgm:else>
+          </dgm:choose>
+          <dgm:choose name="Name128">
+            <dgm:if name="Name129" func="var" arg="dir" op="equ" val="norm">
+              <dgm:presOf axis="ch desOrSelf" ptType="node node" st="5 1" cnt="1 0"/>
+            </dgm:if>
+            <dgm:else name="Name130">
+              <dgm:choose name="Name131">
+                <dgm:if name="Name132" axis="ch" ptType="node" func="cnt" op="equ" val="5">
+                  <dgm:presOf axis="ch desOrSelf" ptType="node node" st="1 1" cnt="1 0"/>
+                </dgm:if>
+                <dgm:if name="Name133" axis="ch" ptType="node" func="cnt" op="equ" val="6">
+                  <dgm:presOf axis="ch desOrSelf" ptType="node node" st="2 1" cnt="1 0"/>
+                </dgm:if>
+                <dgm:else name="Name134">
+                  <dgm:presOf axis="ch desOrSelf" ptType="node node" st="3 1" cnt="1 0"/>
+                </dgm:else>
+              </dgm:choose>
+            </dgm:else>
+          </dgm:choose>
+          <dgm:constrLst/>
+          <dgm:ruleLst/>
+        </dgm:layoutNode>
+        <dgm:layoutNode name="dummy5a" moveWith="wedge5">
+          <dgm:alg type="sp"/>
+          <dgm:shape xmlns:r="http://schemas.openxmlformats.org/officeDocument/2006/relationships" r:blip="">
+            <dgm:adjLst/>
+          </dgm:shape>
+          <dgm:presOf/>
+          <dgm:constrLst>
+            <dgm:constr type="w" val="1"/>
+            <dgm:constr type="h" val="1"/>
+          </dgm:constrLst>
+          <dgm:ruleLst/>
+        </dgm:layoutNode>
+        <dgm:layoutNode name="dummy5b" moveWith="wedge5">
+          <dgm:alg type="sp"/>
+          <dgm:shape xmlns:r="http://schemas.openxmlformats.org/officeDocument/2006/relationships" r:blip="">
+            <dgm:adjLst/>
+          </dgm:shape>
+          <dgm:presOf/>
+          <dgm:constrLst>
+            <dgm:constr type="w" val="1"/>
+            <dgm:constr type="h" val="1"/>
+          </dgm:constrLst>
+          <dgm:ruleLst/>
+        </dgm:layoutNode>
+        <dgm:layoutNode name="wedge5Tx" moveWith="wedge5">
+          <dgm:varLst>
+            <dgm:chMax val="0"/>
+            <dgm:chPref val="0"/>
+            <dgm:bulletEnabled val="1"/>
+          </dgm:varLst>
+          <dgm:alg type="tx"/>
+          <dgm:shape xmlns:r="http://schemas.openxmlformats.org/officeDocument/2006/relationships" type="rect" r:blip="" hideGeom="1">
+            <dgm:adjLst/>
+          </dgm:shape>
+          <dgm:choose name="Name135">
+            <dgm:if name="Name136" func="var" arg="dir" op="equ" val="norm">
+              <dgm:presOf axis="ch desOrSelf" ptType="node node" st="5 1" cnt="1 0"/>
+            </dgm:if>
+            <dgm:else name="Name137">
+              <dgm:choose name="Name138">
+                <dgm:if name="Name139" axis="ch" ptType="node" func="cnt" op="equ" val="5">
+                  <dgm:presOf axis="ch desOrSelf" ptType="node node" st="1 1" cnt="1 0"/>
+                </dgm:if>
+                <dgm:if name="Name140" axis="ch" ptType="node" func="cnt" op="equ" val="6">
+                  <dgm:presOf axis="ch desOrSelf" ptType="node node" st="2 1" cnt="1 0"/>
+                </dgm:if>
+                <dgm:else name="Name141">
+                  <dgm:presOf axis="ch desOrSelf" ptType="node node" st="3 1" cnt="1 0"/>
+                </dgm:else>
+              </dgm:choose>
+            </dgm:else>
+          </dgm:choose>
+          <dgm:constrLst>
+            <dgm:constr type="tMarg" refType="primFontSz" fact="0.1"/>
+            <dgm:constr type="bMarg" refType="primFontSz" fact="0.1"/>
+            <dgm:constr type="lMarg" refType="primFontSz" fact="0.1"/>
+            <dgm:constr type="rMarg" refType="primFontSz" fact="0.1"/>
+            <dgm:constr type="primFontSz" val="65"/>
+          </dgm:constrLst>
+          <dgm:ruleLst>
+            <dgm:rule type="primFontSz" val="5" fact="NaN" max="NaN"/>
+          </dgm:ruleLst>
+        </dgm:layoutNode>
+      </dgm:if>
+      <dgm:else name="Name142"/>
+    </dgm:choose>
+    <dgm:choose name="Name143">
+      <dgm:if name="Name144" axis="ch" ptType="node" func="cnt" op="gte" val="6">
+        <dgm:layoutNode name="wedge6">
+          <dgm:alg type="sp"/>
+          <dgm:choose name="Name145">
+            <dgm:if name="Name146" axis="ch" ptType="node" func="cnt" op="equ" val="6">
+              <dgm:shape xmlns:r="http://schemas.openxmlformats.org/officeDocument/2006/relationships" type="pie" r:blip="">
+                <dgm:adjLst>
+                  <dgm:adj idx="1" val="210"/>
+                  <dgm:adj idx="2" val="270"/>
+                </dgm:adjLst>
+              </dgm:shape>
+            </dgm:if>
+            <dgm:else name="Name147">
+              <dgm:shape xmlns:r="http://schemas.openxmlformats.org/officeDocument/2006/relationships" type="pie" r:blip="">
+                <dgm:adjLst>
+                  <dgm:adj idx="1" val="167.1429"/>
+                  <dgm:adj idx="2" val="218.5714"/>
+                </dgm:adjLst>
+              </dgm:shape>
+            </dgm:else>
+          </dgm:choose>
+          <dgm:choose name="Name148">
+            <dgm:if name="Name149" func="var" arg="dir" op="equ" val="norm">
+              <dgm:presOf axis="ch desOrSelf" ptType="node node" st="6 1" cnt="1 0"/>
+            </dgm:if>
+            <dgm:else name="Name150">
+              <dgm:choose name="Name151">
+                <dgm:if name="Name152" axis="ch" ptType="node" func="cnt" op="equ" val="6">
+                  <dgm:presOf axis="ch desOrSelf" ptType="node node" st="1 1" cnt="1 0"/>
+                </dgm:if>
+                <dgm:else name="Name153">
+                  <dgm:presOf axis="ch desOrSelf" ptType="node node" st="2 1" cnt="1 0"/>
+                </dgm:else>
+              </dgm:choose>
+            </dgm:else>
+          </dgm:choose>
+          <dgm:constrLst/>
+          <dgm:ruleLst/>
+        </dgm:layoutNode>
+        <dgm:layoutNode name="dummy6a" moveWith="wedge6">
+          <dgm:alg type="sp"/>
+          <dgm:shape xmlns:r="http://schemas.openxmlformats.org/officeDocument/2006/relationships" r:blip="">
+            <dgm:adjLst/>
+          </dgm:shape>
+          <dgm:presOf/>
+          <dgm:constrLst>
+            <dgm:constr type="w" val="1"/>
+            <dgm:constr type="h" val="1"/>
+          </dgm:constrLst>
+          <dgm:ruleLst/>
+        </dgm:layoutNode>
+        <dgm:layoutNode name="dummy6b" moveWith="wedge6">
+          <dgm:alg type="sp"/>
+          <dgm:shape xmlns:r="http://schemas.openxmlformats.org/officeDocument/2006/relationships" r:blip="">
+            <dgm:adjLst/>
+          </dgm:shape>
+          <dgm:presOf/>
+          <dgm:constrLst>
+            <dgm:constr type="w" val="1"/>
+            <dgm:constr type="h" val="1"/>
+          </dgm:constrLst>
+          <dgm:ruleLst/>
+        </dgm:layoutNode>
+        <dgm:layoutNode name="wedge6Tx" moveWith="wedge6">
+          <dgm:varLst>
+            <dgm:chMax val="0"/>
+            <dgm:chPref val="0"/>
+            <dgm:bulletEnabled val="1"/>
+          </dgm:varLst>
+          <dgm:alg type="tx"/>
+          <dgm:shape xmlns:r="http://schemas.openxmlformats.org/officeDocument/2006/relationships" type="rect" r:blip="" hideGeom="1">
+            <dgm:adjLst/>
+          </dgm:shape>
+          <dgm:choose name="Name154">
+            <dgm:if name="Name155" func="var" arg="dir" op="equ" val="norm">
+              <dgm:presOf axis="ch desOrSelf" ptType="node node" st="6 1" cnt="1 0"/>
+            </dgm:if>
+            <dgm:else name="Name156">
+              <dgm:choose name="Name157">
+                <dgm:if name="Name158" axis="ch" ptType="node" func="cnt" op="equ" val="6">
+                  <dgm:presOf axis="ch desOrSelf" ptType="node node" st="1 1" cnt="1 0"/>
+                </dgm:if>
+                <dgm:else name="Name159">
+                  <dgm:presOf axis="ch desOrSelf" ptType="node node" st="2 1" cnt="1 0"/>
+                </dgm:else>
+              </dgm:choose>
+            </dgm:else>
+          </dgm:choose>
+          <dgm:constrLst>
+            <dgm:constr type="tMarg" refType="primFontSz" fact="0.1"/>
+            <dgm:constr type="bMarg" refType="primFontSz" fact="0.1"/>
+            <dgm:constr type="lMarg" refType="primFontSz" fact="0.1"/>
+            <dgm:constr type="rMarg" refType="primFontSz" fact="0.1"/>
+            <dgm:constr type="primFontSz" val="65"/>
+          </dgm:constrLst>
+          <dgm:ruleLst>
+            <dgm:rule type="primFontSz" val="5" fact="NaN" max="NaN"/>
+          </dgm:ruleLst>
+        </dgm:layoutNode>
+      </dgm:if>
+      <dgm:else name="Name160"/>
+    </dgm:choose>
+    <dgm:choose name="Name161">
+      <dgm:if name="Name162" axis="ch" ptType="node" func="cnt" op="gte" val="7">
+        <dgm:layoutNode name="wedge7">
+          <dgm:alg type="sp"/>
+          <dgm:shape xmlns:r="http://schemas.openxmlformats.org/officeDocument/2006/relationships" type="pie" r:blip="">
+            <dgm:adjLst>
+              <dgm:adj idx="1" val="218.5714"/>
+              <dgm:adj idx="2" val="270"/>
+            </dgm:adjLst>
+          </dgm:shape>
+          <dgm:choose name="Name163">
+            <dgm:if name="Name164" func="var" arg="dir" op="equ" val="norm">
+              <dgm:presOf axis="ch desOrSelf" ptType="node node" st="7 1" cnt="1 0"/>
+            </dgm:if>
+            <dgm:else name="Name165">
+              <dgm:presOf axis="ch desOrSelf" ptType="node node" st="1 1" cnt="1 0"/>
+            </dgm:else>
+          </dgm:choose>
+          <dgm:constrLst/>
+          <dgm:ruleLst/>
+        </dgm:layoutNode>
+        <dgm:layoutNode name="dummy7a" moveWith="wedge7">
+          <dgm:alg type="sp"/>
+          <dgm:shape xmlns:r="http://schemas.openxmlformats.org/officeDocument/2006/relationships" r:blip="">
+            <dgm:adjLst/>
+          </dgm:shape>
+          <dgm:presOf/>
+          <dgm:constrLst>
+            <dgm:constr type="w" val="1"/>
+            <dgm:constr type="h" val="1"/>
+          </dgm:constrLst>
+          <dgm:ruleLst/>
+        </dgm:layoutNode>
+        <dgm:layoutNode name="dummy7b" moveWith="wedge7">
+          <dgm:alg type="sp"/>
+          <dgm:shape xmlns:r="http://schemas.openxmlformats.org/officeDocument/2006/relationships" r:blip="">
+            <dgm:adjLst/>
+          </dgm:shape>
+          <dgm:presOf/>
+          <dgm:constrLst>
+            <dgm:constr type="w" val="1"/>
+            <dgm:constr type="h" val="1"/>
+          </dgm:constrLst>
+          <dgm:ruleLst/>
+        </dgm:layoutNode>
+        <dgm:layoutNode name="wedge7Tx" moveWith="wedge7">
+          <dgm:varLst>
+            <dgm:chMax val="0"/>
+            <dgm:chPref val="0"/>
+            <dgm:bulletEnabled val="1"/>
+          </dgm:varLst>
+          <dgm:alg type="tx"/>
+          <dgm:shape xmlns:r="http://schemas.openxmlformats.org/officeDocument/2006/relationships" type="rect" r:blip="" hideGeom="1">
+            <dgm:adjLst/>
+          </dgm:shape>
+          <dgm:choose name="Name166">
+            <dgm:if name="Name167" func="var" arg="dir" op="equ" val="norm">
+              <dgm:presOf axis="ch desOrSelf" ptType="node node" st="7 1" cnt="1 0"/>
+            </dgm:if>
+            <dgm:else name="Name168">
+              <dgm:presOf axis="ch desOrSelf" ptType="node node" st="1 1" cnt="1 0"/>
+            </dgm:else>
+          </dgm:choose>
+          <dgm:constrLst>
+            <dgm:constr type="tMarg" refType="primFontSz" fact="0.1"/>
+            <dgm:constr type="bMarg" refType="primFontSz" fact="0.1"/>
+            <dgm:constr type="lMarg" refType="primFontSz" fact="0.1"/>
+            <dgm:constr type="rMarg" refType="primFontSz" fact="0.1"/>
+            <dgm:constr type="primFontSz" val="65"/>
+          </dgm:constrLst>
+          <dgm:ruleLst>
+            <dgm:rule type="primFontSz" val="5" fact="NaN" max="NaN"/>
+          </dgm:ruleLst>
+        </dgm:layoutNode>
+      </dgm:if>
+      <dgm:else name="Name169"/>
+    </dgm:choose>
+    <dgm:choose name="Name170">
+      <dgm:if name="Name171" axis="ch" ptType="node" func="cnt" op="equ" val="1">
+        <dgm:forEach name="Name172" axis="ch" ptType="sibTrans" hideLastTrans="0" cnt="1">
+          <dgm:layoutNode name="arrowWedge1single" styleLbl="fgSibTrans2D1">
+            <dgm:choose name="Name173">
+              <dgm:if name="Name174" func="var" arg="dir" op="equ" val="norm">
+                <dgm:alg type="conn">
+                  <dgm:param type="connRout" val="longCurve"/>
+                  <dgm:param type="srcNode" val="dummy1a"/>
+                  <dgm:param type="dstNode" val="dummy1b"/>
+                  <dgm:param type="begPts" val="tL"/>
+                  <dgm:param type="endPts" val="tR"/>
+                  <dgm:param type="begSty" val="arr"/>
+                  <dgm:param type="endSty" val="noArr"/>
+                </dgm:alg>
+              </dgm:if>
+              <dgm:else name="Name175">
+                <dgm:alg type="conn">
+                  <dgm:param type="connRout" val="longCurve"/>
+                  <dgm:param type="srcNode" val="dummy1a"/>
+                  <dgm:param type="dstNode" val="dummy1b"/>
+                  <dgm:param type="begPts" val="tL"/>
+                  <dgm:param type="endPts" val="tR"/>
+                  <dgm:param type="begSty" val="noArr"/>
+                  <dgm:param type="endSty" val="arr"/>
+                </dgm:alg>
+              </dgm:else>
+            </dgm:choose>
+            <dgm:shape xmlns:r="http://schemas.openxmlformats.org/officeDocument/2006/relationships" type="conn" r:blip="">
+              <dgm:adjLst/>
+            </dgm:shape>
+            <dgm:presOf/>
+            <dgm:constrLst>
+              <dgm:constr type="w" val="1"/>
+              <dgm:constr type="begPad"/>
+              <dgm:constr type="endPad"/>
+            </dgm:constrLst>
+            <dgm:ruleLst/>
+          </dgm:layoutNode>
+        </dgm:forEach>
+      </dgm:if>
+      <dgm:if name="Name176" axis="ch" ptType="node" func="cnt" op="gte" val="2">
+        <dgm:forEach name="Name177" axis="ch" ptType="sibTrans" hideLastTrans="0" cnt="1">
+          <dgm:layoutNode name="arrowWedge1" styleLbl="fgSibTrans2D1">
+            <dgm:choose name="Name178">
+              <dgm:if name="Name179" func="var" arg="dir" op="equ" val="norm">
+                <dgm:alg type="conn">
+                  <dgm:param type="connRout" val="curve"/>
+                  <dgm:param type="srcNode" val="dummy1a"/>
+                  <dgm:param type="dstNode" val="dummy1b"/>
+                  <dgm:param type="begPts" val="tL"/>
+                  <dgm:param type="endPts" val="tL"/>
+                  <dgm:param type="begSty" val="noArr"/>
+                  <dgm:param type="endSty" val="arr"/>
+                </dgm:alg>
+              </dgm:if>
+              <dgm:else name="Name180">
+                <dgm:alg type="conn">
+                  <dgm:param type="connRout" val="curve"/>
+                  <dgm:param type="srcNode" val="dummy1a"/>
+                  <dgm:param type="dstNode" val="dummy1b"/>
+                  <dgm:param type="begPts" val="tL"/>
+                  <dgm:param type="endPts" val="tL"/>
+                  <dgm:param type="begSty" val="arr"/>
+                  <dgm:param type="endSty" val="noArr"/>
+                </dgm:alg>
+              </dgm:else>
+            </dgm:choose>
+            <dgm:shape xmlns:r="http://schemas.openxmlformats.org/officeDocument/2006/relationships" type="conn" r:blip="">
+              <dgm:adjLst/>
+            </dgm:shape>
+            <dgm:presOf/>
+            <dgm:constrLst>
+              <dgm:constr type="w" val="1"/>
+              <dgm:constr type="begPad"/>
+              <dgm:constr type="endPad"/>
+            </dgm:constrLst>
+            <dgm:ruleLst/>
+          </dgm:layoutNode>
+        </dgm:forEach>
+      </dgm:if>
+      <dgm:else name="Name181"/>
+    </dgm:choose>
+    <dgm:forEach name="Name182" axis="ch" ptType="sibTrans" hideLastTrans="0" st="2" cnt="1">
+      <dgm:layoutNode name="arrowWedge2" styleLbl="fgSibTrans2D1">
+        <dgm:choose name="Name183">
+          <dgm:if name="Name184" func="var" arg="dir" op="equ" val="norm">
+            <dgm:alg type="conn">
+              <dgm:param type="connRout" val="curve"/>
+              <dgm:param type="srcNode" val="dummy2a"/>
+              <dgm:param type="dstNode" val="dummy2b"/>
+              <dgm:param type="begPts" val="tL"/>
+              <dgm:param type="endPts" val="tL"/>
+              <dgm:param type="begSty" val="noArr"/>
+              <dgm:param type="endSty" val="arr"/>
+            </dgm:alg>
+          </dgm:if>
+          <dgm:else name="Name185">
+            <dgm:alg type="conn">
+              <dgm:param type="connRout" val="curve"/>
+              <dgm:param type="srcNode" val="dummy2a"/>
+              <dgm:param type="dstNode" val="dummy2b"/>
+              <dgm:param type="begPts" val="tL"/>
+              <dgm:param type="endPts" val="tL"/>
+              <dgm:param type="begSty" val="arr"/>
+              <dgm:param type="endSty" val="noArr"/>
+            </dgm:alg>
+          </dgm:else>
+        </dgm:choose>
+        <dgm:shape xmlns:r="http://schemas.openxmlformats.org/officeDocument/2006/relationships" type="conn" r:blip="">
+          <dgm:adjLst/>
+        </dgm:shape>
+        <dgm:presOf/>
+        <dgm:constrLst>
+          <dgm:constr type="w" val="1"/>
+          <dgm:constr type="begPad"/>
+          <dgm:constr type="endPad"/>
+        </dgm:constrLst>
+        <dgm:ruleLst/>
+      </dgm:layoutNode>
+    </dgm:forEach>
+    <dgm:forEach name="Name186" axis="ch" ptType="sibTrans" hideLastTrans="0" st="3" cnt="1">
+      <dgm:layoutNode name="arrowWedge3" styleLbl="fgSibTrans2D1">
+        <dgm:choose name="Name187">
+          <dgm:if name="Name188" func="var" arg="dir" op="equ" val="norm">
+            <dgm:alg type="conn">
+              <dgm:param type="connRout" val="curve"/>
+              <dgm:param type="srcNode" val="dummy3a"/>
+              <dgm:param type="dstNode" val="dummy3b"/>
+              <dgm:param type="begPts" val="tL"/>
+              <dgm:param type="endPts" val="tL"/>
+              <dgm:param type="begSty" val="noArr"/>
+              <dgm:param type="endSty" val="arr"/>
+            </dgm:alg>
+          </dgm:if>
+          <dgm:else name="Name189">
+            <dgm:alg type="conn">
+              <dgm:param type="connRout" val="curve"/>
+              <dgm:param type="srcNode" val="dummy3a"/>
+              <dgm:param type="dstNode" val="dummy3b"/>
+              <dgm:param type="begPts" val="tL"/>
+              <dgm:param type="endPts" val="tL"/>
+              <dgm:param type="begSty" val="arr"/>
+              <dgm:param type="endSty" val="noArr"/>
+            </dgm:alg>
+          </dgm:else>
+        </dgm:choose>
+        <dgm:shape xmlns:r="http://schemas.openxmlformats.org/officeDocument/2006/relationships" type="conn" r:blip="">
+          <dgm:adjLst/>
+        </dgm:shape>
+        <dgm:presOf/>
+        <dgm:constrLst>
+          <dgm:constr type="w" val="1"/>
+          <dgm:constr type="begPad"/>
+          <dgm:constr type="endPad"/>
+        </dgm:constrLst>
+        <dgm:ruleLst/>
+      </dgm:layoutNode>
+    </dgm:forEach>
+    <dgm:forEach name="Name190" axis="ch" ptType="sibTrans" hideLastTrans="0" st="4" cnt="1">
+      <dgm:layoutNode name="arrowWedge4" styleLbl="fgSibTrans2D1">
+        <dgm:choose name="Name191">
+          <dgm:if name="Name192" func="var" arg="dir" op="equ" val="norm">
+            <dgm:alg type="conn">
+              <dgm:param type="connRout" val="curve"/>
+              <dgm:param type="srcNode" val="dummy4a"/>
+              <dgm:param type="dstNode" val="dummy4b"/>
+              <dgm:param type="begPts" val="tL"/>
+              <dgm:param type="endPts" val="tL"/>
+              <dgm:param type="begSty" val="noArr"/>
+              <dgm:param type="endSty" val="arr"/>
+            </dgm:alg>
+          </dgm:if>
+          <dgm:else name="Name193">
+            <dgm:alg type="conn">
+              <dgm:param type="connRout" val="curve"/>
+              <dgm:param type="srcNode" val="dummy4a"/>
+              <dgm:param type="dstNode" val="dummy4b"/>
+              <dgm:param type="begPts" val="tL"/>
+              <dgm:param type="endPts" val="tL"/>
+              <dgm:param type="begSty" val="arr"/>
+              <dgm:param type="endSty" val="noArr"/>
+            </dgm:alg>
+          </dgm:else>
+        </dgm:choose>
+        <dgm:shape xmlns:r="http://schemas.openxmlformats.org/officeDocument/2006/relationships" type="conn" r:blip="">
+          <dgm:adjLst/>
+        </dgm:shape>
+        <dgm:presOf/>
+        <dgm:constrLst>
+          <dgm:constr type="w" val="1"/>
+          <dgm:constr type="begPad"/>
+          <dgm:constr type="endPad"/>
+        </dgm:constrLst>
+        <dgm:ruleLst/>
+      </dgm:layoutNode>
+    </dgm:forEach>
+    <dgm:forEach name="Name194" axis="ch" ptType="sibTrans" hideLastTrans="0" st="5" cnt="1">
+      <dgm:layoutNode name="arrowWedge5" styleLbl="fgSibTrans2D1">
+        <dgm:choose name="Name195">
+          <dgm:if name="Name196" func="var" arg="dir" op="equ" val="norm">
+            <dgm:alg type="conn">
+              <dgm:param type="connRout" val="curve"/>
+              <dgm:param type="srcNode" val="dummy5a"/>
+              <dgm:param type="dstNode" val="dummy5b"/>
+              <dgm:param type="begPts" val="tL"/>
+              <dgm:param type="endPts" val="tL"/>
+              <dgm:param type="begSty" val="noArr"/>
+              <dgm:param type="endSty" val="arr"/>
+            </dgm:alg>
+          </dgm:if>
+          <dgm:else name="Name197">
+            <dgm:alg type="conn">
+              <dgm:param type="connRout" val="curve"/>
+              <dgm:param type="srcNode" val="dummy5a"/>
+              <dgm:param type="dstNode" val="dummy5b"/>
+              <dgm:param type="begPts" val="tL"/>
+              <dgm:param type="endPts" val="tL"/>
+              <dgm:param type="begSty" val="arr"/>
+              <dgm:param type="endSty" val="noArr"/>
+            </dgm:alg>
+          </dgm:else>
+        </dgm:choose>
+        <dgm:shape xmlns:r="http://schemas.openxmlformats.org/officeDocument/2006/relationships" type="conn" r:blip="">
+          <dgm:adjLst/>
+        </dgm:shape>
+        <dgm:presOf/>
+        <dgm:constrLst>
+          <dgm:constr type="w" val="1"/>
+          <dgm:constr type="begPad"/>
+          <dgm:constr type="endPad"/>
+        </dgm:constrLst>
+        <dgm:ruleLst/>
+      </dgm:layoutNode>
+    </dgm:forEach>
+    <dgm:forEach name="Name198" axis="ch" ptType="sibTrans" hideLastTrans="0" st="6" cnt="1">
+      <dgm:layoutNode name="arrowWedge6" styleLbl="fgSibTrans2D1">
+        <dgm:choose name="Name199">
+          <dgm:if name="Name200" func="var" arg="dir" op="equ" val="norm">
+            <dgm:alg type="conn">
+              <dgm:param type="connRout" val="curve"/>
+              <dgm:param type="srcNode" val="dummy6a"/>
+              <dgm:param type="dstNode" val="dummy6b"/>
+              <dgm:param type="begPts" val="tL"/>
+              <dgm:param type="endPts" val="tL"/>
+              <dgm:param type="begSty" val="noArr"/>
+              <dgm:param type="endSty" val="arr"/>
+            </dgm:alg>
+          </dgm:if>
+          <dgm:else name="Name201">
+            <dgm:alg type="conn">
+              <dgm:param type="connRout" val="curve"/>
+              <dgm:param type="srcNode" val="dummy6a"/>
+              <dgm:param type="dstNode" val="dummy6b"/>
+              <dgm:param type="begPts" val="tL"/>
+              <dgm:param type="endPts" val="tL"/>
+              <dgm:param type="begSty" val="arr"/>
+              <dgm:param type="endSty" val="noArr"/>
+            </dgm:alg>
+          </dgm:else>
+        </dgm:choose>
+        <dgm:shape xmlns:r="http://schemas.openxmlformats.org/officeDocument/2006/relationships" type="conn" r:blip="">
+          <dgm:adjLst/>
+        </dgm:shape>
+        <dgm:presOf/>
+        <dgm:constrLst>
+          <dgm:constr type="w" val="1"/>
+          <dgm:constr type="begPad"/>
+          <dgm:constr type="endPad"/>
+        </dgm:constrLst>
+        <dgm:ruleLst/>
+      </dgm:layoutNode>
+    </dgm:forEach>
+    <dgm:forEach name="Name202" axis="ch" ptType="sibTrans" hideLastTrans="0" st="7" cnt="1">
+      <dgm:layoutNode name="arrowWedge7" styleLbl="fgSibTrans2D1">
+        <dgm:choose name="Name203">
+          <dgm:if name="Name204" func="var" arg="dir" op="equ" val="norm">
+            <dgm:alg type="conn">
+              <dgm:param type="connRout" val="curve"/>
+              <dgm:param type="srcNode" val="dummy7a"/>
+              <dgm:param type="dstNode" val="dummy7b"/>
+              <dgm:param type="begPts" val="tL"/>
+              <dgm:param type="endPts" val="tL"/>
+              <dgm:param type="begSty" val="noArr"/>
+              <dgm:param type="endSty" val="arr"/>
+            </dgm:alg>
+          </dgm:if>
+          <dgm:else name="Name205">
+            <dgm:alg type="conn">
+              <dgm:param type="connRout" val="curve"/>
+              <dgm:param type="srcNode" val="dummy7a"/>
+              <dgm:param type="dstNode" val="dummy7b"/>
+              <dgm:param type="begPts" val="tL"/>
+              <dgm:param type="endPts" val="tL"/>
+              <dgm:param type="begSty" val="arr"/>
+              <dgm:param type="endSty" val="noArr"/>
+            </dgm:alg>
+          </dgm:else>
+        </dgm:choose>
+        <dgm:shape xmlns:r="http://schemas.openxmlformats.org/officeDocument/2006/relationships" type="conn" r:blip="">
+          <dgm:adjLst/>
+        </dgm:shape>
+        <dgm:presOf/>
+        <dgm:constrLst>
+          <dgm:constr type="w" val="1"/>
+          <dgm:constr type="begPad"/>
+          <dgm:constr type="endPad"/>
+        </dgm:constrLst>
+        <dgm:ruleLst/>
+      </dgm:layoutNode>
+    </dgm:forEach>
+  </dgm:layoutNode>
+</dgm:layoutDef>
+</file>
+
+<file path=ppt/diagrams/quickStyle1.xml><?xml version="1.0" encoding="utf-8"?>
+<dgm:styleDef xmlns:dgm="http://schemas.openxmlformats.org/drawingml/2006/diagram" xmlns:a="http://schemas.openxmlformats.org/drawingml/2006/main" uniqueId="urn:microsoft.com/office/officeart/2005/8/quickstyle/simple4">
+  <dgm:title val=""/>
+  <dgm:desc val=""/>
+  <dgm:catLst>
+    <dgm:cat type="simple" pri="10400"/>
+  </dgm:catLst>
+  <dgm:scene3d>
+    <a:camera prst="orthographicFront"/>
+    <a:lightRig rig="threePt" dir="t"/>
+  </dgm:scene3d>
+  <dgm:styleLbl name="node0">
+    <dgm:scene3d>
+      <a:camera prst="orthographicFront"/>
+      <a:lightRig rig="threePt" dir="t"/>
+    </dgm:scene3d>
+    <dgm:sp3d/>
+    <dgm:txPr/>
+    <dgm:style>
+      <a:lnRef idx="0">
+        <a:scrgbClr r="0" g="0" b="0"/>
+      </a:lnRef>
+      <a:fillRef idx="3">
+        <a:scrgbClr r="0" g="0" b="0"/>
+      </a:fillRef>
+      <a:effectRef idx="2">
+        <a:scrgbClr r="0" g="0" b="0"/>
+      </a:effectRef>
+      <a:fontRef idx="minor">
+        <a:schemeClr val="lt1"/>
+      </a:fontRef>
+    </dgm:style>
+  </dgm:styleLbl>
+  <dgm:styleLbl name="lnNode1">
+    <dgm:scene3d>
+      <a:camera prst="orthographicFront"/>
+      <a:lightRig rig="threePt" dir="t"/>
+    </dgm:scene3d>
+    <dgm:sp3d/>
+    <dgm:txPr/>
+    <dgm:style>
+      <a:lnRef idx="1">
+        <a:scrgbClr r="0" g="0" b="0"/>
+      </a:lnRef>
+      <a:fillRef idx="3">
+        <a:scrgbClr r="0" g="0" b="0"/>
+      </a:fillRef>
+      <a:effectRef idx="2">
+        <a:scrgbClr r="0" g="0" b="0"/>
+      </a:effectRef>
+      <a:fontRef idx="minor">
+        <a:schemeClr val="lt1"/>
+      </a:fontRef>
+    </dgm:style>
+  </dgm:styleLbl>
+  <dgm:styleLbl name="vennNode1">
+    <dgm:scene3d>
+      <a:camera prst="orthographicFront"/>
+      <a:lightRig rig="threePt" dir="t"/>
+    </dgm:scene3d>
+    <dgm:sp3d/>
+    <dgm:txPr/>
+    <dgm:style>
+      <a:lnRef idx="0">
+        <a:scrgbClr r="0" g="0" b="0"/>
+      </a:lnRef>
+      <a:fillRef idx="3">
+        <a:scrgbClr r="0" g="0" b="0"/>
+      </a:fillRef>
+      <a:effectRef idx="0">
+        <a:scrgbClr r="0" g="0" b="0"/>
+      </a:effectRef>
+      <a:fontRef idx="minor">
+        <a:schemeClr val="tx1"/>
+      </a:fontRef>
+    </dgm:style>
+  </dgm:styleLbl>
+  <dgm:styleLbl name="alignNode1">
+    <dgm:scene3d>
+      <a:camera prst="orthographicFront"/>
+      <a:lightRig rig="threePt" dir="t"/>
+    </dgm:scene3d>
+    <dgm:sp3d/>
+    <dgm:txPr/>
+    <dgm:style>
+      <a:lnRef idx="1">
+        <a:scrgbClr r="0" g="0" b="0"/>
+      </a:lnRef>
+      <a:fillRef idx="3">
+        <a:scrgbClr r="0" g="0" b="0"/>
+      </a:fillRef>
+      <a:effectRef idx="2">
+        <a:scrgbClr r="0" g="0" b="0"/>
+      </a:effectRef>
+      <a:fontRef idx="minor">
+        <a:schemeClr val="lt1"/>
+      </a:fontRef>
+    </dgm:style>
+  </dgm:styleLbl>
+  <dgm:styleLbl name="node1">
+    <dgm:scene3d>
+      <a:camera prst="orthographicFront"/>
+      <a:lightRig rig="threePt" dir="t"/>
+    </dgm:scene3d>
+    <dgm:sp3d/>
+    <dgm:txPr/>
+    <dgm:style>
+      <a:lnRef idx="0">
+        <a:scrgbClr r="0" g="0" b="0"/>
+      </a:lnRef>
+      <a:fillRef idx="3">
+        <a:scrgbClr r="0" g="0" b="0"/>
+      </a:fillRef>
+      <a:effectRef idx="2">
+        <a:scrgbClr r="0" g="0" b="0"/>
+      </a:effectRef>
+      <a:fontRef idx="minor">
+        <a:schemeClr val="lt1"/>
+      </a:fontRef>
+    </dgm:style>
+  </dgm:styleLbl>
+  <dgm:styleLbl name="node2">
+    <dgm:scene3d>
+      <a:camera prst="orthographicFront"/>
+      <a:lightRig rig="threePt" dir="t"/>
+    </dgm:scene3d>
+    <dgm:sp3d/>
+    <dgm:txPr/>
+    <dgm:style>
+      <a:lnRef idx="0">
+        <a:scrgbClr r="0" g="0" b="0"/>
+      </a:lnRef>
+      <a:fillRef idx="3">
+        <a:scrgbClr r="0" g="0" b="0"/>
+      </a:fillRef>
+      <a:effectRef idx="2">
+        <a:scrgbClr r="0" g="0" b="0"/>
+      </a:effectRef>
+      <a:fontRef idx="minor">
+        <a:schemeClr val="lt1"/>
+      </a:fontRef>
+    </dgm:style>
+  </dgm:styleLbl>
+  <dgm:styleLbl name="node3">
+    <dgm:scene3d>
+      <a:camera prst="orthographicFront"/>
+      <a:lightRig rig="threePt" dir="t"/>
+    </dgm:scene3d>
+    <dgm:sp3d/>
+    <dgm:txPr/>
+    <dgm:style>
+      <a:lnRef idx="0">
+        <a:scrgbClr r="0" g="0" b="0"/>
+      </a:lnRef>
+      <a:fillRef idx="3">
+        <a:scrgbClr r="0" g="0" b="0"/>
+      </a:fillRef>
+      <a:effectRef idx="2">
+        <a:scrgbClr r="0" g="0" b="0"/>
+      </a:effectRef>
+      <a:fontRef idx="minor">
+        <a:schemeClr val="lt1"/>
+      </a:fontRef>
+    </dgm:style>
+  </dgm:styleLbl>
+  <dgm:styleLbl name="node4">
+    <dgm:scene3d>
+      <a:camera prst="orthographicFront"/>
+      <a:lightRig rig="threePt" dir="t"/>
+    </dgm:scene3d>
+    <dgm:sp3d/>
+    <dgm:txPr/>
+    <dgm:style>
+      <a:lnRef idx="0">
+        <a:scrgbClr r="0" g="0" b="0"/>
+      </a:lnRef>
+      <a:fillRef idx="3">
+        <a:scrgbClr r="0" g="0" b="0"/>
+      </a:fillRef>
+      <a:effectRef idx="2">
+        <a:scrgbClr r="0" g="0" b="0"/>
+      </a:effectRef>
+      <a:fontRef idx="minor">
+        <a:schemeClr val="lt1"/>
+      </a:fontRef>
+    </dgm:style>
+  </dgm:styleLbl>
+  <dgm:styleLbl name="fgImgPlace1">
+    <dgm:scene3d>
+      <a:camera prst="orthographicFront"/>
+      <a:lightRig rig="threePt" dir="t"/>
+    </dgm:scene3d>
+    <dgm:sp3d/>
+    <dgm:txPr/>
+    <dgm:style>
+      <a:lnRef idx="0">
+        <a:scrgbClr r="0" g="0" b="0"/>
+      </a:lnRef>
+      <a:fillRef idx="1">
+        <a:scrgbClr r="0" g="0" b="0"/>
+      </a:fillRef>
+      <a:effectRef idx="2">
+        <a:scrgbClr r="0" g="0" b="0"/>
+      </a:effectRef>
+      <a:fontRef idx="minor"/>
+    </dgm:style>
+  </dgm:styleLbl>
+  <dgm:styleLbl name="alignImgPlace1">
+    <dgm:scene3d>
+      <a:camera prst="orthographicFront"/>
+      <a:lightRig rig="threePt" dir="t"/>
+    </dgm:scene3d>
+    <dgm:sp3d/>
+    <dgm:txPr/>
+    <dgm:style>
+      <a:lnRef idx="0">
+        <a:scrgbClr r="0" g="0" b="0"/>
+      </a:lnRef>
+      <a:fillRef idx="1">
+        <a:scrgbClr r="0" g="0" b="0"/>
+      </a:fillRef>
+      <a:effectRef idx="2">
+        <a:scrgbClr r="0" g="0" b="0"/>
+      </a:effectRef>
+      <a:fontRef idx="minor"/>
+    </dgm:style>
+  </dgm:styleLbl>
+  <dgm:styleLbl name="bgImgPlace1">
+    <dgm:scene3d>
+      <a:camera prst="orthographicFront"/>
+      <a:lightRig rig="threePt" dir="t"/>
+    </dgm:scene3d>
+    <dgm:sp3d/>
+    <dgm:txPr/>
+    <dgm:style>
+      <a:lnRef idx="0">
+        <a:scrgbClr r="0" g="0" b="0"/>
+      </a:lnRef>
+      <a:fillRef idx="1">
+        <a:scrgbClr r="0" g="0" b="0"/>
+      </a:fillRef>
+      <a:effectRef idx="2">
+        <a:scrgbClr r="0" g="0" b="0"/>
+      </a:effectRef>
+      <a:fontRef idx="minor"/>
+    </dgm:style>
+  </dgm:styleLbl>
+  <dgm:styleLbl name="sibTrans2D1">
+    <dgm:scene3d>
+      <a:camera prst="orthographicFront"/>
+      <a:lightRig rig="threePt" dir="t"/>
+    </dgm:scene3d>
+    <dgm:sp3d/>
+    <dgm:txPr/>
+    <dgm:style>
+      <a:lnRef idx="0">
+        <a:scrgbClr r="0" g="0" b="0"/>
+      </a:lnRef>
+      <a:fillRef idx="3">
+        <a:scrgbClr r="0" g="0" b="0"/>
+      </a:fillRef>
+      <a:effectRef idx="2">
+        <a:scrgbClr r="0" g="0" b="0"/>
+      </a:effectRef>
+      <a:fontRef idx="minor">
+        <a:schemeClr val="lt1"/>
+      </a:fontRef>
+    </dgm:style>
+  </dgm:styleLbl>
+  <dgm:styleLbl name="fgSibTrans2D1">
+    <dgm:scene3d>
+      <a:camera prst="orthographicFront"/>
+      <a:lightRig rig="threePt" dir="t"/>
+    </dgm:scene3d>
+    <dgm:sp3d/>
+    <dgm:txPr/>
+    <dgm:style>
+      <a:lnRef idx="0">
+        <a:scrgbClr r="0" g="0" b="0"/>
+      </a:lnRef>
+      <a:fillRef idx="3">
+        <a:scrgbClr r="0" g="0" b="0"/>
+      </a:fillRef>
+      <a:effectRef idx="2">
+        <a:scrgbClr r="0" g="0" b="0"/>
+      </a:effectRef>
+      <a:fontRef idx="minor">
+        <a:schemeClr val="lt1"/>
+      </a:fontRef>
+    </dgm:style>
+  </dgm:styleLbl>
+  <dgm:styleLbl name="bgSibTrans2D1">
+    <dgm:scene3d>
+      <a:camera prst="orthographicFront"/>
+      <a:lightRig rig="threePt" dir="t"/>
+    </dgm:scene3d>
+    <dgm:sp3d/>
+    <dgm:txPr/>
+    <dgm:style>
+      <a:lnRef idx="0">
+        <a:scrgbClr r="0" g="0" b="0"/>
+      </a:lnRef>
+      <a:fillRef idx="3">
+        <a:scrgbClr r="0" g="0" b="0"/>
+      </a:fillRef>
+      <a:effectRef idx="2">
+        <a:scrgbClr r="0" g="0" b="0"/>
+      </a:effectRef>
+      <a:fontRef idx="minor">
+        <a:schemeClr val="lt1"/>
+      </a:fontRef>
+    </dgm:style>
+  </dgm:styleLbl>
+  <dgm:styleLbl name="sibTrans1D1">
+    <dgm:scene3d>
+      <a:camera prst="orthographicFront"/>
+      <a:lightRig rig="threePt" dir="t"/>
+    </dgm:scene3d>
+    <dgm:sp3d/>
+    <dgm:txPr/>
+    <dgm:style>
+      <a:lnRef idx="1">
+        <a:scrgbClr r="0" g="0" b="0"/>
+      </a:lnRef>
+      <a:fillRef idx="0">
+        <a:scrgbClr r="0" g="0" b="0"/>
+      </a:fillRef>
+      <a:effectRef idx="0">
+        <a:scrgbClr r="0" g="0" b="0"/>
+      </a:effectRef>
+      <a:fontRef idx="minor"/>
+    </dgm:style>
+  </dgm:styleLbl>
+  <dgm:styleLbl name="callout">
+    <dgm:scene3d>
+      <a:camera prst="orthographicFront"/>
+      <a:lightRig rig="threePt" dir="t"/>
+    </dgm:scene3d>
+    <dgm:sp3d/>
+    <dgm:txPr/>
+    <dgm:style>
+      <a:lnRef idx="2">
+        <a:scrgbClr r="0" g="0" b="0"/>
+      </a:lnRef>
+      <a:fillRef idx="1">
+        <a:scrgbClr r="0" g="0" b="0"/>
+      </a:fillRef>
+      <a:effectRef idx="1">
+        <a:scrgbClr r="0" g="0" b="0"/>
+      </a:effectRef>
+      <a:fontRef idx="minor"/>
+    </dgm:style>
+  </dgm:styleLbl>
+  <dgm:styleLbl name="asst0">
+    <dgm:scene3d>
+      <a:camera prst="orthographicFront"/>
+      <a:lightRig rig="threePt" dir="t"/>
+    </dgm:scene3d>
+    <dgm:sp3d/>
+    <dgm:txPr/>
+    <dgm:style>
+      <a:lnRef idx="0">
+        <a:scrgbClr r="0" g="0" b="0"/>
+      </a:lnRef>
+      <a:fillRef idx="3">
+        <a:scrgbClr r="0" g="0" b="0"/>
+      </a:fillRef>
+      <a:effectRef idx="2">
+        <a:scrgbClr r="0" g="0" b="0"/>
+      </a:effectRef>
+      <a:fontRef idx="minor">
+        <a:schemeClr val="lt1"/>
+      </a:fontRef>
+    </dgm:style>
+  </dgm:styleLbl>
+  <dgm:styleLbl name="asst1">
+    <dgm:scene3d>
+      <a:camera prst="orthographicFront"/>
+      <a:lightRig rig="threePt" dir="t"/>
+    </dgm:scene3d>
+    <dgm:sp3d/>
+    <dgm:txPr/>
+    <dgm:style>
+      <a:lnRef idx="0">
+        <a:scrgbClr r="0" g="0" b="0"/>
+      </a:lnRef>
+      <a:fillRef idx="3">
+        <a:scrgbClr r="0" g="0" b="0"/>
+      </a:fillRef>
+      <a:effectRef idx="2">
+        <a:scrgbClr r="0" g="0" b="0"/>
+      </a:effectRef>
+      <a:fontRef idx="minor">
+        <a:schemeClr val="lt1"/>
+      </a:fontRef>
+    </dgm:style>
+  </dgm:styleLbl>
+  <dgm:styleLbl name="asst2">
+    <dgm:scene3d>
+      <a:camera prst="orthographicFront"/>
+      <a:lightRig rig="threePt" dir="t"/>
+    </dgm:scene3d>
+    <dgm:sp3d/>
+    <dgm:txPr/>
+    <dgm:style>
+      <a:lnRef idx="0">
+        <a:scrgbClr r="0" g="0" b="0"/>
+      </a:lnRef>
+      <a:fillRef idx="3">
+        <a:scrgbClr r="0" g="0" b="0"/>
+      </a:fillRef>
+      <a:effectRef idx="2">
+        <a:scrgbClr r="0" g="0" b="0"/>
+      </a:effectRef>
+      <a:fontRef idx="minor">
+        <a:schemeClr val="lt1"/>
+      </a:fontRef>
+    </dgm:style>
+  </dgm:styleLbl>
+  <dgm:styleLbl name="asst3">
+    <dgm:scene3d>
+      <a:camera prst="orthographicFront"/>
+      <a:lightRig rig="threePt" dir="t"/>
+    </dgm:scene3d>
+    <dgm:sp3d/>
+    <dgm:txPr/>
+    <dgm:style>
+      <a:lnRef idx="0">
+        <a:scrgbClr r="0" g="0" b="0"/>
+      </a:lnRef>
+      <a:fillRef idx="3">
+        <a:scrgbClr r="0" g="0" b="0"/>
+      </a:fillRef>
+      <a:effectRef idx="2">
+        <a:scrgbClr r="0" g="0" b="0"/>
+      </a:effectRef>
+      <a:fontRef idx="minor">
+        <a:schemeClr val="lt1"/>
+      </a:fontRef>
+    </dgm:style>
+  </dgm:styleLbl>
+  <dgm:styleLbl name="asst4">
+    <dgm:scene3d>
+      <a:camera prst="orthographicFront"/>
+      <a:lightRig rig="threePt" dir="t"/>
+    </dgm:scene3d>
+    <dgm:sp3d/>
+    <dgm:txPr/>
+    <dgm:style>
+      <a:lnRef idx="0">
+        <a:scrgbClr r="0" g="0" b="0"/>
+      </a:lnRef>
+      <a:fillRef idx="3">
+        <a:scrgbClr r="0" g="0" b="0"/>
+      </a:fillRef>
+      <a:effectRef idx="2">
+        <a:scrgbClr r="0" g="0" b="0"/>
+      </a:effectRef>
+      <a:fontRef idx="minor">
+        <a:schemeClr val="lt1"/>
+      </a:fontRef>
+    </dgm:style>
+  </dgm:styleLbl>
+  <dgm:styleLbl name="parChTrans2D1">
+    <dgm:scene3d>
+      <a:camera prst="orthographicFront"/>
+      <a:lightRig rig="threePt" dir="t"/>
+    </dgm:scene3d>
+    <dgm:sp3d/>
+    <dgm:txPr/>
+    <dgm:style>
+      <a:lnRef idx="0">
+        <a:scrgbClr r="0" g="0" b="0"/>
+      </a:lnRef>
+      <a:fillRef idx="3">
+        <a:scrgbClr r="0" g="0" b="0"/>
+      </a:fillRef>
+      <a:effectRef idx="2">
+        <a:scrgbClr r="0" g="0" b="0"/>
+      </a:effectRef>
+      <a:fontRef idx="minor">
+        <a:schemeClr val="lt1"/>
+      </a:fontRef>
+    </dgm:style>
+  </dgm:styleLbl>
+  <dgm:styleLbl name="parChTrans2D2">
+    <dgm:scene3d>
+      <a:camera prst="orthographicFront"/>
+      <a:lightRig rig="threePt" dir="t"/>
+    </dgm:scene3d>
+    <dgm:sp3d/>
+    <dgm:txPr/>
+    <dgm:style>
+      <a:lnRef idx="0">
+        <a:scrgbClr r="0" g="0" b="0"/>
+      </a:lnRef>
+      <a:fillRef idx="3">
+        <a:scrgbClr r="0" g="0" b="0"/>
+      </a:fillRef>
+      <a:effectRef idx="2">
+        <a:scrgbClr r="0" g="0" b="0"/>
+      </a:effectRef>
+      <a:fontRef idx="minor">
+        <a:schemeClr val="lt1"/>
+      </a:fontRef>
+    </dgm:style>
+  </dgm:styleLbl>
+  <dgm:styleLbl name="parChTrans2D3">
+    <dgm:scene3d>
+      <a:camera prst="orthographicFront"/>
+      <a:lightRig rig="threePt" dir="t"/>
+    </dgm:scene3d>
+    <dgm:sp3d/>
+    <dgm:txPr/>
+    <dgm:style>
+      <a:lnRef idx="1">
+        <a:scrgbClr r="0" g="0" b="0"/>
+      </a:lnRef>
+      <a:fillRef idx="3">
+        <a:scrgbClr r="0" g="0" b="0"/>
+      </a:fillRef>
+      <a:effectRef idx="2">
+        <a:scrgbClr r="0" g="0" b="0"/>
+      </a:effectRef>
+      <a:fontRef idx="minor">
+        <a:schemeClr val="lt1"/>
+      </a:fontRef>
+    </dgm:style>
+  </dgm:styleLbl>
+  <dgm:styleLbl name="parChTrans2D4">
+    <dgm:scene3d>
+      <a:camera prst="orthographicFront"/>
+      <a:lightRig rig="threePt" dir="t"/>
+    </dgm:scene3d>
+    <dgm:sp3d/>
+    <dgm:txPr/>
+    <dgm:style>
+      <a:lnRef idx="1">
+        <a:scrgbClr r="0" g="0" b="0"/>
+      </a:lnRef>
+      <a:fillRef idx="3">
+        <a:scrgbClr r="0" g="0" b="0"/>
+      </a:fillRef>
+      <a:effectRef idx="2">
+        <a:scrgbClr r="0" g="0" b="0"/>
+      </a:effectRef>
+      <a:fontRef idx="minor">
+        <a:schemeClr val="lt1"/>
+      </a:fontRef>
+    </dgm:style>
+  </dgm:styleLbl>
+  <dgm:styleLbl name="parChTrans1D1">
+    <dgm:scene3d>
+      <a:camera prst="orthographicFront"/>
+      <a:lightRig rig="threePt" dir="t"/>
+    </dgm:scene3d>
+    <dgm:sp3d/>
+    <dgm:txPr/>
+    <dgm:style>
+      <a:lnRef idx="1">
+        <a:scrgbClr r="0" g="0" b="0"/>
+      </a:lnRef>
+      <a:fillRef idx="0">
+        <a:scrgbClr r="0" g="0" b="0"/>
+      </a:fillRef>
+      <a:effectRef idx="0">
+        <a:scrgbClr r="0" g="0" b="0"/>
+      </a:effectRef>
+      <a:fontRef idx="minor"/>
+    </dgm:style>
+  </dgm:styleLbl>
+  <dgm:styleLbl name="parChTrans1D2">
+    <dgm:scene3d>
+      <a:camera prst="orthographicFront"/>
+      <a:lightRig rig="threePt" dir="t"/>
+    </dgm:scene3d>
+    <dgm:sp3d/>
+    <dgm:txPr/>
+    <dgm:style>
+      <a:lnRef idx="1">
+        <a:scrgbClr r="0" g="0" b="0"/>
+      </a:lnRef>
+      <a:fillRef idx="0">
+        <a:scrgbClr r="0" g="0" b="0"/>
+      </a:fillRef>
+      <a:effectRef idx="0">
+        <a:scrgbClr r="0" g="0" b="0"/>
+      </a:effectRef>
+      <a:fontRef idx="minor"/>
+    </dgm:style>
+  </dgm:styleLbl>
+  <dgm:styleLbl name="parChTrans1D3">
+    <dgm:scene3d>
+      <a:camera prst="orthographicFront"/>
+      <a:lightRig rig="threePt" dir="t"/>
+    </dgm:scene3d>
+    <dgm:sp3d/>
+    <dgm:txPr/>
+    <dgm:style>
+      <a:lnRef idx="1">
+        <a:scrgbClr r="0" g="0" b="0"/>
+      </a:lnRef>
+      <a:fillRef idx="0">
+        <a:scrgbClr r="0" g="0" b="0"/>
+      </a:fillRef>
+      <a:effectRef idx="0">
+        <a:scrgbClr r="0" g="0" b="0"/>
+      </a:effectRef>
+      <a:fontRef idx="minor"/>
+    </dgm:style>
+  </dgm:styleLbl>
+  <dgm:styleLbl name="parChTrans1D4">
+    <dgm:scene3d>
+      <a:camera prst="orthographicFront"/>
+      <a:lightRig rig="threePt" dir="t"/>
+    </dgm:scene3d>
+    <dgm:sp3d/>
+    <dgm:txPr/>
+    <dgm:style>
+      <a:lnRef idx="1">
+        <a:scrgbClr r="0" g="0" b="0"/>
+      </a:lnRef>
+      <a:fillRef idx="0">
+        <a:scrgbClr r="0" g="0" b="0"/>
+      </a:fillRef>
+      <a:effectRef idx="0">
+        <a:scrgbClr r="0" g="0" b="0"/>
+      </a:effectRef>
+      <a:fontRef idx="minor"/>
+    </dgm:style>
+  </dgm:styleLbl>
+  <dgm:styleLbl name="fgAcc1">
+    <dgm:scene3d>
+      <a:camera prst="orthographicFront"/>
+      <a:lightRig rig="threePt" dir="t"/>
+    </dgm:scene3d>
+    <dgm:sp3d/>
+    <dgm:txPr/>
+    <dgm:style>
+      <a:lnRef idx="1">
+        <a:scrgbClr r="0" g="0" b="0"/>
+      </a:lnRef>
+      <a:fillRef idx="1">
+        <a:scrgbClr r="0" g="0" b="0"/>
+      </a:fillRef>
+      <a:effectRef idx="0">
+        <a:scrgbClr r="0" g="0" b="0"/>
+      </a:effectRef>
+      <a:fontRef idx="minor"/>
+    </dgm:style>
+  </dgm:styleLbl>
+  <dgm:styleLbl name="conFgAcc1">
+    <dgm:scene3d>
+      <a:camera prst="orthographicFront"/>
+      <a:lightRig rig="threePt" dir="t"/>
+    </dgm:scene3d>
+    <dgm:sp3d/>
+    <dgm:txPr/>
+    <dgm:style>
+      <a:lnRef idx="1">
+        <a:scrgbClr r="0" g="0" b="0"/>
+      </a:lnRef>
+      <a:fillRef idx="1">
+        <a:scrgbClr r="0" g="0" b="0"/>
+      </a:fillRef>
+      <a:effectRef idx="0">
+        <a:scrgbClr r="0" g="0" b="0"/>
+      </a:effectRef>
+      <a:fontRef idx="minor"/>
+    </dgm:style>
+  </dgm:styleLbl>
+  <dgm:styleLbl name="alignAcc1">
+    <dgm:scene3d>
+      <a:camera prst="orthographicFront"/>
+      <a:lightRig rig="threePt" dir="t"/>
+    </dgm:scene3d>
+    <dgm:sp3d/>
+    <dgm:txPr/>
+    <dgm:style>
+      <a:lnRef idx="1">
+        <a:scrgbClr r="0" g="0" b="0"/>
+      </a:lnRef>
+      <a:fillRef idx="1">
+        <a:scrgbClr r="0" g="0" b="0"/>
+      </a:fillRef>
+      <a:effectRef idx="0">
+        <a:scrgbClr r="0" g="0" b="0"/>
+      </a:effectRef>
+      <a:fontRef idx="minor"/>
+    </dgm:style>
+  </dgm:styleLbl>
+  <dgm:styleLbl name="trAlignAcc1">
+    <dgm:scene3d>
+      <a:camera prst="orthographicFront"/>
+      <a:lightRig rig="threePt" dir="t"/>
+    </dgm:scene3d>
+    <dgm:sp3d/>
+    <dgm:txPr/>
+    <dgm:style>
+      <a:lnRef idx="1">
+        <a:scrgbClr r="0" g="0" b="0"/>
+      </a:lnRef>
+      <a:fillRef idx="1">
+        <a:scrgbClr r="0" g="0" b="0"/>
+      </a:fillRef>
+      <a:effectRef idx="0">
+        <a:scrgbClr r="0" g="0" b="0"/>
+      </a:effectRef>
+      <a:fontRef idx="minor"/>
+    </dgm:style>
+  </dgm:styleLbl>
+  <dgm:styleLbl name="bgAcc1">
+    <dgm:scene3d>
+      <a:camera prst="orthographicFront"/>
+      <a:lightRig rig="threePt" dir="t"/>
+    </dgm:scene3d>
+    <dgm:sp3d/>
+    <dgm:txPr/>
+    <dgm:style>
+      <a:lnRef idx="1">
+        <a:scrgbClr r="0" g="0" b="0"/>
+      </a:lnRef>
+      <a:fillRef idx="1">
+        <a:scrgbClr r="0" g="0" b="0"/>
+      </a:fillRef>
+      <a:effectRef idx="0">
+        <a:scrgbClr r="0" g="0" b="0"/>
+      </a:effectRef>
+      <a:fontRef idx="minor"/>
+    </dgm:style>
+  </dgm:styleLbl>
+  <dgm:styleLbl name="solidFgAcc1">
+    <dgm:scene3d>
+      <a:camera prst="orthographicFront"/>
+      <a:lightRig rig="threePt" dir="t"/>
+    </dgm:scene3d>
+    <dgm:sp3d/>
+    <dgm:txPr/>
+    <dgm:style>
+      <a:lnRef idx="1">
+        <a:scrgbClr r="0" g="0" b="0"/>
+      </a:lnRef>
+      <a:fillRef idx="1">
+        <a:scrgbClr r="0" g="0" b="0"/>
+      </a:fillRef>
+      <a:effectRef idx="0">
+        <a:scrgbClr r="0" g="0" b="0"/>
+      </a:effectRef>
+      <a:fontRef idx="minor"/>
+    </dgm:style>
+  </dgm:styleLbl>
+  <dgm:styleLbl name="solidAlignAcc1">
+    <dgm:scene3d>
+      <a:camera prst="orthographicFront"/>
+      <a:lightRig rig="threePt" dir="t"/>
+    </dgm:scene3d>
+    <dgm:sp3d/>
+    <dgm:txPr/>
+    <dgm:style>
+      <a:lnRef idx="1">
+        <a:scrgbClr r="0" g="0" b="0"/>
+      </a:lnRef>
+      <a:fillRef idx="1">
+        <a:scrgbClr r="0" g="0" b="0"/>
+      </a:fillRef>
+      <a:effectRef idx="0">
+        <a:scrgbClr r="0" g="0" b="0"/>
+      </a:effectRef>
+      <a:fontRef idx="minor"/>
+    </dgm:style>
+  </dgm:styleLbl>
+  <dgm:styleLbl name="solidBgAcc1">
+    <dgm:scene3d>
+      <a:camera prst="orthographicFront"/>
+      <a:lightRig rig="threePt" dir="t"/>
+    </dgm:scene3d>
+    <dgm:sp3d/>
+    <dgm:txPr/>
+    <dgm:style>
+      <a:lnRef idx="1">
+        <a:scrgbClr r="0" g="0" b="0"/>
+      </a:lnRef>
+      <a:fillRef idx="1">
+        <a:scrgbClr r="0" g="0" b="0"/>
+      </a:fillRef>
+      <a:effectRef idx="0">
+        <a:scrgbClr r="0" g="0" b="0"/>
+      </a:effectRef>
+      <a:fontRef idx="minor"/>
+    </dgm:style>
+  </dgm:styleLbl>
+  <dgm:styleLbl name="fgAccFollowNode1">
+    <dgm:scene3d>
+      <a:camera prst="orthographicFront"/>
+      <a:lightRig rig="threePt" dir="t"/>
+    </dgm:scene3d>
+    <dgm:sp3d/>
+    <dgm:txPr/>
+    <dgm:style>
+      <a:lnRef idx="1">
+        <a:scrgbClr r="0" g="0" b="0"/>
+      </a:lnRef>
+      <a:fillRef idx="1">
+        <a:scrgbClr r="0" g="0" b="0"/>
+      </a:fillRef>
+      <a:effectRef idx="0">
+        <a:scrgbClr r="0" g="0" b="0"/>
+      </a:effectRef>
+      <a:fontRef idx="minor"/>
+    </dgm:style>
+  </dgm:styleLbl>
+  <dgm:styleLbl name="alignAccFollowNode1">
+    <dgm:scene3d>
+      <a:camera prst="orthographicFront"/>
+      <a:lightRig rig="threePt" dir="t"/>
+    </dgm:scene3d>
+    <dgm:sp3d/>
+    <dgm:txPr/>
+    <dgm:style>
+      <a:lnRef idx="1">
+        <a:scrgbClr r="0" g="0" b="0"/>
+      </a:lnRef>
+      <a:fillRef idx="1">
+        <a:scrgbClr r="0" g="0" b="0"/>
+      </a:fillRef>
+      <a:effectRef idx="0">
+        <a:scrgbClr r="0" g="0" b="0"/>
+      </a:effectRef>
+      <a:fontRef idx="minor"/>
+    </dgm:style>
+  </dgm:styleLbl>
+  <dgm:styleLbl name="bgAccFollowNode1">
+    <dgm:scene3d>
+      <a:camera prst="orthographicFront"/>
+      <a:lightRig rig="threePt" dir="t"/>
+    </dgm:scene3d>
+    <dgm:sp3d/>
+    <dgm:txPr/>
+    <dgm:style>
+      <a:lnRef idx="1">
+        <a:scrgbClr r="0" g="0" b="0"/>
+      </a:lnRef>
+      <a:fillRef idx="1">
+        <a:scrgbClr r="0" g="0" b="0"/>
+      </a:fillRef>
+      <a:effectRef idx="0">
+        <a:scrgbClr r="0" g="0" b="0"/>
+      </a:effectRef>
+      <a:fontRef idx="minor"/>
+    </dgm:style>
+  </dgm:styleLbl>
+  <dgm:styleLbl name="fgAcc0">
+    <dgm:scene3d>
+      <a:camera prst="orthographicFront"/>
+      <a:lightRig rig="threePt" dir="t"/>
+    </dgm:scene3d>
+    <dgm:sp3d/>
+    <dgm:txPr/>
+    <dgm:style>
+      <a:lnRef idx="1">
+        <a:scrgbClr r="0" g="0" b="0"/>
+      </a:lnRef>
+      <a:fillRef idx="1">
+        <a:scrgbClr r="0" g="0" b="0"/>
+      </a:fillRef>
+      <a:effectRef idx="0">
+        <a:scrgbClr r="0" g="0" b="0"/>
+      </a:effectRef>
+      <a:fontRef idx="minor"/>
+    </dgm:style>
+  </dgm:styleLbl>
+  <dgm:styleLbl name="fgAcc2">
+    <dgm:scene3d>
+      <a:camera prst="orthographicFront"/>
+      <a:lightRig rig="threePt" dir="t"/>
+    </dgm:scene3d>
+    <dgm:sp3d/>
+    <dgm:txPr/>
+    <dgm:style>
+      <a:lnRef idx="1">
+        <a:scrgbClr r="0" g="0" b="0"/>
+      </a:lnRef>
+      <a:fillRef idx="1">
+        <a:scrgbClr r="0" g="0" b="0"/>
+      </a:fillRef>
+      <a:effectRef idx="0">
+        <a:scrgbClr r="0" g="0" b="0"/>
+      </a:effectRef>
+      <a:fontRef idx="minor"/>
+    </dgm:style>
+  </dgm:styleLbl>
+  <dgm:styleLbl name="fgAcc3">
+    <dgm:scene3d>
+      <a:camera prst="orthographicFront"/>
+      <a:lightRig rig="threePt" dir="t"/>
+    </dgm:scene3d>
+    <dgm:sp3d/>
+    <dgm:txPr/>
+    <dgm:style>
+      <a:lnRef idx="1">
+        <a:scrgbClr r="0" g="0" b="0"/>
+      </a:lnRef>
+      <a:fillRef idx="1">
+        <a:scrgbClr r="0" g="0" b="0"/>
+      </a:fillRef>
+      <a:effectRef idx="0">
+        <a:scrgbClr r="0" g="0" b="0"/>
+      </a:effectRef>
+      <a:fontRef idx="minor"/>
+    </dgm:style>
+  </dgm:styleLbl>
+  <dgm:styleLbl name="fgAcc4">
+    <dgm:scene3d>
+      <a:camera prst="orthographicFront"/>
+      <a:lightRig rig="threePt" dir="t"/>
+    </dgm:scene3d>
+    <dgm:sp3d/>
+    <dgm:txPr/>
+    <dgm:style>
+      <a:lnRef idx="1">
+        <a:scrgbClr r="0" g="0" b="0"/>
+      </a:lnRef>
+      <a:fillRef idx="1">
+        <a:scrgbClr r="0" g="0" b="0"/>
+      </a:fillRef>
+      <a:effectRef idx="0">
+        <a:scrgbClr r="0" g="0" b="0"/>
+      </a:effectRef>
+      <a:fontRef idx="minor"/>
+    </dgm:style>
+  </dgm:styleLbl>
+  <dgm:styleLbl name="bgShp">
+    <dgm:scene3d>
+      <a:camera prst="orthographicFront"/>
+      <a:lightRig rig="threePt" dir="t"/>
+    </dgm:scene3d>
+    <dgm:sp3d/>
+    <dgm:txPr/>
+    <dgm:style>
+      <a:lnRef idx="0">
+        <a:scrgbClr r="0" g="0" b="0"/>
+      </a:lnRef>
+      <a:fillRef idx="1">
+        <a:scrgbClr r="0" g="0" b="0"/>
+      </a:fillRef>
+      <a:effectRef idx="2">
+        <a:scrgbClr r="0" g="0" b="0"/>
+      </a:effectRef>
+      <a:fontRef idx="minor"/>
+    </dgm:style>
+  </dgm:styleLbl>
+  <dgm:styleLbl name="dkBgShp">
+    <dgm:scene3d>
+      <a:camera prst="orthographicFront"/>
+      <a:lightRig rig="threePt" dir="t"/>
+    </dgm:scene3d>
+    <dgm:sp3d/>
+    <dgm:txPr/>
+    <dgm:style>
+      <a:lnRef idx="0">
+        <a:scrgbClr r="0" g="0" b="0"/>
+      </a:lnRef>
+      <a:fillRef idx="1">
+        <a:scrgbClr r="0" g="0" b="0"/>
+      </a:fillRef>
+      <a:effectRef idx="2">
+        <a:scrgbClr r="0" g="0" b="0"/>
+      </a:effectRef>
+      <a:fontRef idx="minor"/>
+    </dgm:style>
+  </dgm:styleLbl>
+  <dgm:styleLbl name="trBgShp">
+    <dgm:scene3d>
+      <a:camera prst="orthographicFront"/>
+      <a:lightRig rig="threePt" dir="t"/>
+    </dgm:scene3d>
+    <dgm:sp3d/>
+    <dgm:txPr/>
+    <dgm:style>
+      <a:lnRef idx="0">
+        <a:scrgbClr r="0" g="0" b="0"/>
+      </a:lnRef>
+      <a:fillRef idx="1">
+        <a:scrgbClr r="0" g="0" b="0"/>
+      </a:fillRef>
+      <a:effectRef idx="0">
+        <a:scrgbClr r="0" g="0" b="0"/>
+      </a:effectRef>
+      <a:fontRef idx="minor"/>
+    </dgm:style>
+  </dgm:styleLbl>
+  <dgm:styleLbl name="fgShp">
+    <dgm:scene3d>
+      <a:camera prst="orthographicFront"/>
+      <a:lightRig rig="threePt" dir="t"/>
+    </dgm:scene3d>
+    <dgm:sp3d/>
+    <dgm:txPr/>
+    <dgm:style>
+      <a:lnRef idx="0">
+        <a:scrgbClr r="0" g="0" b="0"/>
+      </a:lnRef>
+      <a:fillRef idx="3">
+        <a:scrgbClr r="0" g="0" b="0"/>
+      </a:fillRef>
+      <a:effectRef idx="2">
+        <a:scrgbClr r="0" g="0" b="0"/>
+      </a:effectRef>
+      <a:fontRef idx="minor"/>
+    </dgm:style>
+  </dgm:styleLbl>
+  <dgm:styleLbl name="revTx">
+    <dgm:scene3d>
+      <a:camera prst="orthographicFront"/>
+      <a:lightRig rig="threePt" dir="t"/>
+    </dgm:scene3d>
+    <dgm:sp3d/>
+    <dgm:txPr/>
+    <dgm:style>
+      <a:lnRef idx="0">
+        <a:scrgbClr r="0" g="0" b="0"/>
+      </a:lnRef>
+      <a:fillRef idx="0">
+        <a:scrgbClr r="0" g="0" b="0"/>
+      </a:fillRef>
+      <a:effectRef idx="0">
+        <a:scrgbClr r="0" g="0" b="0"/>
+      </a:effectRef>
+      <a:fontRef idx="minor"/>
+    </dgm:style>
+  </dgm:styleLbl>
+</dgm:styleDef>
 </file>
 
 <file path=ppt/slideLayouts/slideLayout1.xml><?xml version="1.0" encoding="utf-8"?>
@@ -288,7 +4855,7 @@
           <a:p>
             <a:fld id="{87AA6C82-45E8-4864-89CF-9590CA09C579}" type="datetimeFigureOut">
               <a:rPr lang="en-US" smtClean="0"/>
-              <a:t>6/26/2012</a:t>
+              <a:t>7/10/17</a:t>
             </a:fld>
             <a:endParaRPr lang="en-US"/>
           </a:p>
@@ -458,7 +5025,7 @@
           <a:p>
             <a:fld id="{87AA6C82-45E8-4864-89CF-9590CA09C579}" type="datetimeFigureOut">
               <a:rPr lang="en-US" smtClean="0"/>
-              <a:t>6/26/2012</a:t>
+              <a:t>7/10/17</a:t>
             </a:fld>
             <a:endParaRPr lang="en-US"/>
           </a:p>
@@ -638,7 +5205,7 @@
           <a:p>
             <a:fld id="{87AA6C82-45E8-4864-89CF-9590CA09C579}" type="datetimeFigureOut">
               <a:rPr lang="en-US" smtClean="0"/>
-              <a:t>6/26/2012</a:t>
+              <a:t>7/10/17</a:t>
             </a:fld>
             <a:endParaRPr lang="en-US"/>
           </a:p>
@@ -808,7 +5375,7 @@
           <a:p>
             <a:fld id="{87AA6C82-45E8-4864-89CF-9590CA09C579}" type="datetimeFigureOut">
               <a:rPr lang="en-US" smtClean="0"/>
-              <a:t>6/26/2012</a:t>
+              <a:t>7/10/17</a:t>
             </a:fld>
             <a:endParaRPr lang="en-US"/>
           </a:p>
@@ -1054,7 +5621,7 @@
           <a:p>
             <a:fld id="{87AA6C82-45E8-4864-89CF-9590CA09C579}" type="datetimeFigureOut">
               <a:rPr lang="en-US" smtClean="0"/>
-              <a:t>6/26/2012</a:t>
+              <a:t>7/10/17</a:t>
             </a:fld>
             <a:endParaRPr lang="en-US"/>
           </a:p>
@@ -1342,7 +5909,7 @@
           <a:p>
             <a:fld id="{87AA6C82-45E8-4864-89CF-9590CA09C579}" type="datetimeFigureOut">
               <a:rPr lang="en-US" smtClean="0"/>
-              <a:t>6/26/2012</a:t>
+              <a:t>7/10/17</a:t>
             </a:fld>
             <a:endParaRPr lang="en-US"/>
           </a:p>
@@ -1764,7 +6331,7 @@
           <a:p>
             <a:fld id="{87AA6C82-45E8-4864-89CF-9590CA09C579}" type="datetimeFigureOut">
               <a:rPr lang="en-US" smtClean="0"/>
-              <a:t>6/26/2012</a:t>
+              <a:t>7/10/17</a:t>
             </a:fld>
             <a:endParaRPr lang="en-US"/>
           </a:p>
@@ -1882,7 +6449,7 @@
           <a:p>
             <a:fld id="{87AA6C82-45E8-4864-89CF-9590CA09C579}" type="datetimeFigureOut">
               <a:rPr lang="en-US" smtClean="0"/>
-              <a:t>6/26/2012</a:t>
+              <a:t>7/10/17</a:t>
             </a:fld>
             <a:endParaRPr lang="en-US"/>
           </a:p>
@@ -1977,7 +6544,7 @@
           <a:p>
             <a:fld id="{87AA6C82-45E8-4864-89CF-9590CA09C579}" type="datetimeFigureOut">
               <a:rPr lang="en-US" smtClean="0"/>
-              <a:t>6/26/2012</a:t>
+              <a:t>7/10/17</a:t>
             </a:fld>
             <a:endParaRPr lang="en-US"/>
           </a:p>
@@ -2254,7 +6821,7 @@
           <a:p>
             <a:fld id="{87AA6C82-45E8-4864-89CF-9590CA09C579}" type="datetimeFigureOut">
               <a:rPr lang="en-US" smtClean="0"/>
-              <a:t>6/26/2012</a:t>
+              <a:t>7/10/17</a:t>
             </a:fld>
             <a:endParaRPr lang="en-US"/>
           </a:p>
@@ -2507,7 +7074,7 @@
           <a:p>
             <a:fld id="{87AA6C82-45E8-4864-89CF-9590CA09C579}" type="datetimeFigureOut">
               <a:rPr lang="en-US" smtClean="0"/>
-              <a:t>6/26/2012</a:t>
+              <a:t>7/10/17</a:t>
             </a:fld>
             <a:endParaRPr lang="en-US"/>
           </a:p>
@@ -2720,7 +7287,7 @@
           <a:p>
             <a:fld id="{87AA6C82-45E8-4864-89CF-9590CA09C579}" type="datetimeFigureOut">
               <a:rPr lang="en-US" smtClean="0"/>
-              <a:t>6/26/2012</a:t>
+              <a:t>7/10/17</a:t>
             </a:fld>
             <a:endParaRPr lang="en-US"/>
           </a:p>
@@ -3141,8 +7708,8 @@
         </p:nvSpPr>
         <p:spPr>
           <a:xfrm>
-            <a:off x="2862528" y="304800"/>
-            <a:ext cx="3418949" cy="923330"/>
+            <a:off x="3203680" y="304800"/>
+            <a:ext cx="2736647" cy="923330"/>
           </a:xfrm>
           <a:prstGeom prst="rect">
             <a:avLst/>
@@ -3214,7 +7781,7 @@
                 </a:gradFill>
                 <a:effectLst/>
               </a:rPr>
-              <a:t>Foresight</a:t>
+              <a:t>GRAVITY</a:t>
             </a:r>
             <a:endParaRPr lang="en-US" sz="5400" b="1" cap="all" dirty="0">
               <a:ln w="0"/>
@@ -3306,8 +7873,8 @@
         </p:nvCxnSpPr>
         <p:spPr>
           <a:xfrm>
-            <a:off x="2971800" y="1071265"/>
-            <a:ext cx="3309677" cy="0"/>
+            <a:off x="3209878" y="1105092"/>
+            <a:ext cx="2735270" cy="0"/>
           </a:xfrm>
           <a:prstGeom prst="line">
             <a:avLst/>
@@ -3539,7 +8106,7 @@
           <a:p>
             <a:pPr algn="just"/>
             <a:r>
-              <a:rPr lang="en-US" sz="1200" smtClean="0">
+              <a:rPr lang="en-US" sz="1200" dirty="0" smtClean="0">
                 <a:solidFill>
                   <a:schemeClr val="accent1">
                     <a:lumMod val="75000"/>
@@ -3552,19 +8119,6 @@
               <a:t>© </a:t>
             </a:r>
             <a:r>
-              <a:rPr lang="en-US" sz="1200" smtClean="0">
-                <a:solidFill>
-                  <a:schemeClr val="accent1">
-                    <a:lumMod val="75000"/>
-                  </a:schemeClr>
-                </a:solidFill>
-                <a:latin typeface="Tahoma" pitchFamily="34" charset="0"/>
-                <a:ea typeface="Tahoma" pitchFamily="34" charset="0"/>
-                <a:cs typeface="Tahoma" pitchFamily="34" charset="0"/>
-              </a:rPr>
-              <a:t>2012 </a:t>
-            </a:r>
-            <a:r>
               <a:rPr lang="en-US" sz="1200" dirty="0" smtClean="0">
                 <a:solidFill>
                   <a:schemeClr val="accent1">
@@ -3575,8 +8129,18 @@
                 <a:ea typeface="Tahoma" pitchFamily="34" charset="0"/>
                 <a:cs typeface="Tahoma" pitchFamily="34" charset="0"/>
               </a:rPr>
-              <a:t>Scalable Software Solutions Private Limited. </a:t>
+              <a:t>2017 Gravity Software Technologies., Surat. </a:t>
             </a:r>
+            <a:endParaRPr lang="en-US" sz="1200" dirty="0" smtClean="0">
+              <a:solidFill>
+                <a:schemeClr val="accent1">
+                  <a:lumMod val="75000"/>
+                </a:schemeClr>
+              </a:solidFill>
+              <a:latin typeface="Tahoma" pitchFamily="34" charset="0"/>
+              <a:ea typeface="Tahoma" pitchFamily="34" charset="0"/>
+              <a:cs typeface="Tahoma" pitchFamily="34" charset="0"/>
+            </a:endParaRPr>
           </a:p>
           <a:p>
             <a:pPr algn="just"/>
@@ -3630,6 +8194,65 @@
     <p:extLst>
       <p:ext uri="{BB962C8B-B14F-4D97-AF65-F5344CB8AC3E}">
         <p14:creationId xmlns:p14="http://schemas.microsoft.com/office/powerpoint/2010/main" val="3433028225"/>
+      </p:ext>
+    </p:extLst>
+  </p:cSld>
+  <p:clrMapOvr>
+    <a:masterClrMapping/>
+  </p:clrMapOvr>
+  <p:timing>
+    <p:tnLst>
+      <p:par>
+        <p:cTn xmlns:p14="http://schemas.microsoft.com/office/powerpoint/2010/main" id="1" dur="indefinite" restart="never" nodeType="tmRoot"/>
+      </p:par>
+    </p:tnLst>
+  </p:timing>
+</p:sld>
+</file>
+
+<file path=ppt/slides/slide2.xml><?xml version="1.0" encoding="utf-8"?>
+<p:sld xmlns:a="http://schemas.openxmlformats.org/drawingml/2006/main" xmlns:r="http://schemas.openxmlformats.org/officeDocument/2006/relationships" xmlns:p="http://schemas.openxmlformats.org/presentationml/2006/main">
+  <p:cSld>
+    <p:spTree>
+      <p:nvGrpSpPr>
+        <p:cNvPr id="1" name=""/>
+        <p:cNvGrpSpPr/>
+        <p:nvPr/>
+      </p:nvGrpSpPr>
+      <p:grpSpPr>
+        <a:xfrm>
+          <a:off x="0" y="0"/>
+          <a:ext cx="0" cy="0"/>
+          <a:chOff x="0" y="0"/>
+          <a:chExt cx="0" cy="0"/>
+        </a:xfrm>
+      </p:grpSpPr>
+      <p:graphicFrame>
+        <p:nvGraphicFramePr>
+          <p:cNvPr id="6" name="Diagram 5"/>
+          <p:cNvGraphicFramePr/>
+          <p:nvPr>
+            <p:extLst>
+              <p:ext uri="{D42A27DB-BD31-4B8C-83A1-F6EECF244321}">
+                <p14:modId xmlns:p14="http://schemas.microsoft.com/office/powerpoint/2010/main" val="3900922267"/>
+              </p:ext>
+            </p:extLst>
+          </p:nvPr>
+        </p:nvGraphicFramePr>
+        <p:xfrm>
+          <a:off x="2286000" y="914400"/>
+          <a:ext cx="5791200" cy="5486400"/>
+        </p:xfrm>
+        <a:graphic>
+          <a:graphicData uri="http://schemas.openxmlformats.org/drawingml/2006/diagram">
+            <dgm:relIds xmlns:dgm="http://schemas.openxmlformats.org/drawingml/2006/diagram" xmlns:r="http://schemas.openxmlformats.org/officeDocument/2006/relationships" r:dm="rId2" r:lo="rId3" r:qs="rId4" r:cs="rId5"/>
+          </a:graphicData>
+        </a:graphic>
+      </p:graphicFrame>
+    </p:spTree>
+    <p:extLst>
+      <p:ext uri="{BB962C8B-B14F-4D97-AF65-F5344CB8AC3E}">
+        <p14:creationId xmlns:p14="http://schemas.microsoft.com/office/powerpoint/2010/main" val="1069089206"/>
       </p:ext>
     </p:extLst>
   </p:cSld>

</xml_diff>